<commit_message>
feature(verbesserungen-git): reviewed, updated also modules overview
</commit_message>
<xml_diff>
--- a/content/en/docs/overview/INF_Basisausbildung_Teil_1_Modulplan.pptx
+++ b/content/en/docs/overview/INF_Basisausbildung_Teil_1_Modulplan.pptx
@@ -3066,7 +3066,7 @@
           <a:p>
             <a:fld id="{37C84E4B-B338-4193-A47A-275E09D9F7E4}" type="datetimeFigureOut">
               <a:rPr lang="de-CH" smtClean="0"/>
-              <a:t>22.07.2024</a:t>
+              <a:t>09.09.2024</a:t>
             </a:fld>
             <a:endParaRPr lang="de-CH" dirty="0"/>
           </a:p>
@@ -3567,7 +3567,7 @@
           <a:p>
             <a:fld id="{19D283FB-C38C-4A98-BBD1-312954666360}" type="datetimeFigureOut">
               <a:rPr lang="de-CH" smtClean="0"/>
-              <a:t>22.07.2024</a:t>
+              <a:t>09.09.2024</a:t>
             </a:fld>
             <a:endParaRPr lang="de-CH" dirty="0"/>
           </a:p>
@@ -3767,7 +3767,7 @@
           <a:p>
             <a:fld id="{19D283FB-C38C-4A98-BBD1-312954666360}" type="datetimeFigureOut">
               <a:rPr lang="de-CH" smtClean="0"/>
-              <a:t>22.07.2024</a:t>
+              <a:t>09.09.2024</a:t>
             </a:fld>
             <a:endParaRPr lang="de-CH" dirty="0"/>
           </a:p>
@@ -3977,7 +3977,7 @@
           <a:p>
             <a:fld id="{19D283FB-C38C-4A98-BBD1-312954666360}" type="datetimeFigureOut">
               <a:rPr lang="de-CH" smtClean="0"/>
-              <a:t>22.07.2024</a:t>
+              <a:t>09.09.2024</a:t>
             </a:fld>
             <a:endParaRPr lang="de-CH" dirty="0"/>
           </a:p>
@@ -4177,7 +4177,7 @@
           <a:p>
             <a:fld id="{19D283FB-C38C-4A98-BBD1-312954666360}" type="datetimeFigureOut">
               <a:rPr lang="de-CH" smtClean="0"/>
-              <a:t>22.07.2024</a:t>
+              <a:t>09.09.2024</a:t>
             </a:fld>
             <a:endParaRPr lang="de-CH" dirty="0"/>
           </a:p>
@@ -4453,7 +4453,7 @@
           <a:p>
             <a:fld id="{19D283FB-C38C-4A98-BBD1-312954666360}" type="datetimeFigureOut">
               <a:rPr lang="de-CH" smtClean="0"/>
-              <a:t>22.07.2024</a:t>
+              <a:t>09.09.2024</a:t>
             </a:fld>
             <a:endParaRPr lang="de-CH" dirty="0"/>
           </a:p>
@@ -4721,7 +4721,7 @@
           <a:p>
             <a:fld id="{19D283FB-C38C-4A98-BBD1-312954666360}" type="datetimeFigureOut">
               <a:rPr lang="de-CH" smtClean="0"/>
-              <a:t>22.07.2024</a:t>
+              <a:t>09.09.2024</a:t>
             </a:fld>
             <a:endParaRPr lang="de-CH" dirty="0"/>
           </a:p>
@@ -5136,7 +5136,7 @@
           <a:p>
             <a:fld id="{19D283FB-C38C-4A98-BBD1-312954666360}" type="datetimeFigureOut">
               <a:rPr lang="de-CH" smtClean="0"/>
-              <a:t>22.07.2024</a:t>
+              <a:t>09.09.2024</a:t>
             </a:fld>
             <a:endParaRPr lang="de-CH" dirty="0"/>
           </a:p>
@@ -5278,7 +5278,7 @@
           <a:p>
             <a:fld id="{19D283FB-C38C-4A98-BBD1-312954666360}" type="datetimeFigureOut">
               <a:rPr lang="de-CH" smtClean="0"/>
-              <a:t>22.07.2024</a:t>
+              <a:t>09.09.2024</a:t>
             </a:fld>
             <a:endParaRPr lang="de-CH" dirty="0"/>
           </a:p>
@@ -5391,7 +5391,7 @@
           <a:p>
             <a:fld id="{19D283FB-C38C-4A98-BBD1-312954666360}" type="datetimeFigureOut">
               <a:rPr lang="de-CH" smtClean="0"/>
-              <a:t>22.07.2024</a:t>
+              <a:t>09.09.2024</a:t>
             </a:fld>
             <a:endParaRPr lang="de-CH" dirty="0"/>
           </a:p>
@@ -5704,7 +5704,7 @@
           <a:p>
             <a:fld id="{19D283FB-C38C-4A98-BBD1-312954666360}" type="datetimeFigureOut">
               <a:rPr lang="de-CH" smtClean="0"/>
-              <a:t>22.07.2024</a:t>
+              <a:t>09.09.2024</a:t>
             </a:fld>
             <a:endParaRPr lang="de-CH" dirty="0"/>
           </a:p>
@@ -5993,7 +5993,7 @@
           <a:p>
             <a:fld id="{19D283FB-C38C-4A98-BBD1-312954666360}" type="datetimeFigureOut">
               <a:rPr lang="de-CH" smtClean="0"/>
-              <a:t>22.07.2024</a:t>
+              <a:t>09.09.2024</a:t>
             </a:fld>
             <a:endParaRPr lang="de-CH" dirty="0"/>
           </a:p>
@@ -6236,7 +6236,7 @@
           <a:p>
             <a:fld id="{19D283FB-C38C-4A98-BBD1-312954666360}" type="datetimeFigureOut">
               <a:rPr lang="de-CH" smtClean="0"/>
-              <a:t>22.07.2024</a:t>
+              <a:t>09.09.2024</a:t>
             </a:fld>
             <a:endParaRPr lang="de-CH" dirty="0"/>
           </a:p>
@@ -12776,7 +12776,7 @@
                 </a:solidFill>
                 <a:latin typeface="SBB Light" pitchFamily="2" charset="0"/>
               </a:rPr>
-              <a:t>KI-Umgang / SBB ChatGPT</a:t>
+              <a:t>KI-Umgang / SBB AI Chat</a:t>
             </a:r>
           </a:p>
         </p:txBody>
@@ -20034,7 +20034,7 @@
                   <a:schemeClr val="tx1"/>
                 </a:solidFill>
               </a:rPr>
-              <a:t>30.9. – 4.10.</a:t>
+              <a:t>30.10. – 6.11.</a:t>
             </a:r>
             <a:endParaRPr lang="de-CH" dirty="0">
               <a:solidFill>

</xml_diff>

<commit_message>
feature(refactor-overview): proposal new overview
</commit_message>
<xml_diff>
--- a/content/en/docs/overview/INF_Basisausbildung_Teil_1_Modulplan.pptx
+++ b/content/en/docs/overview/INF_Basisausbildung_Teil_1_Modulplan.pptx
@@ -3066,7 +3066,7 @@
           <a:p>
             <a:fld id="{37C84E4B-B338-4193-A47A-275E09D9F7E4}" type="datetimeFigureOut">
               <a:rPr lang="de-CH" smtClean="0"/>
-              <a:t>09.09.2024</a:t>
+              <a:t>21.10.2024</a:t>
             </a:fld>
             <a:endParaRPr lang="de-CH" dirty="0"/>
           </a:p>
@@ -3567,7 +3567,7 @@
           <a:p>
             <a:fld id="{19D283FB-C38C-4A98-BBD1-312954666360}" type="datetimeFigureOut">
               <a:rPr lang="de-CH" smtClean="0"/>
-              <a:t>09.09.2024</a:t>
+              <a:t>21.10.2024</a:t>
             </a:fld>
             <a:endParaRPr lang="de-CH" dirty="0"/>
           </a:p>
@@ -3767,7 +3767,7 @@
           <a:p>
             <a:fld id="{19D283FB-C38C-4A98-BBD1-312954666360}" type="datetimeFigureOut">
               <a:rPr lang="de-CH" smtClean="0"/>
-              <a:t>09.09.2024</a:t>
+              <a:t>21.10.2024</a:t>
             </a:fld>
             <a:endParaRPr lang="de-CH" dirty="0"/>
           </a:p>
@@ -3977,7 +3977,7 @@
           <a:p>
             <a:fld id="{19D283FB-C38C-4A98-BBD1-312954666360}" type="datetimeFigureOut">
               <a:rPr lang="de-CH" smtClean="0"/>
-              <a:t>09.09.2024</a:t>
+              <a:t>21.10.2024</a:t>
             </a:fld>
             <a:endParaRPr lang="de-CH" dirty="0"/>
           </a:p>
@@ -4177,7 +4177,7 @@
           <a:p>
             <a:fld id="{19D283FB-C38C-4A98-BBD1-312954666360}" type="datetimeFigureOut">
               <a:rPr lang="de-CH" smtClean="0"/>
-              <a:t>09.09.2024</a:t>
+              <a:t>21.10.2024</a:t>
             </a:fld>
             <a:endParaRPr lang="de-CH" dirty="0"/>
           </a:p>
@@ -4453,7 +4453,7 @@
           <a:p>
             <a:fld id="{19D283FB-C38C-4A98-BBD1-312954666360}" type="datetimeFigureOut">
               <a:rPr lang="de-CH" smtClean="0"/>
-              <a:t>09.09.2024</a:t>
+              <a:t>21.10.2024</a:t>
             </a:fld>
             <a:endParaRPr lang="de-CH" dirty="0"/>
           </a:p>
@@ -4721,7 +4721,7 @@
           <a:p>
             <a:fld id="{19D283FB-C38C-4A98-BBD1-312954666360}" type="datetimeFigureOut">
               <a:rPr lang="de-CH" smtClean="0"/>
-              <a:t>09.09.2024</a:t>
+              <a:t>21.10.2024</a:t>
             </a:fld>
             <a:endParaRPr lang="de-CH" dirty="0"/>
           </a:p>
@@ -5136,7 +5136,7 @@
           <a:p>
             <a:fld id="{19D283FB-C38C-4A98-BBD1-312954666360}" type="datetimeFigureOut">
               <a:rPr lang="de-CH" smtClean="0"/>
-              <a:t>09.09.2024</a:t>
+              <a:t>21.10.2024</a:t>
             </a:fld>
             <a:endParaRPr lang="de-CH" dirty="0"/>
           </a:p>
@@ -5278,7 +5278,7 @@
           <a:p>
             <a:fld id="{19D283FB-C38C-4A98-BBD1-312954666360}" type="datetimeFigureOut">
               <a:rPr lang="de-CH" smtClean="0"/>
-              <a:t>09.09.2024</a:t>
+              <a:t>21.10.2024</a:t>
             </a:fld>
             <a:endParaRPr lang="de-CH" dirty="0"/>
           </a:p>
@@ -5391,7 +5391,7 @@
           <a:p>
             <a:fld id="{19D283FB-C38C-4A98-BBD1-312954666360}" type="datetimeFigureOut">
               <a:rPr lang="de-CH" smtClean="0"/>
-              <a:t>09.09.2024</a:t>
+              <a:t>21.10.2024</a:t>
             </a:fld>
             <a:endParaRPr lang="de-CH" dirty="0"/>
           </a:p>
@@ -5704,7 +5704,7 @@
           <a:p>
             <a:fld id="{19D283FB-C38C-4A98-BBD1-312954666360}" type="datetimeFigureOut">
               <a:rPr lang="de-CH" smtClean="0"/>
-              <a:t>09.09.2024</a:t>
+              <a:t>21.10.2024</a:t>
             </a:fld>
             <a:endParaRPr lang="de-CH" dirty="0"/>
           </a:p>
@@ -5993,7 +5993,7 @@
           <a:p>
             <a:fld id="{19D283FB-C38C-4A98-BBD1-312954666360}" type="datetimeFigureOut">
               <a:rPr lang="de-CH" smtClean="0"/>
-              <a:t>09.09.2024</a:t>
+              <a:t>21.10.2024</a:t>
             </a:fld>
             <a:endParaRPr lang="de-CH" dirty="0"/>
           </a:p>
@@ -6236,7 +6236,7 @@
           <a:p>
             <a:fld id="{19D283FB-C38C-4A98-BBD1-312954666360}" type="datetimeFigureOut">
               <a:rPr lang="de-CH" smtClean="0"/>
-              <a:t>09.09.2024</a:t>
+              <a:t>21.10.2024</a:t>
             </a:fld>
             <a:endParaRPr lang="de-CH" dirty="0"/>
           </a:p>
@@ -6655,6 +6655,50 @@
       </p:grpSpPr>
       <p:cxnSp>
         <p:nvCxnSpPr>
+          <p:cNvPr id="330" name="Gerader Verbinder 329">
+            <a:extLst>
+              <a:ext uri="{FF2B5EF4-FFF2-40B4-BE49-F238E27FC236}">
+                <a16:creationId xmlns:a16="http://schemas.microsoft.com/office/drawing/2014/main" id="{E205D36B-33B1-EF02-18DB-D4A364DE4BEC}"/>
+              </a:ext>
+            </a:extLst>
+          </p:cNvPr>
+          <p:cNvCxnSpPr>
+            <a:cxnSpLocks/>
+          </p:cNvCxnSpPr>
+          <p:nvPr/>
+        </p:nvCxnSpPr>
+        <p:spPr>
+          <a:xfrm flipV="1">
+            <a:off x="6701947" y="6037652"/>
+            <a:ext cx="0" cy="304494"/>
+          </a:xfrm>
+          <a:prstGeom prst="line">
+            <a:avLst/>
+          </a:prstGeom>
+          <a:ln w="9525">
+            <a:solidFill>
+              <a:schemeClr val="tx1"/>
+            </a:solidFill>
+            <a:prstDash val="dash"/>
+          </a:ln>
+        </p:spPr>
+        <p:style>
+          <a:lnRef idx="2">
+            <a:schemeClr val="accent1"/>
+          </a:lnRef>
+          <a:fillRef idx="0">
+            <a:schemeClr val="accent1"/>
+          </a:fillRef>
+          <a:effectRef idx="1">
+            <a:schemeClr val="accent1"/>
+          </a:effectRef>
+          <a:fontRef idx="minor">
+            <a:schemeClr val="tx1"/>
+          </a:fontRef>
+        </p:style>
+      </p:cxnSp>
+      <p:cxnSp>
+        <p:nvCxnSpPr>
           <p:cNvPr id="328" name="Gerader Verbinder 327">
             <a:extLst>
               <a:ext uri="{FF2B5EF4-FFF2-40B4-BE49-F238E27FC236}">
@@ -6776,7 +6820,7 @@
         </p:nvCxnSpPr>
         <p:spPr>
           <a:xfrm flipV="1">
-            <a:off x="12013222" y="6059756"/>
+            <a:off x="10746483" y="6059756"/>
             <a:ext cx="0" cy="304494"/>
           </a:xfrm>
           <a:prstGeom prst="line">
@@ -7063,6 +7107,11 @@
             <a:chOff x="1097280" y="1092558"/>
             <a:chExt cx="914400" cy="1590808"/>
           </a:xfrm>
+          <a:solidFill>
+            <a:schemeClr val="bg1">
+              <a:lumMod val="85000"/>
+            </a:schemeClr>
+          </a:solidFill>
         </p:grpSpPr>
         <p:sp>
           <p:nvSpPr>
@@ -7084,9 +7133,7 @@
             <a:prstGeom prst="roundRect">
               <a:avLst/>
             </a:prstGeom>
-            <a:solidFill>
-              <a:srgbClr val="FFD653"/>
-            </a:solidFill>
+            <a:grpFill/>
             <a:ln>
               <a:noFill/>
             </a:ln>
@@ -7195,6 +7242,7 @@
             <a:prstGeom prst="line">
               <a:avLst/>
             </a:prstGeom>
+            <a:grpFill/>
             <a:ln>
               <a:solidFill>
                 <a:schemeClr val="bg1"/>
@@ -7238,6 +7286,7 @@
             <a:prstGeom prst="line">
               <a:avLst/>
             </a:prstGeom>
+            <a:grpFill/>
             <a:ln>
               <a:solidFill>
                 <a:schemeClr val="bg1"/>
@@ -7386,6 +7435,11 @@
             <a:chOff x="1097280" y="1092558"/>
             <a:chExt cx="914400" cy="1608399"/>
           </a:xfrm>
+          <a:solidFill>
+            <a:schemeClr val="bg1">
+              <a:lumMod val="85000"/>
+            </a:schemeClr>
+          </a:solidFill>
         </p:grpSpPr>
         <p:sp>
           <p:nvSpPr>
@@ -7407,9 +7461,7 @@
             <a:prstGeom prst="roundRect">
               <a:avLst/>
             </a:prstGeom>
-            <a:solidFill>
-              <a:srgbClr val="FFD653"/>
-            </a:solidFill>
+            <a:grpFill/>
             <a:ln>
               <a:noFill/>
             </a:ln>
@@ -7516,6 +7568,7 @@
             <a:prstGeom prst="line">
               <a:avLst/>
             </a:prstGeom>
+            <a:grpFill/>
             <a:ln>
               <a:solidFill>
                 <a:schemeClr val="bg1"/>
@@ -7559,6 +7612,7 @@
             <a:prstGeom prst="line">
               <a:avLst/>
             </a:prstGeom>
+            <a:grpFill/>
             <a:ln>
               <a:solidFill>
                 <a:schemeClr val="bg1"/>
@@ -7815,7 +7869,7 @@
         </p:nvGrpSpPr>
         <p:grpSpPr>
           <a:xfrm>
-            <a:off x="4292836" y="482233"/>
+            <a:off x="3370046" y="482233"/>
             <a:ext cx="914400" cy="1608399"/>
             <a:chOff x="1097280" y="1092558"/>
             <a:chExt cx="914400" cy="1608399"/>
@@ -8035,7 +8089,7 @@
         </p:nvGrpSpPr>
         <p:grpSpPr>
           <a:xfrm>
-            <a:off x="5223642" y="482233"/>
+            <a:off x="4300852" y="482233"/>
             <a:ext cx="914400" cy="1599517"/>
             <a:chOff x="1097280" y="1092558"/>
             <a:chExt cx="914400" cy="1599517"/>
@@ -8260,6 +8314,12 @@
             <a:chOff x="1097280" y="1092558"/>
             <a:chExt cx="914400" cy="1608398"/>
           </a:xfrm>
+          <a:solidFill>
+            <a:schemeClr val="accent2">
+              <a:lumMod val="60000"/>
+              <a:lumOff val="40000"/>
+            </a:schemeClr>
+          </a:solidFill>
         </p:grpSpPr>
         <p:sp>
           <p:nvSpPr>
@@ -8281,9 +8341,7 @@
             <a:prstGeom prst="roundRect">
               <a:avLst/>
             </a:prstGeom>
-            <a:solidFill>
-              <a:srgbClr val="FFD653"/>
-            </a:solidFill>
+            <a:grpFill/>
             <a:ln>
               <a:noFill/>
             </a:ln>
@@ -8418,6 +8476,7 @@
             <a:prstGeom prst="line">
               <a:avLst/>
             </a:prstGeom>
+            <a:grpFill/>
             <a:ln>
               <a:solidFill>
                 <a:schemeClr val="bg1"/>
@@ -8461,6 +8520,7 @@
             <a:prstGeom prst="line">
               <a:avLst/>
             </a:prstGeom>
+            <a:grpFill/>
             <a:ln>
               <a:solidFill>
                 <a:schemeClr val="bg1"/>
@@ -8744,7 +8804,10 @@
               <a:avLst/>
             </a:prstGeom>
             <a:solidFill>
-              <a:srgbClr val="FFD653"/>
+              <a:schemeClr val="accent6">
+                <a:lumMod val="60000"/>
+                <a:lumOff val="40000"/>
+              </a:schemeClr>
             </a:solidFill>
             <a:ln>
               <a:noFill/>
@@ -8826,7 +8889,7 @@
             <a:p>
               <a:pPr algn="ctr"/>
               <a:r>
-                <a:rPr lang="de-DE" sz="800" dirty="0">
+                <a:rPr lang="de-DE" sz="800" dirty="0" err="1">
                   <a:solidFill>
                     <a:schemeClr val="tx1"/>
                   </a:solidFill>
@@ -8834,6 +8897,12 @@
                 </a:rPr>
                 <a:t>Artifactory</a:t>
               </a:r>
+              <a:endParaRPr lang="de-DE" sz="800" dirty="0">
+                <a:solidFill>
+                  <a:schemeClr val="tx1"/>
+                </a:solidFill>
+                <a:latin typeface="SBB Light" pitchFamily="2" charset="0"/>
+              </a:endParaRPr>
             </a:p>
             <a:p>
               <a:pPr algn="ctr"/>
@@ -9009,7 +9078,7 @@
             <a:p>
               <a:pPr algn="ctr"/>
               <a:r>
-                <a:rPr lang="de-DE" sz="1100" dirty="0">
+                <a:rPr lang="de-DE" sz="1100" dirty="0" err="1">
                   <a:solidFill>
                     <a:schemeClr val="tx1"/>
                   </a:solidFill>
@@ -9017,6 +9086,12 @@
                 </a:rPr>
                 <a:t>Testing</a:t>
               </a:r>
+              <a:endParaRPr lang="de-DE" sz="1100" dirty="0">
+                <a:solidFill>
+                  <a:schemeClr val="tx1"/>
+                </a:solidFill>
+                <a:latin typeface="SBB Light" pitchFamily="2" charset="0"/>
+              </a:endParaRPr>
             </a:p>
             <a:p>
               <a:pPr algn="ctr"/>
@@ -10727,7 +10802,7 @@
         </p:nvSpPr>
         <p:spPr>
           <a:xfrm>
-            <a:off x="5223642" y="2107196"/>
+            <a:off x="4300852" y="2107196"/>
             <a:ext cx="903400" cy="176592"/>
           </a:xfrm>
           <a:prstGeom prst="rect">
@@ -10931,7 +11006,7 @@
         </p:nvSpPr>
         <p:spPr>
           <a:xfrm>
-            <a:off x="4281051" y="1820492"/>
+            <a:off x="3358261" y="1820492"/>
             <a:ext cx="252549" cy="252549"/>
           </a:xfrm>
           <a:prstGeom prst="ellipse">
@@ -11001,7 +11076,7 @@
         </p:nvSpPr>
         <p:spPr>
           <a:xfrm>
-            <a:off x="5209276" y="1838454"/>
+            <a:off x="4286486" y="1838454"/>
             <a:ext cx="252549" cy="252549"/>
           </a:xfrm>
           <a:prstGeom prst="ellipse">
@@ -11492,7 +11567,7 @@
         </p:nvSpPr>
         <p:spPr>
           <a:xfrm>
-            <a:off x="4613346" y="1803723"/>
+            <a:off x="3690556" y="1803723"/>
             <a:ext cx="498599" cy="235995"/>
           </a:xfrm>
           <a:prstGeom prst="roundRect">
@@ -11556,7 +11631,7 @@
         </p:nvSpPr>
         <p:spPr>
           <a:xfrm>
-            <a:off x="5554717" y="1811988"/>
+            <a:off x="4631927" y="1811988"/>
             <a:ext cx="498599" cy="235995"/>
           </a:xfrm>
           <a:prstGeom prst="roundRect">
@@ -12256,8 +12331,8 @@
         </p:nvSpPr>
         <p:spPr>
           <a:xfrm>
-            <a:off x="1271587" y="2999263"/>
-            <a:ext cx="6596063" cy="176591"/>
+            <a:off x="1271587" y="3010082"/>
+            <a:ext cx="6779604" cy="185448"/>
           </a:xfrm>
           <a:prstGeom prst="rightArrow">
             <a:avLst>
@@ -12311,8 +12386,8 @@
         </p:nvSpPr>
         <p:spPr>
           <a:xfrm>
-            <a:off x="8669396" y="3003744"/>
-            <a:ext cx="2140968" cy="176591"/>
+            <a:off x="8960666" y="3003744"/>
+            <a:ext cx="1849697" cy="189449"/>
           </a:xfrm>
           <a:prstGeom prst="rightArrow">
             <a:avLst>
@@ -12733,7 +12808,7 @@
         </p:nvSpPr>
         <p:spPr>
           <a:xfrm>
-            <a:off x="3629810" y="2377057"/>
+            <a:off x="3629810" y="2637116"/>
             <a:ext cx="1532444" cy="209526"/>
           </a:xfrm>
           <a:prstGeom prst="roundRect">
@@ -13454,127 +13529,15 @@
         </p:nvGrpSpPr>
         <p:grpSpPr>
           <a:xfrm>
-            <a:off x="3349763" y="3665356"/>
-            <a:ext cx="914400" cy="1608399"/>
-            <a:chOff x="1097280" y="1092558"/>
-            <a:chExt cx="914400" cy="1608399"/>
+            <a:off x="3419867" y="4114070"/>
+            <a:ext cx="777240" cy="835132"/>
+            <a:chOff x="1167384" y="1541272"/>
+            <a:chExt cx="777240" cy="835132"/>
           </a:xfrm>
           <a:solidFill>
             <a:srgbClr val="5AC036"/>
           </a:solidFill>
         </p:grpSpPr>
-        <p:sp>
-          <p:nvSpPr>
-            <p:cNvPr id="228" name="Rechteck: abgerundete Ecken 227">
-              <a:extLst>
-                <a:ext uri="{FF2B5EF4-FFF2-40B4-BE49-F238E27FC236}">
-                  <a16:creationId xmlns:a16="http://schemas.microsoft.com/office/drawing/2014/main" id="{2F7E57F9-B664-C609-2773-9F98B42E6E04}"/>
-                </a:ext>
-              </a:extLst>
-            </p:cNvPr>
-            <p:cNvSpPr/>
-            <p:nvPr/>
-          </p:nvSpPr>
-          <p:spPr>
-            <a:xfrm>
-              <a:off x="1097280" y="1092558"/>
-              <a:ext cx="914400" cy="1608399"/>
-            </a:xfrm>
-            <a:prstGeom prst="roundRect">
-              <a:avLst/>
-            </a:prstGeom>
-            <a:grpFill/>
-            <a:ln>
-              <a:noFill/>
-            </a:ln>
-          </p:spPr>
-          <p:style>
-            <a:lnRef idx="2">
-              <a:schemeClr val="accent1">
-                <a:shade val="15000"/>
-              </a:schemeClr>
-            </a:lnRef>
-            <a:fillRef idx="1">
-              <a:schemeClr val="accent1"/>
-            </a:fillRef>
-            <a:effectRef idx="0">
-              <a:schemeClr val="accent1"/>
-            </a:effectRef>
-            <a:fontRef idx="minor">
-              <a:schemeClr val="lt1"/>
-            </a:fontRef>
-          </p:style>
-          <p:txBody>
-            <a:bodyPr lIns="36000" tIns="36000" rIns="36000" bIns="36000" rtlCol="0" anchor="t"/>
-            <a:lstStyle/>
-            <a:p>
-              <a:pPr algn="ctr"/>
-              <a:r>
-                <a:rPr lang="de-DE" sz="1100" dirty="0">
-                  <a:solidFill>
-                    <a:schemeClr val="tx1"/>
-                  </a:solidFill>
-                  <a:latin typeface="SBB Light" pitchFamily="2" charset="0"/>
-                </a:rPr>
-                <a:t>Architektur</a:t>
-              </a:r>
-            </a:p>
-            <a:p>
-              <a:pPr algn="ctr"/>
-              <a:endParaRPr lang="de-DE" sz="800" dirty="0">
-                <a:solidFill>
-                  <a:schemeClr val="tx1"/>
-                </a:solidFill>
-                <a:latin typeface="SBB Light" pitchFamily="2" charset="0"/>
-              </a:endParaRPr>
-            </a:p>
-            <a:p>
-              <a:pPr algn="ctr"/>
-              <a:endParaRPr lang="de-DE" sz="800" dirty="0">
-                <a:solidFill>
-                  <a:schemeClr val="tx1"/>
-                </a:solidFill>
-                <a:latin typeface="SBB Light" pitchFamily="2" charset="0"/>
-              </a:endParaRPr>
-            </a:p>
-            <a:p>
-              <a:pPr algn="ctr"/>
-              <a:endParaRPr lang="de-DE" sz="800" dirty="0">
-                <a:solidFill>
-                  <a:schemeClr val="tx1"/>
-                </a:solidFill>
-                <a:latin typeface="SBB Light" pitchFamily="2" charset="0"/>
-              </a:endParaRPr>
-            </a:p>
-            <a:p>
-              <a:pPr algn="ctr"/>
-              <a:endParaRPr lang="de-DE" sz="800" dirty="0">
-                <a:solidFill>
-                  <a:schemeClr val="tx1"/>
-                </a:solidFill>
-                <a:latin typeface="SBB Light" pitchFamily="2" charset="0"/>
-              </a:endParaRPr>
-            </a:p>
-            <a:p>
-              <a:pPr algn="ctr"/>
-              <a:r>
-                <a:rPr lang="de-DE" sz="800" dirty="0">
-                  <a:solidFill>
-                    <a:schemeClr val="tx1"/>
-                  </a:solidFill>
-                  <a:latin typeface="SBB Light" pitchFamily="2" charset="0"/>
-                </a:rPr>
-                <a:t>Workshop Puzzle</a:t>
-              </a:r>
-              <a:endParaRPr lang="de-DE" sz="800" dirty="0">
-                <a:solidFill>
-                  <a:srgbClr val="FF0000"/>
-                </a:solidFill>
-                <a:latin typeface="SBB Light" pitchFamily="2" charset="0"/>
-              </a:endParaRPr>
-            </a:p>
-          </p:txBody>
-        </p:sp>
         <p:cxnSp>
           <p:nvCxnSpPr>
             <p:cNvPr id="229" name="Gerader Verbinder 228">
@@ -13678,7 +13641,7 @@
         </p:nvGrpSpPr>
         <p:grpSpPr>
           <a:xfrm>
-            <a:off x="4279515" y="3665356"/>
+            <a:off x="3356725" y="3665356"/>
             <a:ext cx="914400" cy="1608399"/>
             <a:chOff x="1097280" y="1092558"/>
             <a:chExt cx="914400" cy="1608399"/>
@@ -13908,7 +13871,7 @@
         </p:nvGrpSpPr>
         <p:grpSpPr>
           <a:xfrm>
-            <a:off x="5210321" y="3665356"/>
+            <a:off x="4287531" y="3665356"/>
             <a:ext cx="914400" cy="1599517"/>
             <a:chOff x="1097280" y="1092558"/>
             <a:chExt cx="914400" cy="1599517"/>
@@ -14141,10 +14104,10 @@
       </p:grpSp>
       <p:grpSp>
         <p:nvGrpSpPr>
-          <p:cNvPr id="239" name="Gruppieren 238">
-            <a:extLst>
-              <a:ext uri="{FF2B5EF4-FFF2-40B4-BE49-F238E27FC236}">
-                <a16:creationId xmlns:a16="http://schemas.microsoft.com/office/drawing/2014/main" id="{0820E3D1-B002-297F-6C46-97FD615057C8}"/>
+          <p:cNvPr id="243" name="Gruppieren 242">
+            <a:extLst>
+              <a:ext uri="{FF2B5EF4-FFF2-40B4-BE49-F238E27FC236}">
+                <a16:creationId xmlns:a16="http://schemas.microsoft.com/office/drawing/2014/main" id="{E45F68CA-BBF2-9108-FE8C-D7DD8D879CA4}"/>
               </a:ext>
             </a:extLst>
           </p:cNvPr>
@@ -14153,251 +14116,16 @@
         </p:nvGrpSpPr>
         <p:grpSpPr>
           <a:xfrm>
-            <a:off x="3358004" y="485438"/>
-            <a:ext cx="914400" cy="1608398"/>
-            <a:chOff x="1097280" y="1092558"/>
-            <a:chExt cx="914400" cy="1608398"/>
-          </a:xfrm>
-        </p:grpSpPr>
-        <p:sp>
-          <p:nvSpPr>
-            <p:cNvPr id="240" name="Rechteck: abgerundete Ecken 239">
-              <a:extLst>
-                <a:ext uri="{FF2B5EF4-FFF2-40B4-BE49-F238E27FC236}">
-                  <a16:creationId xmlns:a16="http://schemas.microsoft.com/office/drawing/2014/main" id="{7C7E71E9-5E38-AFD9-902A-C20CE1E0E58E}"/>
-                </a:ext>
-              </a:extLst>
-            </p:cNvPr>
-            <p:cNvSpPr/>
-            <p:nvPr/>
-          </p:nvSpPr>
-          <p:spPr>
-            <a:xfrm>
-              <a:off x="1097280" y="1092558"/>
-              <a:ext cx="914400" cy="1608398"/>
-            </a:xfrm>
-            <a:prstGeom prst="roundRect">
-              <a:avLst/>
-            </a:prstGeom>
-            <a:solidFill>
-              <a:srgbClr val="FFD653"/>
-            </a:solidFill>
-            <a:ln>
-              <a:noFill/>
-            </a:ln>
-          </p:spPr>
-          <p:style>
-            <a:lnRef idx="2">
-              <a:schemeClr val="accent1">
-                <a:shade val="15000"/>
-              </a:schemeClr>
-            </a:lnRef>
-            <a:fillRef idx="1">
-              <a:schemeClr val="accent1"/>
-            </a:fillRef>
-            <a:effectRef idx="0">
-              <a:schemeClr val="accent1"/>
-            </a:effectRef>
-            <a:fontRef idx="minor">
-              <a:schemeClr val="lt1"/>
-            </a:fontRef>
-          </p:style>
-          <p:txBody>
-            <a:bodyPr lIns="36000" tIns="36000" rIns="36000" bIns="36000" rtlCol="0" anchor="t"/>
-            <a:lstStyle/>
-            <a:p>
-              <a:pPr algn="ctr"/>
-              <a:r>
-                <a:rPr lang="de-DE" sz="1100" dirty="0">
-                  <a:solidFill>
-                    <a:schemeClr val="tx1"/>
-                  </a:solidFill>
-                  <a:latin typeface="SBB Light" pitchFamily="2" charset="0"/>
-                </a:rPr>
-                <a:t>UX</a:t>
-              </a:r>
-            </a:p>
-            <a:p>
-              <a:pPr algn="ctr"/>
-              <a:endParaRPr lang="de-DE" sz="1000" dirty="0">
-                <a:solidFill>
-                  <a:schemeClr val="tx1"/>
-                </a:solidFill>
-                <a:latin typeface="SBB Light" pitchFamily="2" charset="0"/>
-              </a:endParaRPr>
-            </a:p>
-            <a:p>
-              <a:pPr algn="ctr"/>
-              <a:endParaRPr lang="de-DE" sz="800" dirty="0">
-                <a:solidFill>
-                  <a:schemeClr val="tx1"/>
-                </a:solidFill>
-                <a:latin typeface="SBB Light" pitchFamily="2" charset="0"/>
-              </a:endParaRPr>
-            </a:p>
-            <a:p>
-              <a:pPr algn="ctr"/>
-              <a:r>
-                <a:rPr lang="de-DE" sz="800" dirty="0">
-                  <a:solidFill>
-                    <a:schemeClr val="tx1"/>
-                  </a:solidFill>
-                  <a:latin typeface="SBB Light" pitchFamily="2" charset="0"/>
-                </a:rPr>
-                <a:t>UX</a:t>
-              </a:r>
-              <a:br>
-                <a:rPr lang="de-DE" sz="800" dirty="0">
-                  <a:solidFill>
-                    <a:schemeClr val="tx1"/>
-                  </a:solidFill>
-                  <a:latin typeface="SBB Light" pitchFamily="2" charset="0"/>
-                </a:rPr>
-              </a:br>
-              <a:r>
-                <a:rPr lang="de-DE" sz="800" dirty="0">
-                  <a:solidFill>
-                    <a:schemeClr val="tx1"/>
-                  </a:solidFill>
-                  <a:latin typeface="SBB Light" pitchFamily="2" charset="0"/>
-                </a:rPr>
-                <a:t>Benutzerforsch.</a:t>
-              </a:r>
-            </a:p>
-            <a:p>
-              <a:pPr algn="ctr"/>
-              <a:r>
-                <a:rPr lang="de-DE" sz="800" dirty="0">
-                  <a:solidFill>
-                    <a:schemeClr val="tx1"/>
-                  </a:solidFill>
-                  <a:latin typeface="SBB Light" pitchFamily="2" charset="0"/>
-                </a:rPr>
-                <a:t>Datenanalyse, </a:t>
-              </a:r>
-            </a:p>
-            <a:p>
-              <a:pPr algn="ctr"/>
-              <a:r>
-                <a:rPr lang="de-DE" sz="800" dirty="0">
-                  <a:solidFill>
-                    <a:schemeClr val="tx1"/>
-                  </a:solidFill>
-                  <a:latin typeface="SBB Light" pitchFamily="2" charset="0"/>
-                </a:rPr>
-                <a:t>Accessibility</a:t>
-              </a:r>
-            </a:p>
-          </p:txBody>
-        </p:sp>
-        <p:cxnSp>
-          <p:nvCxnSpPr>
-            <p:cNvPr id="241" name="Gerader Verbinder 240">
-              <a:extLst>
-                <a:ext uri="{FF2B5EF4-FFF2-40B4-BE49-F238E27FC236}">
-                  <a16:creationId xmlns:a16="http://schemas.microsoft.com/office/drawing/2014/main" id="{69E0E9C7-0A22-B1A6-3C7C-35B5ABBF7844}"/>
-                </a:ext>
-              </a:extLst>
-            </p:cNvPr>
-            <p:cNvCxnSpPr>
-              <a:cxnSpLocks/>
-            </p:cNvCxnSpPr>
-            <p:nvPr/>
-          </p:nvCxnSpPr>
-          <p:spPr>
-            <a:xfrm>
-              <a:off x="1167384" y="1541272"/>
-              <a:ext cx="777240" cy="0"/>
-            </a:xfrm>
-            <a:prstGeom prst="line">
-              <a:avLst/>
-            </a:prstGeom>
-            <a:ln>
-              <a:solidFill>
-                <a:schemeClr val="bg1"/>
-              </a:solidFill>
-            </a:ln>
-          </p:spPr>
-          <p:style>
-            <a:lnRef idx="2">
-              <a:schemeClr val="accent1"/>
-            </a:lnRef>
-            <a:fillRef idx="0">
-              <a:schemeClr val="accent1"/>
-            </a:fillRef>
-            <a:effectRef idx="1">
-              <a:schemeClr val="accent1"/>
-            </a:effectRef>
-            <a:fontRef idx="minor">
-              <a:schemeClr val="tx1"/>
-            </a:fontRef>
-          </p:style>
-        </p:cxnSp>
-        <p:cxnSp>
-          <p:nvCxnSpPr>
-            <p:cNvPr id="242" name="Gerader Verbinder 241">
-              <a:extLst>
-                <a:ext uri="{FF2B5EF4-FFF2-40B4-BE49-F238E27FC236}">
-                  <a16:creationId xmlns:a16="http://schemas.microsoft.com/office/drawing/2014/main" id="{DAB56C4A-C1AC-4948-07EC-DFFED6D77FE0}"/>
-                </a:ext>
-              </a:extLst>
-            </p:cNvPr>
-            <p:cNvCxnSpPr>
-              <a:cxnSpLocks/>
-            </p:cNvCxnSpPr>
-            <p:nvPr/>
-          </p:nvCxnSpPr>
-          <p:spPr>
-            <a:xfrm>
-              <a:off x="1167384" y="2376403"/>
-              <a:ext cx="777240" cy="0"/>
-            </a:xfrm>
-            <a:prstGeom prst="line">
-              <a:avLst/>
-            </a:prstGeom>
-            <a:ln>
-              <a:solidFill>
-                <a:schemeClr val="bg1"/>
-              </a:solidFill>
-            </a:ln>
-          </p:spPr>
-          <p:style>
-            <a:lnRef idx="2">
-              <a:schemeClr val="accent1"/>
-            </a:lnRef>
-            <a:fillRef idx="0">
-              <a:schemeClr val="accent1"/>
-            </a:fillRef>
-            <a:effectRef idx="1">
-              <a:schemeClr val="accent1"/>
-            </a:effectRef>
-            <a:fontRef idx="minor">
-              <a:schemeClr val="tx1"/>
-            </a:fontRef>
-          </p:style>
-        </p:cxnSp>
-      </p:grpSp>
-      <p:grpSp>
-        <p:nvGrpSpPr>
-          <p:cNvPr id="243" name="Gruppieren 242">
-            <a:extLst>
-              <a:ext uri="{FF2B5EF4-FFF2-40B4-BE49-F238E27FC236}">
-                <a16:creationId xmlns:a16="http://schemas.microsoft.com/office/drawing/2014/main" id="{E45F68CA-BBF2-9108-FE8C-D7DD8D879CA4}"/>
-              </a:ext>
-            </a:extLst>
-          </p:cNvPr>
-          <p:cNvGrpSpPr/>
-          <p:nvPr/>
-        </p:nvGrpSpPr>
-        <p:grpSpPr>
-          <a:xfrm>
-            <a:off x="6160420" y="3665356"/>
+            <a:off x="5237630" y="3665356"/>
             <a:ext cx="914400" cy="1608398"/>
             <a:chOff x="1097280" y="1092558"/>
             <a:chExt cx="914400" cy="1608398"/>
           </a:xfrm>
           <a:solidFill>
-            <a:srgbClr val="FFD653"/>
+            <a:schemeClr val="accent5">
+              <a:lumMod val="60000"/>
+              <a:lumOff val="40000"/>
+            </a:schemeClr>
           </a:solidFill>
         </p:grpSpPr>
         <p:sp>
@@ -14627,11 +14355,17 @@
         </p:nvGrpSpPr>
         <p:grpSpPr>
           <a:xfrm>
-            <a:off x="7092670" y="3665356"/>
+            <a:off x="6169880" y="3665356"/>
             <a:ext cx="914400" cy="1599517"/>
             <a:chOff x="1097280" y="1092558"/>
             <a:chExt cx="914400" cy="1599517"/>
           </a:xfrm>
+          <a:solidFill>
+            <a:schemeClr val="accent5">
+              <a:lumMod val="60000"/>
+              <a:lumOff val="40000"/>
+            </a:schemeClr>
+          </a:solidFill>
         </p:grpSpPr>
         <p:sp>
           <p:nvSpPr>
@@ -14653,9 +14387,7 @@
             <a:prstGeom prst="roundRect">
               <a:avLst/>
             </a:prstGeom>
-            <a:solidFill>
-              <a:srgbClr val="FFD653"/>
-            </a:solidFill>
+            <a:grpFill/>
             <a:ln>
               <a:noFill/>
             </a:ln>
@@ -14771,6 +14503,7 @@
             <a:prstGeom prst="line">
               <a:avLst/>
             </a:prstGeom>
+            <a:grpFill/>
             <a:ln>
               <a:solidFill>
                 <a:schemeClr val="bg1"/>
@@ -14814,6 +14547,7 @@
             <a:prstGeom prst="line">
               <a:avLst/>
             </a:prstGeom>
+            <a:grpFill/>
             <a:ln>
               <a:solidFill>
                 <a:schemeClr val="bg1"/>
@@ -14850,13 +14584,16 @@
         </p:nvGrpSpPr>
         <p:grpSpPr>
           <a:xfrm>
-            <a:off x="8019006" y="3665356"/>
+            <a:off x="7096216" y="3665356"/>
             <a:ext cx="914400" cy="1608398"/>
             <a:chOff x="1097280" y="1092558"/>
             <a:chExt cx="914400" cy="1608398"/>
           </a:xfrm>
           <a:solidFill>
-            <a:srgbClr val="FFD653"/>
+            <a:schemeClr val="accent5">
+              <a:lumMod val="60000"/>
+              <a:lumOff val="40000"/>
+            </a:schemeClr>
           </a:solidFill>
         </p:grpSpPr>
         <p:sp>
@@ -15103,7 +14840,7 @@
         </p:nvGrpSpPr>
         <p:grpSpPr>
           <a:xfrm>
-            <a:off x="8954691" y="3665356"/>
+            <a:off x="8031901" y="3665356"/>
             <a:ext cx="914400" cy="1608398"/>
             <a:chOff x="1097280" y="1092558"/>
             <a:chExt cx="914400" cy="1608398"/>
@@ -15327,13 +15064,16 @@
         </p:nvGrpSpPr>
         <p:grpSpPr>
           <a:xfrm>
-            <a:off x="9883457" y="3665356"/>
+            <a:off x="8960667" y="3665356"/>
             <a:ext cx="914400" cy="1608398"/>
             <a:chOff x="1097280" y="1092558"/>
             <a:chExt cx="914400" cy="1608398"/>
           </a:xfrm>
           <a:solidFill>
-            <a:srgbClr val="FFD653"/>
+            <a:schemeClr val="accent5">
+              <a:lumMod val="60000"/>
+              <a:lumOff val="40000"/>
+            </a:schemeClr>
           </a:solidFill>
         </p:grpSpPr>
         <p:sp>
@@ -15556,10 +15296,10 @@
       </p:grpSp>
       <p:sp>
         <p:nvSpPr>
-          <p:cNvPr id="265" name="Ellipse 264">
-            <a:extLst>
-              <a:ext uri="{FF2B5EF4-FFF2-40B4-BE49-F238E27FC236}">
-                <a16:creationId xmlns:a16="http://schemas.microsoft.com/office/drawing/2014/main" id="{8C9A56B1-FD3C-48D6-1311-E00FA41AFAF6}"/>
+          <p:cNvPr id="273" name="Rechteck 272">
+            <a:extLst>
+              <a:ext uri="{FF2B5EF4-FFF2-40B4-BE49-F238E27FC236}">
+                <a16:creationId xmlns:a16="http://schemas.microsoft.com/office/drawing/2014/main" id="{F076F8C5-9FB1-31D0-2582-88675739A37E}"/>
               </a:ext>
             </a:extLst>
           </p:cNvPr>
@@ -15568,7 +15308,208 @@
         </p:nvSpPr>
         <p:spPr>
           <a:xfrm>
-            <a:off x="3343041" y="5008586"/>
+            <a:off x="4287531" y="5290319"/>
+            <a:ext cx="903400" cy="176592"/>
+          </a:xfrm>
+          <a:prstGeom prst="rect">
+            <a:avLst/>
+          </a:prstGeom>
+          <a:solidFill>
+            <a:srgbClr val="5AC036"/>
+          </a:solidFill>
+          <a:ln>
+            <a:noFill/>
+          </a:ln>
+        </p:spPr>
+        <p:style>
+          <a:lnRef idx="2">
+            <a:schemeClr val="accent1">
+              <a:shade val="15000"/>
+            </a:schemeClr>
+          </a:lnRef>
+          <a:fillRef idx="1">
+            <a:schemeClr val="accent1"/>
+          </a:fillRef>
+          <a:effectRef idx="0">
+            <a:schemeClr val="accent1"/>
+          </a:effectRef>
+          <a:fontRef idx="minor">
+            <a:schemeClr val="lt1"/>
+          </a:fontRef>
+        </p:style>
+        <p:txBody>
+          <a:bodyPr rtlCol="0" anchor="ctr"/>
+          <a:lstStyle/>
+          <a:p>
+            <a:r>
+              <a:rPr lang="de-DE" sz="1000" dirty="0">
+                <a:solidFill>
+                  <a:schemeClr val="tx1"/>
+                </a:solidFill>
+                <a:latin typeface="SBB Light" pitchFamily="2" charset="0"/>
+              </a:rPr>
+              <a:t>Exam 5</a:t>
+            </a:r>
+            <a:endParaRPr lang="de-CH" sz="1000" dirty="0">
+              <a:solidFill>
+                <a:schemeClr val="tx1"/>
+              </a:solidFill>
+              <a:latin typeface="SBB Light" pitchFamily="2" charset="0"/>
+            </a:endParaRPr>
+          </a:p>
+        </p:txBody>
+      </p:sp>
+      <p:sp>
+        <p:nvSpPr>
+          <p:cNvPr id="274" name="Rechteck 273">
+            <a:extLst>
+              <a:ext uri="{FF2B5EF4-FFF2-40B4-BE49-F238E27FC236}">
+                <a16:creationId xmlns:a16="http://schemas.microsoft.com/office/drawing/2014/main" id="{AEC26FF5-0325-7865-5118-E90AF89FD721}"/>
+              </a:ext>
+            </a:extLst>
+          </p:cNvPr>
+          <p:cNvSpPr/>
+          <p:nvPr/>
+        </p:nvSpPr>
+        <p:spPr>
+          <a:xfrm>
+            <a:off x="6169880" y="5292171"/>
+            <a:ext cx="903400" cy="176592"/>
+          </a:xfrm>
+          <a:prstGeom prst="rect">
+            <a:avLst/>
+          </a:prstGeom>
+          <a:solidFill>
+            <a:schemeClr val="accent5">
+              <a:lumMod val="60000"/>
+              <a:lumOff val="40000"/>
+            </a:schemeClr>
+          </a:solidFill>
+          <a:ln>
+            <a:noFill/>
+          </a:ln>
+        </p:spPr>
+        <p:style>
+          <a:lnRef idx="2">
+            <a:schemeClr val="accent1">
+              <a:shade val="15000"/>
+            </a:schemeClr>
+          </a:lnRef>
+          <a:fillRef idx="1">
+            <a:schemeClr val="accent1"/>
+          </a:fillRef>
+          <a:effectRef idx="0">
+            <a:schemeClr val="accent1"/>
+          </a:effectRef>
+          <a:fontRef idx="minor">
+            <a:schemeClr val="lt1"/>
+          </a:fontRef>
+        </p:style>
+        <p:txBody>
+          <a:bodyPr rtlCol="0" anchor="ctr"/>
+          <a:lstStyle/>
+          <a:p>
+            <a:r>
+              <a:rPr lang="de-DE" sz="1000" dirty="0">
+                <a:solidFill>
+                  <a:schemeClr val="tx1"/>
+                </a:solidFill>
+                <a:latin typeface="SBB Light" pitchFamily="2" charset="0"/>
+              </a:rPr>
+              <a:t>Exam 1</a:t>
+            </a:r>
+            <a:endParaRPr lang="de-CH" sz="1000" dirty="0">
+              <a:solidFill>
+                <a:schemeClr val="tx1"/>
+              </a:solidFill>
+              <a:latin typeface="SBB Light" pitchFamily="2" charset="0"/>
+            </a:endParaRPr>
+          </a:p>
+        </p:txBody>
+      </p:sp>
+      <p:sp>
+        <p:nvSpPr>
+          <p:cNvPr id="275" name="Rechteck 274">
+            <a:extLst>
+              <a:ext uri="{FF2B5EF4-FFF2-40B4-BE49-F238E27FC236}">
+                <a16:creationId xmlns:a16="http://schemas.microsoft.com/office/drawing/2014/main" id="{907FA588-A234-C11A-265E-18F8566F8A56}"/>
+              </a:ext>
+            </a:extLst>
+          </p:cNvPr>
+          <p:cNvSpPr/>
+          <p:nvPr/>
+        </p:nvSpPr>
+        <p:spPr>
+          <a:xfrm>
+            <a:off x="8952043" y="5290319"/>
+            <a:ext cx="903400" cy="176592"/>
+          </a:xfrm>
+          <a:prstGeom prst="rect">
+            <a:avLst/>
+          </a:prstGeom>
+          <a:solidFill>
+            <a:schemeClr val="accent5">
+              <a:lumMod val="60000"/>
+              <a:lumOff val="40000"/>
+            </a:schemeClr>
+          </a:solidFill>
+          <a:ln>
+            <a:noFill/>
+          </a:ln>
+        </p:spPr>
+        <p:style>
+          <a:lnRef idx="2">
+            <a:schemeClr val="accent1">
+              <a:shade val="15000"/>
+            </a:schemeClr>
+          </a:lnRef>
+          <a:fillRef idx="1">
+            <a:schemeClr val="accent1"/>
+          </a:fillRef>
+          <a:effectRef idx="0">
+            <a:schemeClr val="accent1"/>
+          </a:effectRef>
+          <a:fontRef idx="minor">
+            <a:schemeClr val="lt1"/>
+          </a:fontRef>
+        </p:style>
+        <p:txBody>
+          <a:bodyPr rtlCol="0" anchor="ctr"/>
+          <a:lstStyle/>
+          <a:p>
+            <a:r>
+              <a:rPr lang="de-DE" sz="1000" dirty="0">
+                <a:solidFill>
+                  <a:schemeClr val="tx1"/>
+                </a:solidFill>
+                <a:latin typeface="SBB Light" pitchFamily="2" charset="0"/>
+              </a:rPr>
+              <a:t>Exam 3</a:t>
+            </a:r>
+            <a:endParaRPr lang="de-CH" sz="1000" dirty="0">
+              <a:solidFill>
+                <a:schemeClr val="tx1"/>
+              </a:solidFill>
+              <a:latin typeface="SBB Light" pitchFamily="2" charset="0"/>
+            </a:endParaRPr>
+          </a:p>
+        </p:txBody>
+      </p:sp>
+      <p:sp>
+        <p:nvSpPr>
+          <p:cNvPr id="276" name="Ellipse 275">
+            <a:extLst>
+              <a:ext uri="{FF2B5EF4-FFF2-40B4-BE49-F238E27FC236}">
+                <a16:creationId xmlns:a16="http://schemas.microsoft.com/office/drawing/2014/main" id="{12CD96D9-F380-146E-FDBB-81CAF53E1664}"/>
+              </a:ext>
+            </a:extLst>
+          </p:cNvPr>
+          <p:cNvSpPr/>
+          <p:nvPr/>
+        </p:nvSpPr>
+        <p:spPr>
+          <a:xfrm>
+            <a:off x="3344940" y="5003615"/>
             <a:ext cx="252549" cy="252549"/>
           </a:xfrm>
           <a:prstGeom prst="ellipse">
@@ -15626,10 +15567,10 @@
       </p:sp>
       <p:sp>
         <p:nvSpPr>
-          <p:cNvPr id="266" name="Rechteck: abgerundete Ecken 265">
-            <a:extLst>
-              <a:ext uri="{FF2B5EF4-FFF2-40B4-BE49-F238E27FC236}">
-                <a16:creationId xmlns:a16="http://schemas.microsoft.com/office/drawing/2014/main" id="{9C05B4B9-9E32-24EE-64B0-A37A12B4574F}"/>
+          <p:cNvPr id="277" name="Ellipse 276">
+            <a:extLst>
+              <a:ext uri="{FF2B5EF4-FFF2-40B4-BE49-F238E27FC236}">
+                <a16:creationId xmlns:a16="http://schemas.microsoft.com/office/drawing/2014/main" id="{31E4536F-5FAD-4A66-8CF3-68F6DDD66B07}"/>
               </a:ext>
             </a:extLst>
           </p:cNvPr>
@@ -15638,266 +15579,7 @@
         </p:nvSpPr>
         <p:spPr>
           <a:xfrm>
-            <a:off x="3680577" y="4980309"/>
-            <a:ext cx="498599" cy="235995"/>
-          </a:xfrm>
-          <a:prstGeom prst="roundRect">
-            <a:avLst/>
-          </a:prstGeom>
-          <a:solidFill>
-            <a:schemeClr val="bg1"/>
-          </a:solidFill>
-          <a:ln w="9525"/>
-        </p:spPr>
-        <p:style>
-          <a:lnRef idx="2">
-            <a:schemeClr val="accent1">
-              <a:shade val="15000"/>
-            </a:schemeClr>
-          </a:lnRef>
-          <a:fillRef idx="1">
-            <a:schemeClr val="accent1"/>
-          </a:fillRef>
-          <a:effectRef idx="0">
-            <a:schemeClr val="accent1"/>
-          </a:effectRef>
-          <a:fontRef idx="minor">
-            <a:schemeClr val="lt1"/>
-          </a:fontRef>
-        </p:style>
-        <p:txBody>
-          <a:bodyPr rtlCol="0" anchor="ctr"/>
-          <a:lstStyle/>
-          <a:p>
-            <a:pPr algn="ctr"/>
-            <a:r>
-              <a:rPr lang="de-DE" sz="1000" dirty="0">
-                <a:solidFill>
-                  <a:schemeClr val="tx1"/>
-                </a:solidFill>
-                <a:latin typeface="SBB Light" pitchFamily="2" charset="0"/>
-              </a:rPr>
-              <a:t>#J9</a:t>
-            </a:r>
-            <a:endParaRPr lang="de-CH" sz="1000" dirty="0">
-              <a:solidFill>
-                <a:schemeClr val="tx1"/>
-              </a:solidFill>
-              <a:latin typeface="SBB Light" pitchFamily="2" charset="0"/>
-            </a:endParaRPr>
-          </a:p>
-        </p:txBody>
-      </p:sp>
-      <p:sp>
-        <p:nvSpPr>
-          <p:cNvPr id="273" name="Rechteck 272">
-            <a:extLst>
-              <a:ext uri="{FF2B5EF4-FFF2-40B4-BE49-F238E27FC236}">
-                <a16:creationId xmlns:a16="http://schemas.microsoft.com/office/drawing/2014/main" id="{F076F8C5-9FB1-31D0-2582-88675739A37E}"/>
-              </a:ext>
-            </a:extLst>
-          </p:cNvPr>
-          <p:cNvSpPr/>
-          <p:nvPr/>
-        </p:nvSpPr>
-        <p:spPr>
-          <a:xfrm>
-            <a:off x="5210321" y="5290319"/>
-            <a:ext cx="903400" cy="176592"/>
-          </a:xfrm>
-          <a:prstGeom prst="rect">
-            <a:avLst/>
-          </a:prstGeom>
-          <a:solidFill>
-            <a:srgbClr val="5AC036"/>
-          </a:solidFill>
-          <a:ln>
-            <a:noFill/>
-          </a:ln>
-        </p:spPr>
-        <p:style>
-          <a:lnRef idx="2">
-            <a:schemeClr val="accent1">
-              <a:shade val="15000"/>
-            </a:schemeClr>
-          </a:lnRef>
-          <a:fillRef idx="1">
-            <a:schemeClr val="accent1"/>
-          </a:fillRef>
-          <a:effectRef idx="0">
-            <a:schemeClr val="accent1"/>
-          </a:effectRef>
-          <a:fontRef idx="minor">
-            <a:schemeClr val="lt1"/>
-          </a:fontRef>
-        </p:style>
-        <p:txBody>
-          <a:bodyPr rtlCol="0" anchor="ctr"/>
-          <a:lstStyle/>
-          <a:p>
-            <a:r>
-              <a:rPr lang="de-DE" sz="1000" dirty="0">
-                <a:solidFill>
-                  <a:schemeClr val="tx1"/>
-                </a:solidFill>
-                <a:latin typeface="SBB Light" pitchFamily="2" charset="0"/>
-              </a:rPr>
-              <a:t>Exam 5</a:t>
-            </a:r>
-            <a:endParaRPr lang="de-CH" sz="1000" dirty="0">
-              <a:solidFill>
-                <a:schemeClr val="tx1"/>
-              </a:solidFill>
-              <a:latin typeface="SBB Light" pitchFamily="2" charset="0"/>
-            </a:endParaRPr>
-          </a:p>
-        </p:txBody>
-      </p:sp>
-      <p:sp>
-        <p:nvSpPr>
-          <p:cNvPr id="274" name="Rechteck 273">
-            <a:extLst>
-              <a:ext uri="{FF2B5EF4-FFF2-40B4-BE49-F238E27FC236}">
-                <a16:creationId xmlns:a16="http://schemas.microsoft.com/office/drawing/2014/main" id="{AEC26FF5-0325-7865-5118-E90AF89FD721}"/>
-              </a:ext>
-            </a:extLst>
-          </p:cNvPr>
-          <p:cNvSpPr/>
-          <p:nvPr/>
-        </p:nvSpPr>
-        <p:spPr>
-          <a:xfrm>
-            <a:off x="7092670" y="5292171"/>
-            <a:ext cx="903400" cy="176592"/>
-          </a:xfrm>
-          <a:prstGeom prst="rect">
-            <a:avLst/>
-          </a:prstGeom>
-          <a:solidFill>
-            <a:srgbClr val="FFD653"/>
-          </a:solidFill>
-          <a:ln>
-            <a:noFill/>
-          </a:ln>
-        </p:spPr>
-        <p:style>
-          <a:lnRef idx="2">
-            <a:schemeClr val="accent1">
-              <a:shade val="15000"/>
-            </a:schemeClr>
-          </a:lnRef>
-          <a:fillRef idx="1">
-            <a:schemeClr val="accent1"/>
-          </a:fillRef>
-          <a:effectRef idx="0">
-            <a:schemeClr val="accent1"/>
-          </a:effectRef>
-          <a:fontRef idx="minor">
-            <a:schemeClr val="lt1"/>
-          </a:fontRef>
-        </p:style>
-        <p:txBody>
-          <a:bodyPr rtlCol="0" anchor="ctr"/>
-          <a:lstStyle/>
-          <a:p>
-            <a:r>
-              <a:rPr lang="de-DE" sz="1000" dirty="0">
-                <a:solidFill>
-                  <a:schemeClr val="tx1"/>
-                </a:solidFill>
-                <a:latin typeface="SBB Light" pitchFamily="2" charset="0"/>
-              </a:rPr>
-              <a:t>Exam 1</a:t>
-            </a:r>
-            <a:endParaRPr lang="de-CH" sz="1000" dirty="0">
-              <a:solidFill>
-                <a:schemeClr val="tx1"/>
-              </a:solidFill>
-              <a:latin typeface="SBB Light" pitchFamily="2" charset="0"/>
-            </a:endParaRPr>
-          </a:p>
-        </p:txBody>
-      </p:sp>
-      <p:sp>
-        <p:nvSpPr>
-          <p:cNvPr id="275" name="Rechteck 274">
-            <a:extLst>
-              <a:ext uri="{FF2B5EF4-FFF2-40B4-BE49-F238E27FC236}">
-                <a16:creationId xmlns:a16="http://schemas.microsoft.com/office/drawing/2014/main" id="{907FA588-A234-C11A-265E-18F8566F8A56}"/>
-              </a:ext>
-            </a:extLst>
-          </p:cNvPr>
-          <p:cNvSpPr/>
-          <p:nvPr/>
-        </p:nvSpPr>
-        <p:spPr>
-          <a:xfrm>
-            <a:off x="9874833" y="5290319"/>
-            <a:ext cx="903400" cy="176592"/>
-          </a:xfrm>
-          <a:prstGeom prst="rect">
-            <a:avLst/>
-          </a:prstGeom>
-          <a:solidFill>
-            <a:srgbClr val="FFD653"/>
-          </a:solidFill>
-          <a:ln>
-            <a:noFill/>
-          </a:ln>
-        </p:spPr>
-        <p:style>
-          <a:lnRef idx="2">
-            <a:schemeClr val="accent1">
-              <a:shade val="15000"/>
-            </a:schemeClr>
-          </a:lnRef>
-          <a:fillRef idx="1">
-            <a:schemeClr val="accent1"/>
-          </a:fillRef>
-          <a:effectRef idx="0">
-            <a:schemeClr val="accent1"/>
-          </a:effectRef>
-          <a:fontRef idx="minor">
-            <a:schemeClr val="lt1"/>
-          </a:fontRef>
-        </p:style>
-        <p:txBody>
-          <a:bodyPr rtlCol="0" anchor="ctr"/>
-          <a:lstStyle/>
-          <a:p>
-            <a:r>
-              <a:rPr lang="de-DE" sz="1000" dirty="0">
-                <a:solidFill>
-                  <a:schemeClr val="tx1"/>
-                </a:solidFill>
-                <a:latin typeface="SBB Light" pitchFamily="2" charset="0"/>
-              </a:rPr>
-              <a:t>Exam 3</a:t>
-            </a:r>
-            <a:endParaRPr lang="de-CH" sz="1000" dirty="0">
-              <a:solidFill>
-                <a:schemeClr val="tx1"/>
-              </a:solidFill>
-              <a:latin typeface="SBB Light" pitchFamily="2" charset="0"/>
-            </a:endParaRPr>
-          </a:p>
-        </p:txBody>
-      </p:sp>
-      <p:sp>
-        <p:nvSpPr>
-          <p:cNvPr id="276" name="Ellipse 275">
-            <a:extLst>
-              <a:ext uri="{FF2B5EF4-FFF2-40B4-BE49-F238E27FC236}">
-                <a16:creationId xmlns:a16="http://schemas.microsoft.com/office/drawing/2014/main" id="{12CD96D9-F380-146E-FDBB-81CAF53E1664}"/>
-              </a:ext>
-            </a:extLst>
-          </p:cNvPr>
-          <p:cNvSpPr/>
-          <p:nvPr/>
-        </p:nvSpPr>
-        <p:spPr>
-          <a:xfrm>
-            <a:off x="4267730" y="5003615"/>
+            <a:off x="4273165" y="5021577"/>
             <a:ext cx="252549" cy="252549"/>
           </a:xfrm>
           <a:prstGeom prst="ellipse">
@@ -15955,10 +15637,10 @@
       </p:sp>
       <p:sp>
         <p:nvSpPr>
-          <p:cNvPr id="277" name="Ellipse 276">
-            <a:extLst>
-              <a:ext uri="{FF2B5EF4-FFF2-40B4-BE49-F238E27FC236}">
-                <a16:creationId xmlns:a16="http://schemas.microsoft.com/office/drawing/2014/main" id="{31E4536F-5FAD-4A66-8CF3-68F6DDD66B07}"/>
+          <p:cNvPr id="279" name="Ellipse 278">
+            <a:extLst>
+              <a:ext uri="{FF2B5EF4-FFF2-40B4-BE49-F238E27FC236}">
+                <a16:creationId xmlns:a16="http://schemas.microsoft.com/office/drawing/2014/main" id="{9BB9BD7A-8518-34F3-6ED3-17BFAA9FC375}"/>
               </a:ext>
             </a:extLst>
           </p:cNvPr>
@@ -15967,77 +15649,7 @@
         </p:nvSpPr>
         <p:spPr>
           <a:xfrm>
-            <a:off x="5195955" y="5021577"/>
-            <a:ext cx="252549" cy="252549"/>
-          </a:xfrm>
-          <a:prstGeom prst="ellipse">
-            <a:avLst/>
-          </a:prstGeom>
-          <a:solidFill>
-            <a:schemeClr val="bg1">
-              <a:lumMod val="75000"/>
-            </a:schemeClr>
-          </a:solidFill>
-          <a:ln>
-            <a:solidFill>
-              <a:schemeClr val="bg1"/>
-            </a:solidFill>
-          </a:ln>
-        </p:spPr>
-        <p:style>
-          <a:lnRef idx="2">
-            <a:schemeClr val="accent1">
-              <a:shade val="15000"/>
-            </a:schemeClr>
-          </a:lnRef>
-          <a:fillRef idx="1">
-            <a:schemeClr val="accent1"/>
-          </a:fillRef>
-          <a:effectRef idx="0">
-            <a:schemeClr val="accent1"/>
-          </a:effectRef>
-          <a:fontRef idx="minor">
-            <a:schemeClr val="lt1"/>
-          </a:fontRef>
-        </p:style>
-        <p:txBody>
-          <a:bodyPr rtlCol="0" anchor="ctr"/>
-          <a:lstStyle/>
-          <a:p>
-            <a:pPr algn="ctr"/>
-            <a:r>
-              <a:rPr lang="de-DE" sz="1000" b="1" dirty="0">
-                <a:solidFill>
-                  <a:schemeClr val="bg1"/>
-                </a:solidFill>
-                <a:latin typeface="SBB Light" pitchFamily="2" charset="0"/>
-              </a:rPr>
-              <a:t>4</a:t>
-            </a:r>
-            <a:endParaRPr lang="de-CH" sz="1000" b="1" dirty="0">
-              <a:solidFill>
-                <a:schemeClr val="bg1"/>
-              </a:solidFill>
-              <a:latin typeface="SBB Light" pitchFamily="2" charset="0"/>
-            </a:endParaRPr>
-          </a:p>
-        </p:txBody>
-      </p:sp>
-      <p:sp>
-        <p:nvSpPr>
-          <p:cNvPr id="278" name="Ellipse 277">
-            <a:extLst>
-              <a:ext uri="{FF2B5EF4-FFF2-40B4-BE49-F238E27FC236}">
-                <a16:creationId xmlns:a16="http://schemas.microsoft.com/office/drawing/2014/main" id="{32F86C01-C858-1987-372B-D2D61D769834}"/>
-              </a:ext>
-            </a:extLst>
-          </p:cNvPr>
-          <p:cNvSpPr/>
-          <p:nvPr/>
-        </p:nvSpPr>
-        <p:spPr>
-          <a:xfrm>
-            <a:off x="3380785" y="1835163"/>
+            <a:off x="5236468" y="5012324"/>
             <a:ext cx="252549" cy="252549"/>
           </a:xfrm>
           <a:prstGeom prst="ellipse">
@@ -16096,10 +15708,10 @@
       </p:sp>
       <p:sp>
         <p:nvSpPr>
-          <p:cNvPr id="279" name="Ellipse 278">
-            <a:extLst>
-              <a:ext uri="{FF2B5EF4-FFF2-40B4-BE49-F238E27FC236}">
-                <a16:creationId xmlns:a16="http://schemas.microsoft.com/office/drawing/2014/main" id="{9BB9BD7A-8518-34F3-6ED3-17BFAA9FC375}"/>
+          <p:cNvPr id="280" name="Ellipse 279">
+            <a:extLst>
+              <a:ext uri="{FF2B5EF4-FFF2-40B4-BE49-F238E27FC236}">
+                <a16:creationId xmlns:a16="http://schemas.microsoft.com/office/drawing/2014/main" id="{DAD21ACB-D566-E4B3-1C45-3252DF5CF6A2}"/>
               </a:ext>
             </a:extLst>
           </p:cNvPr>
@@ -16108,7 +15720,7 @@
         </p:nvSpPr>
         <p:spPr>
           <a:xfrm>
-            <a:off x="6159258" y="5012324"/>
+            <a:off x="6170731" y="5012324"/>
             <a:ext cx="252549" cy="252549"/>
           </a:xfrm>
           <a:prstGeom prst="ellipse">
@@ -16167,10 +15779,10 @@
       </p:sp>
       <p:sp>
         <p:nvSpPr>
-          <p:cNvPr id="280" name="Ellipse 279">
-            <a:extLst>
-              <a:ext uri="{FF2B5EF4-FFF2-40B4-BE49-F238E27FC236}">
-                <a16:creationId xmlns:a16="http://schemas.microsoft.com/office/drawing/2014/main" id="{DAD21ACB-D566-E4B3-1C45-3252DF5CF6A2}"/>
+          <p:cNvPr id="281" name="Ellipse 280">
+            <a:extLst>
+              <a:ext uri="{FF2B5EF4-FFF2-40B4-BE49-F238E27FC236}">
+                <a16:creationId xmlns:a16="http://schemas.microsoft.com/office/drawing/2014/main" id="{61B54EC7-3BE4-4F85-93AA-970D790FEF7F}"/>
               </a:ext>
             </a:extLst>
           </p:cNvPr>
@@ -16179,7 +15791,7 @@
         </p:nvSpPr>
         <p:spPr>
           <a:xfrm>
-            <a:off x="7093521" y="5012324"/>
+            <a:off x="7083441" y="5021644"/>
             <a:ext cx="252549" cy="252549"/>
           </a:xfrm>
           <a:prstGeom prst="ellipse">
@@ -16225,7 +15837,7 @@
                 </a:solidFill>
                 <a:latin typeface="SBB Light" pitchFamily="2" charset="0"/>
               </a:rPr>
-              <a:t>0</a:t>
+              <a:t>1</a:t>
             </a:r>
             <a:endParaRPr lang="de-CH" sz="1000" b="1" dirty="0">
               <a:solidFill>
@@ -16238,10 +15850,10 @@
       </p:sp>
       <p:sp>
         <p:nvSpPr>
-          <p:cNvPr id="281" name="Ellipse 280">
-            <a:extLst>
-              <a:ext uri="{FF2B5EF4-FFF2-40B4-BE49-F238E27FC236}">
-                <a16:creationId xmlns:a16="http://schemas.microsoft.com/office/drawing/2014/main" id="{61B54EC7-3BE4-4F85-93AA-970D790FEF7F}"/>
+          <p:cNvPr id="282" name="Ellipse 281">
+            <a:extLst>
+              <a:ext uri="{FF2B5EF4-FFF2-40B4-BE49-F238E27FC236}">
+                <a16:creationId xmlns:a16="http://schemas.microsoft.com/office/drawing/2014/main" id="{4039402A-B998-FCC4-F90D-3D4F30BE77A8}"/>
               </a:ext>
             </a:extLst>
           </p:cNvPr>
@@ -16250,7 +15862,7 @@
         </p:nvSpPr>
         <p:spPr>
           <a:xfrm>
-            <a:off x="8006231" y="5021644"/>
+            <a:off x="8962256" y="5004159"/>
             <a:ext cx="252549" cy="252549"/>
           </a:xfrm>
           <a:prstGeom prst="ellipse">
@@ -16296,77 +15908,6 @@
                 </a:solidFill>
                 <a:latin typeface="SBB Light" pitchFamily="2" charset="0"/>
               </a:rPr>
-              <a:t>1</a:t>
-            </a:r>
-            <a:endParaRPr lang="de-CH" sz="1000" b="1" dirty="0">
-              <a:solidFill>
-                <a:schemeClr val="bg1"/>
-              </a:solidFill>
-              <a:latin typeface="SBB Light" pitchFamily="2" charset="0"/>
-            </a:endParaRPr>
-          </a:p>
-        </p:txBody>
-      </p:sp>
-      <p:sp>
-        <p:nvSpPr>
-          <p:cNvPr id="282" name="Ellipse 281">
-            <a:extLst>
-              <a:ext uri="{FF2B5EF4-FFF2-40B4-BE49-F238E27FC236}">
-                <a16:creationId xmlns:a16="http://schemas.microsoft.com/office/drawing/2014/main" id="{4039402A-B998-FCC4-F90D-3D4F30BE77A8}"/>
-              </a:ext>
-            </a:extLst>
-          </p:cNvPr>
-          <p:cNvSpPr/>
-          <p:nvPr/>
-        </p:nvSpPr>
-        <p:spPr>
-          <a:xfrm>
-            <a:off x="9885046" y="5004159"/>
-            <a:ext cx="252549" cy="252549"/>
-          </a:xfrm>
-          <a:prstGeom prst="ellipse">
-            <a:avLst/>
-          </a:prstGeom>
-          <a:solidFill>
-            <a:srgbClr val="FFCC66"/>
-          </a:solidFill>
-          <a:ln>
-            <a:solidFill>
-              <a:schemeClr val="accent2">
-                <a:lumMod val="60000"/>
-                <a:lumOff val="40000"/>
-              </a:schemeClr>
-            </a:solidFill>
-          </a:ln>
-        </p:spPr>
-        <p:style>
-          <a:lnRef idx="2">
-            <a:schemeClr val="accent1">
-              <a:shade val="15000"/>
-            </a:schemeClr>
-          </a:lnRef>
-          <a:fillRef idx="1">
-            <a:schemeClr val="accent1"/>
-          </a:fillRef>
-          <a:effectRef idx="0">
-            <a:schemeClr val="accent1"/>
-          </a:effectRef>
-          <a:fontRef idx="minor">
-            <a:schemeClr val="lt1"/>
-          </a:fontRef>
-        </p:style>
-        <p:txBody>
-          <a:bodyPr rtlCol="0" anchor="ctr"/>
-          <a:lstStyle/>
-          <a:p>
-            <a:pPr algn="ctr"/>
-            <a:r>
-              <a:rPr lang="de-DE" sz="1000" b="1" dirty="0">
-                <a:solidFill>
-                  <a:schemeClr val="bg1"/>
-                </a:solidFill>
-                <a:latin typeface="SBB Light" pitchFamily="2" charset="0"/>
-              </a:rPr>
               <a:t>2</a:t>
             </a:r>
             <a:endParaRPr lang="de-CH" sz="1000" b="1" dirty="0">
@@ -16392,7 +15933,7 @@
         </p:nvSpPr>
         <p:spPr>
           <a:xfrm>
-            <a:off x="8946524" y="5021206"/>
+            <a:off x="8023734" y="5021206"/>
             <a:ext cx="252549" cy="252549"/>
           </a:xfrm>
           <a:prstGeom prst="ellipse">
@@ -16463,7 +16004,7 @@
         </p:nvSpPr>
         <p:spPr>
           <a:xfrm>
-            <a:off x="4600025" y="4986846"/>
+            <a:off x="3677235" y="4986846"/>
             <a:ext cx="498599" cy="235995"/>
           </a:xfrm>
           <a:prstGeom prst="roundRect">
@@ -16527,7 +16068,7 @@
         </p:nvSpPr>
         <p:spPr>
           <a:xfrm>
-            <a:off x="5541396" y="4995111"/>
+            <a:off x="4618606" y="4995111"/>
             <a:ext cx="498599" cy="235995"/>
           </a:xfrm>
           <a:prstGeom prst="roundRect">
@@ -16579,10 +16120,10 @@
       </p:sp>
       <p:sp>
         <p:nvSpPr>
-          <p:cNvPr id="286" name="Rechteck: abgerundete Ecken 285">
-            <a:extLst>
-              <a:ext uri="{FF2B5EF4-FFF2-40B4-BE49-F238E27FC236}">
-                <a16:creationId xmlns:a16="http://schemas.microsoft.com/office/drawing/2014/main" id="{60D0597F-CBEE-77BD-C752-20BA3F456121}"/>
+          <p:cNvPr id="287" name="Rechteck: abgerundete Ecken 286">
+            <a:extLst>
+              <a:ext uri="{FF2B5EF4-FFF2-40B4-BE49-F238E27FC236}">
+                <a16:creationId xmlns:a16="http://schemas.microsoft.com/office/drawing/2014/main" id="{EC9F7846-4B2F-AC59-A87A-FAF7E58A97EA}"/>
               </a:ext>
             </a:extLst>
           </p:cNvPr>
@@ -16591,7 +16132,7 @@
         </p:nvSpPr>
         <p:spPr>
           <a:xfrm>
-            <a:off x="3737705" y="1814749"/>
+            <a:off x="5583079" y="4992540"/>
             <a:ext cx="498599" cy="235995"/>
           </a:xfrm>
           <a:prstGeom prst="roundRect">
@@ -16630,7 +16171,7 @@
                 </a:solidFill>
                 <a:latin typeface="SBB Light" pitchFamily="2" charset="0"/>
               </a:rPr>
-              <a:t>#F1</a:t>
+              <a:t>#F2</a:t>
             </a:r>
             <a:endParaRPr lang="de-CH" sz="1000" dirty="0">
               <a:solidFill>
@@ -16643,10 +16184,10 @@
       </p:sp>
       <p:sp>
         <p:nvSpPr>
-          <p:cNvPr id="287" name="Rechteck: abgerundete Ecken 286">
-            <a:extLst>
-              <a:ext uri="{FF2B5EF4-FFF2-40B4-BE49-F238E27FC236}">
-                <a16:creationId xmlns:a16="http://schemas.microsoft.com/office/drawing/2014/main" id="{EC9F7846-4B2F-AC59-A87A-FAF7E58A97EA}"/>
+          <p:cNvPr id="288" name="Rechteck: abgerundete Ecken 287">
+            <a:extLst>
+              <a:ext uri="{FF2B5EF4-FFF2-40B4-BE49-F238E27FC236}">
+                <a16:creationId xmlns:a16="http://schemas.microsoft.com/office/drawing/2014/main" id="{5F07765F-3DC5-4DF5-05E3-607C72C0D00A}"/>
               </a:ext>
             </a:extLst>
           </p:cNvPr>
@@ -16655,7 +16196,7 @@
         </p:nvSpPr>
         <p:spPr>
           <a:xfrm>
-            <a:off x="6505869" y="4992540"/>
+            <a:off x="6504956" y="4982870"/>
             <a:ext cx="498599" cy="235995"/>
           </a:xfrm>
           <a:prstGeom prst="roundRect">
@@ -16694,7 +16235,7 @@
                 </a:solidFill>
                 <a:latin typeface="SBB Light" pitchFamily="2" charset="0"/>
               </a:rPr>
-              <a:t>#F2</a:t>
+              <a:t>#F3</a:t>
             </a:r>
             <a:endParaRPr lang="de-CH" sz="1000" dirty="0">
               <a:solidFill>
@@ -16707,10 +16248,10 @@
       </p:sp>
       <p:sp>
         <p:nvSpPr>
-          <p:cNvPr id="288" name="Rechteck: abgerundete Ecken 287">
-            <a:extLst>
-              <a:ext uri="{FF2B5EF4-FFF2-40B4-BE49-F238E27FC236}">
-                <a16:creationId xmlns:a16="http://schemas.microsoft.com/office/drawing/2014/main" id="{5F07765F-3DC5-4DF5-05E3-607C72C0D00A}"/>
+          <p:cNvPr id="289" name="Rechteck: abgerundete Ecken 288">
+            <a:extLst>
+              <a:ext uri="{FF2B5EF4-FFF2-40B4-BE49-F238E27FC236}">
+                <a16:creationId xmlns:a16="http://schemas.microsoft.com/office/drawing/2014/main" id="{998C8571-9785-47C0-AAC0-35F3166F5BE3}"/>
               </a:ext>
             </a:extLst>
           </p:cNvPr>
@@ -16719,7 +16260,7 @@
         </p:nvSpPr>
         <p:spPr>
           <a:xfrm>
-            <a:off x="7427746" y="4982870"/>
+            <a:off x="7437111" y="4982870"/>
             <a:ext cx="498599" cy="235995"/>
           </a:xfrm>
           <a:prstGeom prst="roundRect">
@@ -16758,7 +16299,7 @@
                 </a:solidFill>
                 <a:latin typeface="SBB Light" pitchFamily="2" charset="0"/>
               </a:rPr>
-              <a:t>#F3</a:t>
+              <a:t>#F4</a:t>
             </a:r>
             <a:endParaRPr lang="de-CH" sz="1000" dirty="0">
               <a:solidFill>
@@ -16771,10 +16312,10 @@
       </p:sp>
       <p:sp>
         <p:nvSpPr>
-          <p:cNvPr id="289" name="Rechteck: abgerundete Ecken 288">
-            <a:extLst>
-              <a:ext uri="{FF2B5EF4-FFF2-40B4-BE49-F238E27FC236}">
-                <a16:creationId xmlns:a16="http://schemas.microsoft.com/office/drawing/2014/main" id="{998C8571-9785-47C0-AAC0-35F3166F5BE3}"/>
+          <p:cNvPr id="290" name="Rechteck: abgerundete Ecken 289">
+            <a:extLst>
+              <a:ext uri="{FF2B5EF4-FFF2-40B4-BE49-F238E27FC236}">
+                <a16:creationId xmlns:a16="http://schemas.microsoft.com/office/drawing/2014/main" id="{72599F34-80C7-61DF-01A8-68828305277C}"/>
               </a:ext>
             </a:extLst>
           </p:cNvPr>
@@ -16783,7 +16324,7 @@
         </p:nvSpPr>
         <p:spPr>
           <a:xfrm>
-            <a:off x="8359901" y="4982870"/>
+            <a:off x="8369175" y="4994666"/>
             <a:ext cx="498599" cy="235995"/>
           </a:xfrm>
           <a:prstGeom prst="roundRect">
@@ -16822,7 +16363,7 @@
                 </a:solidFill>
                 <a:latin typeface="SBB Light" pitchFamily="2" charset="0"/>
               </a:rPr>
-              <a:t>#F4</a:t>
+              <a:t>#Ü2</a:t>
             </a:r>
             <a:endParaRPr lang="de-CH" sz="1000" dirty="0">
               <a:solidFill>
@@ -16835,10 +16376,10 @@
       </p:sp>
       <p:sp>
         <p:nvSpPr>
-          <p:cNvPr id="290" name="Rechteck: abgerundete Ecken 289">
-            <a:extLst>
-              <a:ext uri="{FF2B5EF4-FFF2-40B4-BE49-F238E27FC236}">
-                <a16:creationId xmlns:a16="http://schemas.microsoft.com/office/drawing/2014/main" id="{72599F34-80C7-61DF-01A8-68828305277C}"/>
+          <p:cNvPr id="291" name="Rechteck: abgerundete Ecken 290">
+            <a:extLst>
+              <a:ext uri="{FF2B5EF4-FFF2-40B4-BE49-F238E27FC236}">
+                <a16:creationId xmlns:a16="http://schemas.microsoft.com/office/drawing/2014/main" id="{29237D60-4DD5-5AFA-EAFD-A672367E751B}"/>
               </a:ext>
             </a:extLst>
           </p:cNvPr>
@@ -16847,7 +16388,7 @@
         </p:nvSpPr>
         <p:spPr>
           <a:xfrm>
-            <a:off x="9291965" y="4994666"/>
+            <a:off x="9269389" y="5003615"/>
             <a:ext cx="498599" cy="235995"/>
           </a:xfrm>
           <a:prstGeom prst="roundRect">
@@ -16886,70 +16427,6 @@
                 </a:solidFill>
                 <a:latin typeface="SBB Light" pitchFamily="2" charset="0"/>
               </a:rPr>
-              <a:t>#Ü2</a:t>
-            </a:r>
-            <a:endParaRPr lang="de-CH" sz="1000" dirty="0">
-              <a:solidFill>
-                <a:schemeClr val="tx1"/>
-              </a:solidFill>
-              <a:latin typeface="SBB Light" pitchFamily="2" charset="0"/>
-            </a:endParaRPr>
-          </a:p>
-        </p:txBody>
-      </p:sp>
-      <p:sp>
-        <p:nvSpPr>
-          <p:cNvPr id="291" name="Rechteck: abgerundete Ecken 290">
-            <a:extLst>
-              <a:ext uri="{FF2B5EF4-FFF2-40B4-BE49-F238E27FC236}">
-                <a16:creationId xmlns:a16="http://schemas.microsoft.com/office/drawing/2014/main" id="{29237D60-4DD5-5AFA-EAFD-A672367E751B}"/>
-              </a:ext>
-            </a:extLst>
-          </p:cNvPr>
-          <p:cNvSpPr/>
-          <p:nvPr/>
-        </p:nvSpPr>
-        <p:spPr>
-          <a:xfrm>
-            <a:off x="10192179" y="5003615"/>
-            <a:ext cx="498599" cy="235995"/>
-          </a:xfrm>
-          <a:prstGeom prst="roundRect">
-            <a:avLst/>
-          </a:prstGeom>
-          <a:solidFill>
-            <a:schemeClr val="bg1"/>
-          </a:solidFill>
-          <a:ln w="9525"/>
-        </p:spPr>
-        <p:style>
-          <a:lnRef idx="2">
-            <a:schemeClr val="accent1">
-              <a:shade val="15000"/>
-            </a:schemeClr>
-          </a:lnRef>
-          <a:fillRef idx="1">
-            <a:schemeClr val="accent1"/>
-          </a:fillRef>
-          <a:effectRef idx="0">
-            <a:schemeClr val="accent1"/>
-          </a:effectRef>
-          <a:fontRef idx="minor">
-            <a:schemeClr val="lt1"/>
-          </a:fontRef>
-        </p:style>
-        <p:txBody>
-          <a:bodyPr rtlCol="0" anchor="ctr"/>
-          <a:lstStyle/>
-          <a:p>
-            <a:pPr algn="ctr"/>
-            <a:r>
-              <a:rPr lang="de-DE" sz="1000" dirty="0">
-                <a:solidFill>
-                  <a:schemeClr val="tx1"/>
-                </a:solidFill>
-                <a:latin typeface="SBB Light" pitchFamily="2" charset="0"/>
-              </a:rPr>
               <a:t>#F5</a:t>
             </a:r>
             <a:endParaRPr lang="de-CH" sz="1000" dirty="0">
@@ -16975,8 +16452,8 @@
         </p:nvSpPr>
         <p:spPr>
           <a:xfrm>
-            <a:off x="573821" y="6168584"/>
-            <a:ext cx="8348717" cy="176591"/>
+            <a:off x="573822" y="6160195"/>
+            <a:ext cx="7477370" cy="175093"/>
           </a:xfrm>
           <a:prstGeom prst="rightArrow">
             <a:avLst>
@@ -17298,14 +16775,17 @@
         </p:nvSpPr>
         <p:spPr>
           <a:xfrm>
-            <a:off x="8019139" y="5280929"/>
+            <a:off x="7096349" y="5280929"/>
             <a:ext cx="903400" cy="176592"/>
           </a:xfrm>
           <a:prstGeom prst="rect">
             <a:avLst/>
           </a:prstGeom>
           <a:solidFill>
-            <a:srgbClr val="FFD653"/>
+            <a:schemeClr val="accent5">
+              <a:lumMod val="60000"/>
+              <a:lumOff val="40000"/>
+            </a:schemeClr>
           </a:solidFill>
           <a:ln>
             <a:noFill/>
@@ -17363,8 +16843,8 @@
         </p:nvSpPr>
         <p:spPr>
           <a:xfrm>
-            <a:off x="9749313" y="6165555"/>
-            <a:ext cx="2263909" cy="176591"/>
+            <a:off x="8946300" y="6157166"/>
+            <a:ext cx="2104269" cy="169550"/>
           </a:xfrm>
           <a:prstGeom prst="rightArrow">
             <a:avLst>
@@ -17460,8 +16940,8 @@
         </p:nvGrpSpPr>
         <p:grpSpPr>
           <a:xfrm>
-            <a:off x="10969948" y="3665356"/>
-            <a:ext cx="914400" cy="1608398"/>
+            <a:off x="9896156" y="3665356"/>
+            <a:ext cx="1154414" cy="1608398"/>
             <a:chOff x="1097280" y="1092558"/>
             <a:chExt cx="914400" cy="1608398"/>
           </a:xfrm>
@@ -17669,7 +17149,7 @@
         </p:nvSpPr>
         <p:spPr>
           <a:xfrm>
-            <a:off x="10969948" y="5021577"/>
+            <a:off x="9896156" y="5021577"/>
             <a:ext cx="252549" cy="252549"/>
           </a:xfrm>
           <a:prstGeom prst="ellipse">
@@ -17739,7 +17219,7 @@
         </p:nvSpPr>
         <p:spPr>
           <a:xfrm>
-            <a:off x="11235615" y="5021205"/>
+            <a:off x="10161823" y="5021205"/>
             <a:ext cx="252549" cy="252549"/>
           </a:xfrm>
           <a:prstGeom prst="ellipse">
@@ -17810,8 +17290,8 @@
         </p:nvSpPr>
         <p:spPr>
           <a:xfrm>
-            <a:off x="5143257" y="6191783"/>
-            <a:ext cx="2071972" cy="176591"/>
+            <a:off x="5143257" y="6191784"/>
+            <a:ext cx="1385911" cy="156772"/>
           </a:xfrm>
           <a:prstGeom prst="rightArrow">
             <a:avLst>
@@ -17873,8 +17353,8 @@
         </p:nvSpPr>
         <p:spPr>
           <a:xfrm>
-            <a:off x="10772992" y="6198356"/>
-            <a:ext cx="1299104" cy="176591"/>
+            <a:off x="10015319" y="6198882"/>
+            <a:ext cx="1027937" cy="169550"/>
           </a:xfrm>
           <a:prstGeom prst="rightArrow">
             <a:avLst>
@@ -18324,7 +17804,7 @@
         </p:nvCxnSpPr>
         <p:spPr>
           <a:xfrm flipV="1">
-            <a:off x="8014274" y="2871359"/>
+            <a:off x="8223999" y="2871359"/>
             <a:ext cx="0" cy="304494"/>
           </a:xfrm>
           <a:prstGeom prst="line">
@@ -18868,50 +18348,6 @@
           </a:p>
         </p:txBody>
       </p:sp>
-      <p:cxnSp>
-        <p:nvCxnSpPr>
-          <p:cNvPr id="330" name="Gerader Verbinder 329">
-            <a:extLst>
-              <a:ext uri="{FF2B5EF4-FFF2-40B4-BE49-F238E27FC236}">
-                <a16:creationId xmlns:a16="http://schemas.microsoft.com/office/drawing/2014/main" id="{E205D36B-33B1-EF02-18DB-D4A364DE4BEC}"/>
-              </a:ext>
-            </a:extLst>
-          </p:cNvPr>
-          <p:cNvCxnSpPr>
-            <a:cxnSpLocks/>
-          </p:cNvCxnSpPr>
-          <p:nvPr/>
-        </p:nvCxnSpPr>
-        <p:spPr>
-          <a:xfrm flipV="1">
-            <a:off x="8027409" y="6037652"/>
-            <a:ext cx="0" cy="304494"/>
-          </a:xfrm>
-          <a:prstGeom prst="line">
-            <a:avLst/>
-          </a:prstGeom>
-          <a:ln w="9525">
-            <a:solidFill>
-              <a:schemeClr val="tx1"/>
-            </a:solidFill>
-            <a:prstDash val="dash"/>
-          </a:ln>
-        </p:spPr>
-        <p:style>
-          <a:lnRef idx="2">
-            <a:schemeClr val="accent1"/>
-          </a:lnRef>
-          <a:fillRef idx="0">
-            <a:schemeClr val="accent1"/>
-          </a:fillRef>
-          <a:effectRef idx="1">
-            <a:schemeClr val="accent1"/>
-          </a:effectRef>
-          <a:fontRef idx="minor">
-            <a:schemeClr val="tx1"/>
-          </a:fontRef>
-        </p:style>
-      </p:cxnSp>
       <p:sp>
         <p:nvSpPr>
           <p:cNvPr id="331" name="Rechteck 330">
@@ -18926,7 +18362,7 @@
         </p:nvSpPr>
         <p:spPr>
           <a:xfrm>
-            <a:off x="6285532" y="5994320"/>
+            <a:off x="5698302" y="5994320"/>
             <a:ext cx="825315" cy="147195"/>
           </a:xfrm>
           <a:prstGeom prst="rect">
@@ -18990,7 +18426,7 @@
         </p:nvSpPr>
         <p:spPr>
           <a:xfrm>
-            <a:off x="8014274" y="5995161"/>
+            <a:off x="7032761" y="5995161"/>
             <a:ext cx="825315" cy="147195"/>
           </a:xfrm>
           <a:prstGeom prst="rect">
@@ -19056,7 +18492,7 @@
         </p:nvCxnSpPr>
         <p:spPr>
           <a:xfrm flipV="1">
-            <a:off x="8922538" y="6051367"/>
+            <a:off x="8041693" y="6051367"/>
             <a:ext cx="0" cy="304494"/>
           </a:xfrm>
           <a:prstGeom prst="line">
@@ -19098,7 +18534,7 @@
         </p:nvSpPr>
         <p:spPr>
           <a:xfrm>
-            <a:off x="9989778" y="6009685"/>
+            <a:off x="9075377" y="6009685"/>
             <a:ext cx="903400" cy="147195"/>
           </a:xfrm>
           <a:prstGeom prst="rect">
@@ -19862,15 +19298,15 @@
           <p:nvPr/>
         </p:nvSpPr>
         <p:spPr>
-          <a:xfrm rot="20213098">
-            <a:off x="8217604" y="5460267"/>
-            <a:ext cx="718586" cy="396213"/>
+          <a:xfrm rot="20938405">
+            <a:off x="8863941" y="5537152"/>
+            <a:ext cx="631963" cy="315639"/>
           </a:xfrm>
           <a:prstGeom prst="roundRect">
             <a:avLst/>
           </a:prstGeom>
           <a:solidFill>
-            <a:schemeClr val="accent6">
+            <a:schemeClr val="accent5">
               <a:lumMod val="60000"/>
               <a:lumOff val="40000"/>
             </a:schemeClr>
@@ -19896,12 +19332,12 @@
           </a:fontRef>
         </p:style>
         <p:txBody>
-          <a:bodyPr lIns="36000" tIns="36000" rIns="36000" bIns="36000" rtlCol="0" anchor="t"/>
+          <a:bodyPr lIns="36000" tIns="0" rIns="36000" bIns="36000" rtlCol="0" anchor="t"/>
           <a:lstStyle/>
           <a:p>
             <a:pPr algn="ctr"/>
             <a:r>
-              <a:rPr lang="de-DE" sz="900" dirty="0">
+              <a:rPr lang="de-DE" sz="800" dirty="0">
                 <a:solidFill>
                   <a:schemeClr val="tx1"/>
                 </a:solidFill>
@@ -19909,7 +19345,7 @@
               </a:rPr>
               <a:t>Security-Workshop</a:t>
             </a:r>
-            <a:endParaRPr lang="de-DE" sz="500" dirty="0">
+            <a:endParaRPr lang="de-DE" sz="400" dirty="0">
               <a:solidFill>
                 <a:schemeClr val="tx1"/>
               </a:solidFill>
@@ -19918,12 +19354,1196 @@
           </a:p>
         </p:txBody>
       </p:sp>
+      <p:grpSp>
+        <p:nvGrpSpPr>
+          <p:cNvPr id="69" name="Gruppieren 68">
+            <a:extLst>
+              <a:ext uri="{FF2B5EF4-FFF2-40B4-BE49-F238E27FC236}">
+                <a16:creationId xmlns:a16="http://schemas.microsoft.com/office/drawing/2014/main" id="{C629921F-AD10-4187-9BE4-8C22260DB2EB}"/>
+              </a:ext>
+            </a:extLst>
+          </p:cNvPr>
+          <p:cNvGrpSpPr/>
+          <p:nvPr/>
+        </p:nvGrpSpPr>
+        <p:grpSpPr>
+          <a:xfrm>
+            <a:off x="5198501" y="479207"/>
+            <a:ext cx="953764" cy="1783084"/>
+            <a:chOff x="3318640" y="485438"/>
+            <a:chExt cx="953764" cy="1783084"/>
+          </a:xfrm>
+        </p:grpSpPr>
+        <p:grpSp>
+          <p:nvGrpSpPr>
+            <p:cNvPr id="239" name="Gruppieren 238">
+              <a:extLst>
+                <a:ext uri="{FF2B5EF4-FFF2-40B4-BE49-F238E27FC236}">
+                  <a16:creationId xmlns:a16="http://schemas.microsoft.com/office/drawing/2014/main" id="{0820E3D1-B002-297F-6C46-97FD615057C8}"/>
+                </a:ext>
+              </a:extLst>
+            </p:cNvPr>
+            <p:cNvGrpSpPr/>
+            <p:nvPr/>
+          </p:nvGrpSpPr>
+          <p:grpSpPr>
+            <a:xfrm>
+              <a:off x="3358004" y="485438"/>
+              <a:ext cx="914400" cy="1608398"/>
+              <a:chOff x="1097280" y="1092558"/>
+              <a:chExt cx="914400" cy="1608398"/>
+            </a:xfrm>
+          </p:grpSpPr>
+          <p:sp>
+            <p:nvSpPr>
+              <p:cNvPr id="240" name="Rechteck: abgerundete Ecken 239">
+                <a:extLst>
+                  <a:ext uri="{FF2B5EF4-FFF2-40B4-BE49-F238E27FC236}">
+                    <a16:creationId xmlns:a16="http://schemas.microsoft.com/office/drawing/2014/main" id="{7C7E71E9-5E38-AFD9-902A-C20CE1E0E58E}"/>
+                  </a:ext>
+                </a:extLst>
+              </p:cNvPr>
+              <p:cNvSpPr/>
+              <p:nvPr/>
+            </p:nvSpPr>
+            <p:spPr>
+              <a:xfrm>
+                <a:off x="1097280" y="1092558"/>
+                <a:ext cx="914400" cy="1608398"/>
+              </a:xfrm>
+              <a:prstGeom prst="roundRect">
+                <a:avLst/>
+              </a:prstGeom>
+              <a:solidFill>
+                <a:srgbClr val="FFD653"/>
+              </a:solidFill>
+              <a:ln>
+                <a:noFill/>
+              </a:ln>
+            </p:spPr>
+            <p:style>
+              <a:lnRef idx="2">
+                <a:schemeClr val="accent1">
+                  <a:shade val="15000"/>
+                </a:schemeClr>
+              </a:lnRef>
+              <a:fillRef idx="1">
+                <a:schemeClr val="accent1"/>
+              </a:fillRef>
+              <a:effectRef idx="0">
+                <a:schemeClr val="accent1"/>
+              </a:effectRef>
+              <a:fontRef idx="minor">
+                <a:schemeClr val="lt1"/>
+              </a:fontRef>
+            </p:style>
+            <p:txBody>
+              <a:bodyPr lIns="36000" tIns="36000" rIns="36000" bIns="36000" rtlCol="0" anchor="t"/>
+              <a:lstStyle/>
+              <a:p>
+                <a:pPr algn="ctr"/>
+                <a:r>
+                  <a:rPr lang="de-DE" sz="1100" dirty="0">
+                    <a:solidFill>
+                      <a:schemeClr val="tx1"/>
+                    </a:solidFill>
+                    <a:latin typeface="SBB Light" pitchFamily="2" charset="0"/>
+                  </a:rPr>
+                  <a:t>UX</a:t>
+                </a:r>
+              </a:p>
+              <a:p>
+                <a:pPr algn="ctr"/>
+                <a:endParaRPr lang="de-DE" sz="1000" dirty="0">
+                  <a:solidFill>
+                    <a:schemeClr val="tx1"/>
+                  </a:solidFill>
+                  <a:latin typeface="SBB Light" pitchFamily="2" charset="0"/>
+                </a:endParaRPr>
+              </a:p>
+              <a:p>
+                <a:pPr algn="ctr"/>
+                <a:endParaRPr lang="de-DE" sz="800" dirty="0">
+                  <a:solidFill>
+                    <a:schemeClr val="tx1"/>
+                  </a:solidFill>
+                  <a:latin typeface="SBB Light" pitchFamily="2" charset="0"/>
+                </a:endParaRPr>
+              </a:p>
+              <a:p>
+                <a:pPr algn="ctr"/>
+                <a:r>
+                  <a:rPr lang="de-DE" sz="800" dirty="0">
+                    <a:solidFill>
+                      <a:schemeClr val="tx1"/>
+                    </a:solidFill>
+                    <a:latin typeface="SBB Light" pitchFamily="2" charset="0"/>
+                  </a:rPr>
+                  <a:t>UX</a:t>
+                </a:r>
+                <a:br>
+                  <a:rPr lang="de-DE" sz="800" dirty="0">
+                    <a:solidFill>
+                      <a:schemeClr val="tx1"/>
+                    </a:solidFill>
+                    <a:latin typeface="SBB Light" pitchFamily="2" charset="0"/>
+                  </a:rPr>
+                </a:br>
+                <a:r>
+                  <a:rPr lang="de-DE" sz="800" dirty="0">
+                    <a:solidFill>
+                      <a:schemeClr val="tx1"/>
+                    </a:solidFill>
+                    <a:latin typeface="SBB Light" pitchFamily="2" charset="0"/>
+                  </a:rPr>
+                  <a:t>Benutzerforsch.</a:t>
+                </a:r>
+              </a:p>
+              <a:p>
+                <a:pPr algn="ctr"/>
+                <a:r>
+                  <a:rPr lang="de-DE" sz="800" dirty="0">
+                    <a:solidFill>
+                      <a:schemeClr val="tx1"/>
+                    </a:solidFill>
+                    <a:latin typeface="SBB Light" pitchFamily="2" charset="0"/>
+                  </a:rPr>
+                  <a:t>Datenanalyse, </a:t>
+                </a:r>
+              </a:p>
+              <a:p>
+                <a:pPr algn="ctr"/>
+                <a:r>
+                  <a:rPr lang="de-DE" sz="800" dirty="0">
+                    <a:solidFill>
+                      <a:schemeClr val="tx1"/>
+                    </a:solidFill>
+                    <a:latin typeface="SBB Light" pitchFamily="2" charset="0"/>
+                  </a:rPr>
+                  <a:t>Accessibility</a:t>
+                </a:r>
+              </a:p>
+            </p:txBody>
+          </p:sp>
+          <p:cxnSp>
+            <p:nvCxnSpPr>
+              <p:cNvPr id="241" name="Gerader Verbinder 240">
+                <a:extLst>
+                  <a:ext uri="{FF2B5EF4-FFF2-40B4-BE49-F238E27FC236}">
+                    <a16:creationId xmlns:a16="http://schemas.microsoft.com/office/drawing/2014/main" id="{69E0E9C7-0A22-B1A6-3C7C-35B5ABBF7844}"/>
+                  </a:ext>
+                </a:extLst>
+              </p:cNvPr>
+              <p:cNvCxnSpPr>
+                <a:cxnSpLocks/>
+              </p:cNvCxnSpPr>
+              <p:nvPr/>
+            </p:nvCxnSpPr>
+            <p:spPr>
+              <a:xfrm>
+                <a:off x="1167384" y="1541272"/>
+                <a:ext cx="777240" cy="0"/>
+              </a:xfrm>
+              <a:prstGeom prst="line">
+                <a:avLst/>
+              </a:prstGeom>
+              <a:ln>
+                <a:solidFill>
+                  <a:schemeClr val="bg1"/>
+                </a:solidFill>
+              </a:ln>
+            </p:spPr>
+            <p:style>
+              <a:lnRef idx="2">
+                <a:schemeClr val="accent1"/>
+              </a:lnRef>
+              <a:fillRef idx="0">
+                <a:schemeClr val="accent1"/>
+              </a:fillRef>
+              <a:effectRef idx="1">
+                <a:schemeClr val="accent1"/>
+              </a:effectRef>
+              <a:fontRef idx="minor">
+                <a:schemeClr val="tx1"/>
+              </a:fontRef>
+            </p:style>
+          </p:cxnSp>
+          <p:cxnSp>
+            <p:nvCxnSpPr>
+              <p:cNvPr id="242" name="Gerader Verbinder 241">
+                <a:extLst>
+                  <a:ext uri="{FF2B5EF4-FFF2-40B4-BE49-F238E27FC236}">
+                    <a16:creationId xmlns:a16="http://schemas.microsoft.com/office/drawing/2014/main" id="{DAB56C4A-C1AC-4948-07EC-DFFED6D77FE0}"/>
+                  </a:ext>
+                </a:extLst>
+              </p:cNvPr>
+              <p:cNvCxnSpPr>
+                <a:cxnSpLocks/>
+              </p:cNvCxnSpPr>
+              <p:nvPr/>
+            </p:nvCxnSpPr>
+            <p:spPr>
+              <a:xfrm>
+                <a:off x="1167384" y="2376403"/>
+                <a:ext cx="777240" cy="0"/>
+              </a:xfrm>
+              <a:prstGeom prst="line">
+                <a:avLst/>
+              </a:prstGeom>
+              <a:ln>
+                <a:solidFill>
+                  <a:schemeClr val="bg1"/>
+                </a:solidFill>
+              </a:ln>
+            </p:spPr>
+            <p:style>
+              <a:lnRef idx="2">
+                <a:schemeClr val="accent1"/>
+              </a:lnRef>
+              <a:fillRef idx="0">
+                <a:schemeClr val="accent1"/>
+              </a:fillRef>
+              <a:effectRef idx="1">
+                <a:schemeClr val="accent1"/>
+              </a:effectRef>
+              <a:fontRef idx="minor">
+                <a:schemeClr val="tx1"/>
+              </a:fontRef>
+            </p:style>
+          </p:cxnSp>
+        </p:grpSp>
+        <p:sp>
+          <p:nvSpPr>
+            <p:cNvPr id="278" name="Ellipse 277">
+              <a:extLst>
+                <a:ext uri="{FF2B5EF4-FFF2-40B4-BE49-F238E27FC236}">
+                  <a16:creationId xmlns:a16="http://schemas.microsoft.com/office/drawing/2014/main" id="{32F86C01-C858-1987-372B-D2D61D769834}"/>
+                </a:ext>
+              </a:extLst>
+            </p:cNvPr>
+            <p:cNvSpPr/>
+            <p:nvPr/>
+          </p:nvSpPr>
+          <p:spPr>
+            <a:xfrm>
+              <a:off x="3380785" y="1835163"/>
+              <a:ext cx="252549" cy="252549"/>
+            </a:xfrm>
+            <a:prstGeom prst="ellipse">
+              <a:avLst/>
+            </a:prstGeom>
+            <a:solidFill>
+              <a:srgbClr val="FFCC66"/>
+            </a:solidFill>
+            <a:ln>
+              <a:solidFill>
+                <a:schemeClr val="accent2">
+                  <a:lumMod val="60000"/>
+                  <a:lumOff val="40000"/>
+                </a:schemeClr>
+              </a:solidFill>
+            </a:ln>
+          </p:spPr>
+          <p:style>
+            <a:lnRef idx="2">
+              <a:schemeClr val="accent1">
+                <a:shade val="15000"/>
+              </a:schemeClr>
+            </a:lnRef>
+            <a:fillRef idx="1">
+              <a:schemeClr val="accent1"/>
+            </a:fillRef>
+            <a:effectRef idx="0">
+              <a:schemeClr val="accent1"/>
+            </a:effectRef>
+            <a:fontRef idx="minor">
+              <a:schemeClr val="lt1"/>
+            </a:fontRef>
+          </p:style>
+          <p:txBody>
+            <a:bodyPr rtlCol="0" anchor="ctr"/>
+            <a:lstStyle/>
+            <a:p>
+              <a:pPr algn="ctr"/>
+              <a:r>
+                <a:rPr lang="de-DE" sz="1000" b="1" dirty="0">
+                  <a:solidFill>
+                    <a:schemeClr val="bg1"/>
+                  </a:solidFill>
+                  <a:latin typeface="SBB Light" pitchFamily="2" charset="0"/>
+                </a:rPr>
+                <a:t>0</a:t>
+              </a:r>
+              <a:endParaRPr lang="de-CH" sz="1000" b="1" dirty="0">
+                <a:solidFill>
+                  <a:schemeClr val="bg1"/>
+                </a:solidFill>
+                <a:latin typeface="SBB Light" pitchFamily="2" charset="0"/>
+              </a:endParaRPr>
+            </a:p>
+          </p:txBody>
+        </p:sp>
+        <p:sp>
+          <p:nvSpPr>
+            <p:cNvPr id="286" name="Rechteck: abgerundete Ecken 285">
+              <a:extLst>
+                <a:ext uri="{FF2B5EF4-FFF2-40B4-BE49-F238E27FC236}">
+                  <a16:creationId xmlns:a16="http://schemas.microsoft.com/office/drawing/2014/main" id="{60D0597F-CBEE-77BD-C752-20BA3F456121}"/>
+                </a:ext>
+              </a:extLst>
+            </p:cNvPr>
+            <p:cNvSpPr/>
+            <p:nvPr/>
+          </p:nvSpPr>
+          <p:spPr>
+            <a:xfrm>
+              <a:off x="3737705" y="1814749"/>
+              <a:ext cx="498599" cy="235995"/>
+            </a:xfrm>
+            <a:prstGeom prst="roundRect">
+              <a:avLst/>
+            </a:prstGeom>
+            <a:solidFill>
+              <a:schemeClr val="bg1"/>
+            </a:solidFill>
+            <a:ln w="9525"/>
+          </p:spPr>
+          <p:style>
+            <a:lnRef idx="2">
+              <a:schemeClr val="accent1">
+                <a:shade val="15000"/>
+              </a:schemeClr>
+            </a:lnRef>
+            <a:fillRef idx="1">
+              <a:schemeClr val="accent1"/>
+            </a:fillRef>
+            <a:effectRef idx="0">
+              <a:schemeClr val="accent1"/>
+            </a:effectRef>
+            <a:fontRef idx="minor">
+              <a:schemeClr val="lt1"/>
+            </a:fontRef>
+          </p:style>
+          <p:txBody>
+            <a:bodyPr rtlCol="0" anchor="ctr"/>
+            <a:lstStyle/>
+            <a:p>
+              <a:pPr algn="ctr"/>
+              <a:r>
+                <a:rPr lang="de-DE" sz="1000" dirty="0">
+                  <a:solidFill>
+                    <a:schemeClr val="tx1"/>
+                  </a:solidFill>
+                  <a:latin typeface="SBB Light" pitchFamily="2" charset="0"/>
+                </a:rPr>
+                <a:t>#F1</a:t>
+              </a:r>
+              <a:endParaRPr lang="de-CH" sz="1000" dirty="0">
+                <a:solidFill>
+                  <a:schemeClr val="tx1"/>
+                </a:solidFill>
+                <a:latin typeface="SBB Light" pitchFamily="2" charset="0"/>
+              </a:endParaRPr>
+            </a:p>
+          </p:txBody>
+        </p:sp>
+        <p:sp>
+          <p:nvSpPr>
+            <p:cNvPr id="267" name="Textfeld 266">
+              <a:extLst>
+                <a:ext uri="{FF2B5EF4-FFF2-40B4-BE49-F238E27FC236}">
+                  <a16:creationId xmlns:a16="http://schemas.microsoft.com/office/drawing/2014/main" id="{CDDD8627-EDB3-E469-FDF9-1DBCB8AA7248}"/>
+                </a:ext>
+              </a:extLst>
+            </p:cNvPr>
+            <p:cNvSpPr txBox="1"/>
+            <p:nvPr/>
+          </p:nvSpPr>
+          <p:spPr>
+            <a:xfrm>
+              <a:off x="3318640" y="2068467"/>
+              <a:ext cx="820306" cy="200055"/>
+            </a:xfrm>
+            <a:prstGeom prst="rect">
+              <a:avLst/>
+            </a:prstGeom>
+            <a:noFill/>
+            <a:ln>
+              <a:noFill/>
+            </a:ln>
+          </p:spPr>
+          <p:style>
+            <a:lnRef idx="2">
+              <a:schemeClr val="accent1">
+                <a:shade val="15000"/>
+              </a:schemeClr>
+            </a:lnRef>
+            <a:fillRef idx="1">
+              <a:schemeClr val="accent1"/>
+            </a:fillRef>
+            <a:effectRef idx="0">
+              <a:schemeClr val="accent1"/>
+            </a:effectRef>
+            <a:fontRef idx="minor">
+              <a:schemeClr val="lt1"/>
+            </a:fontRef>
+          </p:style>
+          <p:txBody>
+            <a:bodyPr rtlCol="0" anchor="t"/>
+            <a:lstStyle>
+              <a:defPPr>
+                <a:defRPr lang="de-DE"/>
+              </a:defPPr>
+              <a:lvl1pPr>
+                <a:defRPr sz="700">
+                  <a:latin typeface="SBB Light" pitchFamily="2" charset="0"/>
+                </a:defRPr>
+              </a:lvl1pPr>
+              <a:lvl2pPr>
+                <a:defRPr>
+                  <a:solidFill>
+                    <a:schemeClr val="lt1"/>
+                  </a:solidFill>
+                </a:defRPr>
+              </a:lvl2pPr>
+              <a:lvl3pPr>
+                <a:defRPr>
+                  <a:solidFill>
+                    <a:schemeClr val="lt1"/>
+                  </a:solidFill>
+                </a:defRPr>
+              </a:lvl3pPr>
+              <a:lvl4pPr>
+                <a:defRPr>
+                  <a:solidFill>
+                    <a:schemeClr val="lt1"/>
+                  </a:solidFill>
+                </a:defRPr>
+              </a:lvl4pPr>
+              <a:lvl5pPr>
+                <a:defRPr>
+                  <a:solidFill>
+                    <a:schemeClr val="lt1"/>
+                  </a:solidFill>
+                </a:defRPr>
+              </a:lvl5pPr>
+              <a:lvl6pPr>
+                <a:defRPr>
+                  <a:solidFill>
+                    <a:schemeClr val="lt1"/>
+                  </a:solidFill>
+                </a:defRPr>
+              </a:lvl6pPr>
+              <a:lvl7pPr>
+                <a:defRPr>
+                  <a:solidFill>
+                    <a:schemeClr val="lt1"/>
+                  </a:solidFill>
+                </a:defRPr>
+              </a:lvl7pPr>
+              <a:lvl8pPr>
+                <a:defRPr>
+                  <a:solidFill>
+                    <a:schemeClr val="lt1"/>
+                  </a:solidFill>
+                </a:defRPr>
+              </a:lvl8pPr>
+              <a:lvl9pPr>
+                <a:defRPr>
+                  <a:solidFill>
+                    <a:schemeClr val="lt1"/>
+                  </a:solidFill>
+                </a:defRPr>
+              </a:lvl9pPr>
+            </a:lstStyle>
+            <a:p>
+              <a:r>
+                <a:rPr lang="de-DE" dirty="0">
+                  <a:solidFill>
+                    <a:schemeClr val="tx1"/>
+                  </a:solidFill>
+                </a:rPr>
+                <a:t>30.10. – 6.11.</a:t>
+              </a:r>
+              <a:endParaRPr lang="de-CH" dirty="0">
+                <a:solidFill>
+                  <a:schemeClr val="tx1"/>
+                </a:solidFill>
+              </a:endParaRPr>
+            </a:p>
+          </p:txBody>
+        </p:sp>
+      </p:grpSp>
       <p:sp>
         <p:nvSpPr>
-          <p:cNvPr id="267" name="Textfeld 266">
-            <a:extLst>
-              <a:ext uri="{FF2B5EF4-FFF2-40B4-BE49-F238E27FC236}">
-                <a16:creationId xmlns:a16="http://schemas.microsoft.com/office/drawing/2014/main" id="{CDDD8627-EDB3-E469-FDF9-1DBCB8AA7248}"/>
+          <p:cNvPr id="268" name="Rechteck: abgerundete Ecken 267">
+            <a:extLst>
+              <a:ext uri="{FF2B5EF4-FFF2-40B4-BE49-F238E27FC236}">
+                <a16:creationId xmlns:a16="http://schemas.microsoft.com/office/drawing/2014/main" id="{A7307A72-0A5C-F7BE-0A80-4651BC75CDEC}"/>
+              </a:ext>
+            </a:extLst>
+          </p:cNvPr>
+          <p:cNvSpPr/>
+          <p:nvPr/>
+        </p:nvSpPr>
+        <p:spPr>
+          <a:xfrm>
+            <a:off x="1806535" y="2632887"/>
+            <a:ext cx="1437474" cy="205424"/>
+          </a:xfrm>
+          <a:prstGeom prst="roundRect">
+            <a:avLst/>
+          </a:prstGeom>
+          <a:solidFill>
+            <a:schemeClr val="accent2">
+              <a:lumMod val="75000"/>
+            </a:schemeClr>
+          </a:solidFill>
+          <a:ln>
+            <a:noFill/>
+          </a:ln>
+        </p:spPr>
+        <p:style>
+          <a:lnRef idx="2">
+            <a:schemeClr val="accent1">
+              <a:shade val="15000"/>
+            </a:schemeClr>
+          </a:lnRef>
+          <a:fillRef idx="1">
+            <a:schemeClr val="accent1"/>
+          </a:fillRef>
+          <a:effectRef idx="0">
+            <a:schemeClr val="accent1"/>
+          </a:effectRef>
+          <a:fontRef idx="minor">
+            <a:schemeClr val="lt1"/>
+          </a:fontRef>
+        </p:style>
+        <p:txBody>
+          <a:bodyPr lIns="36000" tIns="36000" rIns="36000" bIns="36000" rtlCol="0" anchor="ctr"/>
+          <a:lstStyle/>
+          <a:p>
+            <a:pPr algn="ctr"/>
+            <a:r>
+              <a:rPr lang="de-DE" sz="900" dirty="0">
+                <a:solidFill>
+                  <a:schemeClr val="bg1"/>
+                </a:solidFill>
+                <a:latin typeface="SBB Light" pitchFamily="2" charset="0"/>
+              </a:rPr>
+              <a:t>Schlüsselkompetenzen S1</a:t>
+            </a:r>
+          </a:p>
+        </p:txBody>
+      </p:sp>
+      <p:sp>
+        <p:nvSpPr>
+          <p:cNvPr id="269" name="Rechteck: abgerundete Ecken 268">
+            <a:extLst>
+              <a:ext uri="{FF2B5EF4-FFF2-40B4-BE49-F238E27FC236}">
+                <a16:creationId xmlns:a16="http://schemas.microsoft.com/office/drawing/2014/main" id="{7A2E22F8-05D0-7205-B23C-4ADA9BF669CE}"/>
+              </a:ext>
+            </a:extLst>
+          </p:cNvPr>
+          <p:cNvSpPr/>
+          <p:nvPr/>
+        </p:nvSpPr>
+        <p:spPr>
+          <a:xfrm>
+            <a:off x="9652276" y="5772053"/>
+            <a:ext cx="1154415" cy="232551"/>
+          </a:xfrm>
+          <a:prstGeom prst="roundRect">
+            <a:avLst/>
+          </a:prstGeom>
+          <a:solidFill>
+            <a:schemeClr val="accent2">
+              <a:lumMod val="75000"/>
+            </a:schemeClr>
+          </a:solidFill>
+          <a:ln>
+            <a:noFill/>
+          </a:ln>
+        </p:spPr>
+        <p:style>
+          <a:lnRef idx="2">
+            <a:schemeClr val="accent1">
+              <a:shade val="15000"/>
+            </a:schemeClr>
+          </a:lnRef>
+          <a:fillRef idx="1">
+            <a:schemeClr val="accent1"/>
+          </a:fillRef>
+          <a:effectRef idx="0">
+            <a:schemeClr val="accent1"/>
+          </a:effectRef>
+          <a:fontRef idx="minor">
+            <a:schemeClr val="lt1"/>
+          </a:fontRef>
+        </p:style>
+        <p:txBody>
+          <a:bodyPr lIns="36000" tIns="36000" rIns="36000" bIns="36000" rtlCol="0" anchor="ctr"/>
+          <a:lstStyle/>
+          <a:p>
+            <a:pPr algn="ctr"/>
+            <a:r>
+              <a:rPr lang="de-DE" sz="900" dirty="0">
+                <a:solidFill>
+                  <a:schemeClr val="bg1"/>
+                </a:solidFill>
+                <a:latin typeface="SBB Light" pitchFamily="2" charset="0"/>
+              </a:rPr>
+              <a:t>Arbeitsmethodik A2</a:t>
+            </a:r>
+          </a:p>
+        </p:txBody>
+      </p:sp>
+      <p:sp>
+        <p:nvSpPr>
+          <p:cNvPr id="270" name="Rechteck: abgerundete Ecken 269">
+            <a:extLst>
+              <a:ext uri="{FF2B5EF4-FFF2-40B4-BE49-F238E27FC236}">
+                <a16:creationId xmlns:a16="http://schemas.microsoft.com/office/drawing/2014/main" id="{75AEEB2F-36E9-C484-359B-AA19B5FFC02B}"/>
+              </a:ext>
+            </a:extLst>
+          </p:cNvPr>
+          <p:cNvSpPr/>
+          <p:nvPr/>
+        </p:nvSpPr>
+        <p:spPr>
+          <a:xfrm>
+            <a:off x="978803" y="5799180"/>
+            <a:ext cx="1399545" cy="205424"/>
+          </a:xfrm>
+          <a:prstGeom prst="roundRect">
+            <a:avLst/>
+          </a:prstGeom>
+          <a:solidFill>
+            <a:schemeClr val="accent2">
+              <a:lumMod val="75000"/>
+            </a:schemeClr>
+          </a:solidFill>
+          <a:ln>
+            <a:noFill/>
+          </a:ln>
+        </p:spPr>
+        <p:style>
+          <a:lnRef idx="2">
+            <a:schemeClr val="accent1">
+              <a:shade val="15000"/>
+            </a:schemeClr>
+          </a:lnRef>
+          <a:fillRef idx="1">
+            <a:schemeClr val="accent1"/>
+          </a:fillRef>
+          <a:effectRef idx="0">
+            <a:schemeClr val="accent1"/>
+          </a:effectRef>
+          <a:fontRef idx="minor">
+            <a:schemeClr val="lt1"/>
+          </a:fontRef>
+        </p:style>
+        <p:txBody>
+          <a:bodyPr lIns="36000" tIns="36000" rIns="36000" bIns="36000" rtlCol="0" anchor="ctr"/>
+          <a:lstStyle/>
+          <a:p>
+            <a:pPr algn="ctr"/>
+            <a:r>
+              <a:rPr lang="de-DE" sz="900" dirty="0">
+                <a:solidFill>
+                  <a:schemeClr val="bg1"/>
+                </a:solidFill>
+                <a:latin typeface="SBB Light" pitchFamily="2" charset="0"/>
+              </a:rPr>
+              <a:t>Schlüsselkompetenzen S3</a:t>
+            </a:r>
+          </a:p>
+        </p:txBody>
+      </p:sp>
+      <p:sp>
+        <p:nvSpPr>
+          <p:cNvPr id="272" name="Rechteck: abgerundete Ecken 271">
+            <a:extLst>
+              <a:ext uri="{FF2B5EF4-FFF2-40B4-BE49-F238E27FC236}">
+                <a16:creationId xmlns:a16="http://schemas.microsoft.com/office/drawing/2014/main" id="{2F0B24E8-8990-9B37-E0B3-856043ACD4FC}"/>
+              </a:ext>
+            </a:extLst>
+          </p:cNvPr>
+          <p:cNvSpPr/>
+          <p:nvPr/>
+        </p:nvSpPr>
+        <p:spPr>
+          <a:xfrm>
+            <a:off x="6934695" y="5772053"/>
+            <a:ext cx="1154415" cy="232551"/>
+          </a:xfrm>
+          <a:prstGeom prst="roundRect">
+            <a:avLst/>
+          </a:prstGeom>
+          <a:solidFill>
+            <a:schemeClr val="accent2">
+              <a:lumMod val="75000"/>
+            </a:schemeClr>
+          </a:solidFill>
+          <a:ln>
+            <a:noFill/>
+          </a:ln>
+        </p:spPr>
+        <p:style>
+          <a:lnRef idx="2">
+            <a:schemeClr val="accent1">
+              <a:shade val="15000"/>
+            </a:schemeClr>
+          </a:lnRef>
+          <a:fillRef idx="1">
+            <a:schemeClr val="accent1"/>
+          </a:fillRef>
+          <a:effectRef idx="0">
+            <a:schemeClr val="accent1"/>
+          </a:effectRef>
+          <a:fontRef idx="minor">
+            <a:schemeClr val="lt1"/>
+          </a:fontRef>
+        </p:style>
+        <p:txBody>
+          <a:bodyPr lIns="36000" tIns="36000" rIns="36000" bIns="36000" rtlCol="0" anchor="ctr"/>
+          <a:lstStyle/>
+          <a:p>
+            <a:pPr algn="ctr"/>
+            <a:r>
+              <a:rPr lang="de-DE" sz="900" dirty="0">
+                <a:solidFill>
+                  <a:schemeClr val="bg1"/>
+                </a:solidFill>
+                <a:latin typeface="SBB Light" pitchFamily="2" charset="0"/>
+              </a:rPr>
+              <a:t>Arbeitsmethodik A2</a:t>
+            </a:r>
+          </a:p>
+        </p:txBody>
+      </p:sp>
+      <p:sp>
+        <p:nvSpPr>
+          <p:cNvPr id="120" name="Pfeil: nach rechts 119">
+            <a:extLst>
+              <a:ext uri="{FF2B5EF4-FFF2-40B4-BE49-F238E27FC236}">
+                <a16:creationId xmlns:a16="http://schemas.microsoft.com/office/drawing/2014/main" id="{2B26E032-3A92-8E3F-1F7E-C2F9012D2FB9}"/>
+              </a:ext>
+            </a:extLst>
+          </p:cNvPr>
+          <p:cNvSpPr/>
+          <p:nvPr/>
+        </p:nvSpPr>
+        <p:spPr>
+          <a:xfrm>
+            <a:off x="8085611" y="3012976"/>
+            <a:ext cx="826594" cy="181472"/>
+          </a:xfrm>
+          <a:prstGeom prst="rightArrow">
+            <a:avLst>
+              <a:gd name="adj1" fmla="val 100000"/>
+              <a:gd name="adj2" fmla="val 50000"/>
+            </a:avLst>
+          </a:prstGeom>
+          <a:solidFill>
+            <a:srgbClr val="83CBEB"/>
+          </a:solidFill>
+          <a:ln w="12700"/>
+        </p:spPr>
+        <p:style>
+          <a:lnRef idx="2">
+            <a:schemeClr val="accent1">
+              <a:shade val="15000"/>
+            </a:schemeClr>
+          </a:lnRef>
+          <a:fillRef idx="1">
+            <a:schemeClr val="accent1"/>
+          </a:fillRef>
+          <a:effectRef idx="0">
+            <a:schemeClr val="accent1"/>
+          </a:effectRef>
+          <a:fontRef idx="minor">
+            <a:schemeClr val="lt1"/>
+          </a:fontRef>
+        </p:style>
+        <p:txBody>
+          <a:bodyPr lIns="0" tIns="0" rIns="0" bIns="0" rtlCol="0" anchor="ctr"/>
+          <a:lstStyle/>
+          <a:p>
+            <a:r>
+              <a:rPr lang="de-DE" sz="600" dirty="0">
+                <a:solidFill>
+                  <a:schemeClr val="tx1"/>
+                </a:solidFill>
+                <a:latin typeface="SBB Light" pitchFamily="2" charset="0"/>
+              </a:rPr>
+              <a:t> 2: 20.11. - 28.11.</a:t>
+            </a:r>
+            <a:br>
+              <a:rPr lang="de-DE" sz="600" dirty="0">
+                <a:solidFill>
+                  <a:schemeClr val="tx1"/>
+                </a:solidFill>
+                <a:latin typeface="SBB Light" pitchFamily="2" charset="0"/>
+              </a:rPr>
+            </a:br>
+            <a:r>
+              <a:rPr lang="de-DE" sz="600" dirty="0">
+                <a:solidFill>
+                  <a:schemeClr val="tx1"/>
+                </a:solidFill>
+                <a:latin typeface="SBB Light" pitchFamily="2" charset="0"/>
+              </a:rPr>
+              <a:t> 3: 27.11. – 5.12.</a:t>
+            </a:r>
+            <a:endParaRPr lang="de-CH" sz="600" dirty="0">
+              <a:solidFill>
+                <a:schemeClr val="tx1"/>
+              </a:solidFill>
+              <a:latin typeface="SBB Light" pitchFamily="2" charset="0"/>
+            </a:endParaRPr>
+          </a:p>
+        </p:txBody>
+      </p:sp>
+      <p:sp>
+        <p:nvSpPr>
+          <p:cNvPr id="64" name="Rechteck 63">
+            <a:extLst>
+              <a:ext uri="{FF2B5EF4-FFF2-40B4-BE49-F238E27FC236}">
+                <a16:creationId xmlns:a16="http://schemas.microsoft.com/office/drawing/2014/main" id="{2000120B-9442-2E8F-46B2-4327946FACA2}"/>
+              </a:ext>
+            </a:extLst>
+          </p:cNvPr>
+          <p:cNvSpPr/>
+          <p:nvPr/>
+        </p:nvSpPr>
+        <p:spPr>
+          <a:xfrm>
+            <a:off x="8000468" y="2090248"/>
+            <a:ext cx="849206" cy="402898"/>
+          </a:xfrm>
+          <a:prstGeom prst="rect">
+            <a:avLst/>
+          </a:prstGeom>
+          <a:noFill/>
+          <a:ln>
+            <a:noFill/>
+          </a:ln>
+        </p:spPr>
+        <p:style>
+          <a:lnRef idx="2">
+            <a:schemeClr val="accent1">
+              <a:shade val="15000"/>
+            </a:schemeClr>
+          </a:lnRef>
+          <a:fillRef idx="1">
+            <a:schemeClr val="accent1"/>
+          </a:fillRef>
+          <a:effectRef idx="0">
+            <a:schemeClr val="accent1"/>
+          </a:effectRef>
+          <a:fontRef idx="minor">
+            <a:schemeClr val="lt1"/>
+          </a:fontRef>
+        </p:style>
+        <p:txBody>
+          <a:bodyPr rtlCol="0" anchor="t"/>
+          <a:lstStyle/>
+          <a:p>
+            <a:r>
+              <a:rPr lang="de-DE" sz="700" dirty="0">
+                <a:solidFill>
+                  <a:schemeClr val="tx1"/>
+                </a:solidFill>
+                <a:latin typeface="SBB Light" pitchFamily="2" charset="0"/>
+              </a:rPr>
+              <a:t>Kursgruppen:</a:t>
+            </a:r>
+          </a:p>
+          <a:p>
+            <a:r>
+              <a:rPr lang="de-DE" sz="700" dirty="0">
+                <a:solidFill>
+                  <a:schemeClr val="tx1"/>
+                </a:solidFill>
+                <a:latin typeface="SBB Light" pitchFamily="2" charset="0"/>
+              </a:rPr>
+              <a:t>2: 187-AE-K2-24</a:t>
+            </a:r>
+          </a:p>
+          <a:p>
+            <a:r>
+              <a:rPr lang="de-DE" sz="700" dirty="0">
+                <a:solidFill>
+                  <a:schemeClr val="tx1"/>
+                </a:solidFill>
+                <a:latin typeface="SBB Light" pitchFamily="2" charset="0"/>
+              </a:rPr>
+              <a:t>3: 187-AE-K3-24</a:t>
+            </a:r>
+            <a:br>
+              <a:rPr lang="de-DE" sz="700" dirty="0">
+                <a:solidFill>
+                  <a:schemeClr val="tx1"/>
+                </a:solidFill>
+                <a:latin typeface="SBB Light" pitchFamily="2" charset="0"/>
+              </a:rPr>
+            </a:br>
+            <a:endParaRPr lang="de-CH" sz="700" dirty="0">
+              <a:solidFill>
+                <a:schemeClr val="tx1"/>
+              </a:solidFill>
+              <a:latin typeface="SBB Light" pitchFamily="2" charset="0"/>
+            </a:endParaRPr>
+          </a:p>
+        </p:txBody>
+      </p:sp>
+      <p:sp>
+        <p:nvSpPr>
+          <p:cNvPr id="65" name="Pfeil: nach rechts 64">
+            <a:extLst>
+              <a:ext uri="{FF2B5EF4-FFF2-40B4-BE49-F238E27FC236}">
+                <a16:creationId xmlns:a16="http://schemas.microsoft.com/office/drawing/2014/main" id="{7F555871-FC67-799D-C5F1-AC181D63A124}"/>
+              </a:ext>
+            </a:extLst>
+          </p:cNvPr>
+          <p:cNvSpPr/>
+          <p:nvPr/>
+        </p:nvSpPr>
+        <p:spPr>
+          <a:xfrm>
+            <a:off x="8080043" y="6158760"/>
+            <a:ext cx="832162" cy="189795"/>
+          </a:xfrm>
+          <a:prstGeom prst="rightArrow">
+            <a:avLst>
+              <a:gd name="adj1" fmla="val 100000"/>
+              <a:gd name="adj2" fmla="val 50000"/>
+            </a:avLst>
+          </a:prstGeom>
+          <a:solidFill>
+            <a:srgbClr val="83CBEB"/>
+          </a:solidFill>
+          <a:ln w="12700"/>
+        </p:spPr>
+        <p:style>
+          <a:lnRef idx="2">
+            <a:schemeClr val="accent1">
+              <a:shade val="15000"/>
+            </a:schemeClr>
+          </a:lnRef>
+          <a:fillRef idx="1">
+            <a:schemeClr val="accent1"/>
+          </a:fillRef>
+          <a:effectRef idx="0">
+            <a:schemeClr val="accent1"/>
+          </a:effectRef>
+          <a:fontRef idx="minor">
+            <a:schemeClr val="lt1"/>
+          </a:fontRef>
+        </p:style>
+        <p:txBody>
+          <a:bodyPr lIns="0" tIns="0" rIns="0" bIns="0" rtlCol="0" anchor="ctr"/>
+          <a:lstStyle/>
+          <a:p>
+            <a:r>
+              <a:rPr lang="de-DE" sz="600" dirty="0">
+                <a:solidFill>
+                  <a:schemeClr val="tx1"/>
+                </a:solidFill>
+                <a:latin typeface="SBB Light" pitchFamily="2" charset="0"/>
+              </a:rPr>
+              <a:t> 3: 4.6. – 13.6. </a:t>
+            </a:r>
+            <a:br>
+              <a:rPr lang="de-DE" sz="600" dirty="0">
+                <a:solidFill>
+                  <a:schemeClr val="tx1"/>
+                </a:solidFill>
+                <a:latin typeface="SBB Light" pitchFamily="2" charset="0"/>
+              </a:rPr>
+            </a:br>
+            <a:r>
+              <a:rPr lang="de-DE" sz="600" dirty="0">
+                <a:solidFill>
+                  <a:schemeClr val="tx1"/>
+                </a:solidFill>
+                <a:latin typeface="SBB Light" pitchFamily="2" charset="0"/>
+              </a:rPr>
+              <a:t> 2: 18.6. – 26.6.</a:t>
+            </a:r>
+            <a:endParaRPr lang="de-CH" sz="600" dirty="0">
+              <a:solidFill>
+                <a:schemeClr val="tx1"/>
+              </a:solidFill>
+              <a:latin typeface="SBB Light" pitchFamily="2" charset="0"/>
+            </a:endParaRPr>
+          </a:p>
+        </p:txBody>
+      </p:sp>
+      <p:sp>
+        <p:nvSpPr>
+          <p:cNvPr id="66" name="Rechteck 65">
+            <a:extLst>
+              <a:ext uri="{FF2B5EF4-FFF2-40B4-BE49-F238E27FC236}">
+                <a16:creationId xmlns:a16="http://schemas.microsoft.com/office/drawing/2014/main" id="{B672839B-34A8-4F87-679B-5E13FBA3D450}"/>
+              </a:ext>
+            </a:extLst>
+          </p:cNvPr>
+          <p:cNvSpPr/>
+          <p:nvPr/>
+        </p:nvSpPr>
+        <p:spPr>
+          <a:xfrm>
+            <a:off x="8007770" y="5251560"/>
+            <a:ext cx="906467" cy="402898"/>
+          </a:xfrm>
+          <a:prstGeom prst="rect">
+            <a:avLst/>
+          </a:prstGeom>
+          <a:noFill/>
+          <a:ln>
+            <a:noFill/>
+          </a:ln>
+        </p:spPr>
+        <p:style>
+          <a:lnRef idx="2">
+            <a:schemeClr val="accent1">
+              <a:shade val="15000"/>
+            </a:schemeClr>
+          </a:lnRef>
+          <a:fillRef idx="1">
+            <a:schemeClr val="accent1"/>
+          </a:fillRef>
+          <a:effectRef idx="0">
+            <a:schemeClr val="accent1"/>
+          </a:effectRef>
+          <a:fontRef idx="minor">
+            <a:schemeClr val="lt1"/>
+          </a:fontRef>
+        </p:style>
+        <p:txBody>
+          <a:bodyPr rtlCol="0" anchor="t"/>
+          <a:lstStyle/>
+          <a:p>
+            <a:r>
+              <a:rPr lang="de-DE" sz="700" dirty="0">
+                <a:solidFill>
+                  <a:schemeClr val="tx1"/>
+                </a:solidFill>
+                <a:latin typeface="SBB Light" pitchFamily="2" charset="0"/>
+              </a:rPr>
+              <a:t>Kursgruppen:</a:t>
+            </a:r>
+          </a:p>
+          <a:p>
+            <a:r>
+              <a:rPr lang="de-DE" sz="700" dirty="0">
+                <a:solidFill>
+                  <a:schemeClr val="tx1"/>
+                </a:solidFill>
+                <a:latin typeface="SBB Light" pitchFamily="2" charset="0"/>
+              </a:rPr>
+              <a:t>3: 106-AE-K3-24</a:t>
+            </a:r>
+          </a:p>
+          <a:p>
+            <a:r>
+              <a:rPr lang="de-DE" sz="700" dirty="0">
+                <a:solidFill>
+                  <a:schemeClr val="tx1"/>
+                </a:solidFill>
+                <a:latin typeface="SBB Light" pitchFamily="2" charset="0"/>
+              </a:rPr>
+              <a:t>2: 106-AE-K2-24</a:t>
+            </a:r>
+            <a:br>
+              <a:rPr lang="de-DE" sz="700" dirty="0">
+                <a:solidFill>
+                  <a:schemeClr val="tx1"/>
+                </a:solidFill>
+                <a:latin typeface="SBB Light" pitchFamily="2" charset="0"/>
+              </a:rPr>
+            </a:br>
+            <a:endParaRPr lang="de-CH" sz="700" dirty="0">
+              <a:solidFill>
+                <a:schemeClr val="tx1"/>
+              </a:solidFill>
+              <a:latin typeface="SBB Light" pitchFamily="2" charset="0"/>
+            </a:endParaRPr>
+          </a:p>
+        </p:txBody>
+      </p:sp>
+      <p:sp>
+        <p:nvSpPr>
+          <p:cNvPr id="271" name="Rechteck: abgerundete Ecken 270">
+            <a:extLst>
+              <a:ext uri="{FF2B5EF4-FFF2-40B4-BE49-F238E27FC236}">
+                <a16:creationId xmlns:a16="http://schemas.microsoft.com/office/drawing/2014/main" id="{6AAE397B-F5BA-828B-34DF-067B2E020C3D}"/>
+              </a:ext>
+            </a:extLst>
+          </p:cNvPr>
+          <p:cNvSpPr/>
+          <p:nvPr/>
+        </p:nvSpPr>
+        <p:spPr>
+          <a:xfrm>
+            <a:off x="608786" y="5557907"/>
+            <a:ext cx="1705516" cy="212066"/>
+          </a:xfrm>
+          <a:prstGeom prst="roundRect">
+            <a:avLst/>
+          </a:prstGeom>
+          <a:solidFill>
+            <a:schemeClr val="accent2">
+              <a:lumMod val="75000"/>
+            </a:schemeClr>
+          </a:solidFill>
+          <a:ln>
+            <a:noFill/>
+          </a:ln>
+        </p:spPr>
+        <p:style>
+          <a:lnRef idx="2">
+            <a:schemeClr val="accent1">
+              <a:shade val="15000"/>
+            </a:schemeClr>
+          </a:lnRef>
+          <a:fillRef idx="1">
+            <a:schemeClr val="accent1"/>
+          </a:fillRef>
+          <a:effectRef idx="0">
+            <a:schemeClr val="accent1"/>
+          </a:effectRef>
+          <a:fontRef idx="minor">
+            <a:schemeClr val="lt1"/>
+          </a:fontRef>
+        </p:style>
+        <p:txBody>
+          <a:bodyPr lIns="36000" tIns="36000" rIns="36000" bIns="36000" rtlCol="0" anchor="ctr"/>
+          <a:lstStyle/>
+          <a:p>
+            <a:pPr algn="ctr"/>
+            <a:r>
+              <a:rPr lang="de-DE" sz="900" dirty="0">
+                <a:solidFill>
+                  <a:schemeClr val="bg1">
+                    <a:lumMod val="95000"/>
+                  </a:schemeClr>
+                </a:solidFill>
+                <a:latin typeface="SBB Light" pitchFamily="2" charset="0"/>
+              </a:rPr>
+              <a:t>Barrierefreiheit/Accessibility</a:t>
+            </a:r>
+          </a:p>
+        </p:txBody>
+      </p:sp>
+      <p:sp>
+        <p:nvSpPr>
+          <p:cNvPr id="70" name="Textfeld 69">
+            <a:extLst>
+              <a:ext uri="{FF2B5EF4-FFF2-40B4-BE49-F238E27FC236}">
+                <a16:creationId xmlns:a16="http://schemas.microsoft.com/office/drawing/2014/main" id="{42697A38-BA43-BB46-0E29-AE20908BE8DA}"/>
               </a:ext>
             </a:extLst>
           </p:cNvPr>
@@ -19932,8 +20552,8 @@
         </p:nvSpPr>
         <p:spPr>
           <a:xfrm>
-            <a:off x="3318640" y="2068467"/>
-            <a:ext cx="820306" cy="200055"/>
+            <a:off x="2280947" y="5556027"/>
+            <a:ext cx="554729" cy="200055"/>
           </a:xfrm>
           <a:prstGeom prst="rect">
             <a:avLst/>
@@ -20034,7 +20654,7 @@
                   <a:schemeClr val="tx1"/>
                 </a:solidFill>
               </a:rPr>
-              <a:t>30.10. – 6.11.</a:t>
+              <a:t>29.1./5.2</a:t>
             </a:r>
             <a:endParaRPr lang="de-CH" dirty="0">
               <a:solidFill>
@@ -20046,50 +20666,10 @@
       </p:sp>
       <p:sp>
         <p:nvSpPr>
-          <p:cNvPr id="7" name="Textfeld 6">
-            <a:extLst>
-              <a:ext uri="{FF2B5EF4-FFF2-40B4-BE49-F238E27FC236}">
-                <a16:creationId xmlns:a16="http://schemas.microsoft.com/office/drawing/2014/main" id="{779D5018-02DA-9DE5-B0E0-805389799496}"/>
-              </a:ext>
-            </a:extLst>
-          </p:cNvPr>
-          <p:cNvSpPr txBox="1"/>
-          <p:nvPr/>
-        </p:nvSpPr>
-        <p:spPr>
-          <a:xfrm>
-            <a:off x="3386502" y="5278815"/>
-            <a:ext cx="846003" cy="200055"/>
-          </a:xfrm>
-          <a:prstGeom prst="rect">
-            <a:avLst/>
-          </a:prstGeom>
-          <a:noFill/>
-        </p:spPr>
-        <p:txBody>
-          <a:bodyPr wrap="square">
-            <a:spAutoFit/>
-          </a:bodyPr>
-          <a:lstStyle/>
-          <a:p>
-            <a:r>
-              <a:rPr lang="de-DE" sz="700" dirty="0">
-                <a:latin typeface="SBB Light" pitchFamily="2" charset="0"/>
-              </a:rPr>
-              <a:t>Februar/März</a:t>
-            </a:r>
-            <a:endParaRPr lang="de-CH" sz="700" dirty="0">
-              <a:latin typeface="SBB Light" pitchFamily="2" charset="0"/>
-            </a:endParaRPr>
-          </a:p>
-        </p:txBody>
-      </p:sp>
-      <p:sp>
-        <p:nvSpPr>
-          <p:cNvPr id="268" name="Rechteck: abgerundete Ecken 267">
-            <a:extLst>
-              <a:ext uri="{FF2B5EF4-FFF2-40B4-BE49-F238E27FC236}">
-                <a16:creationId xmlns:a16="http://schemas.microsoft.com/office/drawing/2014/main" id="{A7307A72-0A5C-F7BE-0A80-4651BC75CDEC}"/>
+          <p:cNvPr id="67" name="Rechteck: abgerundete Ecken 66">
+            <a:extLst>
+              <a:ext uri="{FF2B5EF4-FFF2-40B4-BE49-F238E27FC236}">
+                <a16:creationId xmlns:a16="http://schemas.microsoft.com/office/drawing/2014/main" id="{41300194-F313-0DE8-57A2-ADEF07FD7A10}"/>
               </a:ext>
             </a:extLst>
           </p:cNvPr>
@@ -20097,16 +20677,113 @@
           <p:nvPr/>
         </p:nvSpPr>
         <p:spPr>
-          <a:xfrm>
-            <a:off x="1806535" y="2632887"/>
-            <a:ext cx="1437474" cy="205424"/>
+          <a:xfrm rot="21282194">
+            <a:off x="4718710" y="2259488"/>
+            <a:ext cx="1088515" cy="291717"/>
           </a:xfrm>
           <a:prstGeom prst="roundRect">
             <a:avLst/>
           </a:prstGeom>
           <a:solidFill>
-            <a:schemeClr val="accent2">
-              <a:lumMod val="75000"/>
+            <a:srgbClr val="FFD653"/>
+          </a:solidFill>
+          <a:ln>
+            <a:noFill/>
+          </a:ln>
+        </p:spPr>
+        <p:style>
+          <a:lnRef idx="2">
+            <a:schemeClr val="accent1">
+              <a:shade val="15000"/>
+            </a:schemeClr>
+          </a:lnRef>
+          <a:fillRef idx="1">
+            <a:schemeClr val="accent1"/>
+          </a:fillRef>
+          <a:effectRef idx="0">
+            <a:schemeClr val="accent1"/>
+          </a:effectRef>
+          <a:fontRef idx="minor">
+            <a:schemeClr val="lt1"/>
+          </a:fontRef>
+        </p:style>
+        <p:txBody>
+          <a:bodyPr lIns="36000" tIns="0" rIns="36000" bIns="36000" rtlCol="0" anchor="t"/>
+          <a:lstStyle/>
+          <a:p>
+            <a:pPr algn="ctr"/>
+            <a:r>
+              <a:rPr lang="de-DE" sz="800" dirty="0" err="1">
+                <a:solidFill>
+                  <a:schemeClr val="tx1"/>
+                </a:solidFill>
+                <a:latin typeface="SBB Light" pitchFamily="2" charset="0"/>
+              </a:rPr>
+              <a:t>Innorookie</a:t>
+            </a:r>
+            <a:r>
+              <a:rPr lang="de-DE" sz="800" dirty="0">
+                <a:solidFill>
+                  <a:schemeClr val="tx1"/>
+                </a:solidFill>
+                <a:latin typeface="SBB Light" pitchFamily="2" charset="0"/>
+              </a:rPr>
+              <a:t> Workshop</a:t>
+            </a:r>
+          </a:p>
+          <a:p>
+            <a:pPr algn="ctr"/>
+            <a:r>
+              <a:rPr lang="de-DE" sz="800" dirty="0">
+                <a:solidFill>
+                  <a:schemeClr val="tx1"/>
+                </a:solidFill>
+                <a:latin typeface="SBB Light" pitchFamily="2" charset="0"/>
+              </a:rPr>
+              <a:t>Design </a:t>
+            </a:r>
+            <a:r>
+              <a:rPr lang="de-DE" sz="800" dirty="0" err="1">
+                <a:solidFill>
+                  <a:schemeClr val="tx1"/>
+                </a:solidFill>
+                <a:latin typeface="SBB Light" pitchFamily="2" charset="0"/>
+              </a:rPr>
+              <a:t>Thinking</a:t>
+            </a:r>
+            <a:endParaRPr lang="de-DE" sz="400" dirty="0">
+              <a:solidFill>
+                <a:schemeClr val="tx1"/>
+              </a:solidFill>
+              <a:latin typeface="SBB Light" pitchFamily="2" charset="0"/>
+            </a:endParaRPr>
+          </a:p>
+        </p:txBody>
+      </p:sp>
+      <p:sp>
+        <p:nvSpPr>
+          <p:cNvPr id="68" name="Rechteck: abgerundete Ecken 67">
+            <a:extLst>
+              <a:ext uri="{FF2B5EF4-FFF2-40B4-BE49-F238E27FC236}">
+                <a16:creationId xmlns:a16="http://schemas.microsoft.com/office/drawing/2014/main" id="{4215E334-A156-0A37-8EA1-E7F9F90CC8AE}"/>
+              </a:ext>
+            </a:extLst>
+          </p:cNvPr>
+          <p:cNvSpPr/>
+          <p:nvPr/>
+        </p:nvSpPr>
+        <p:spPr>
+          <a:xfrm rot="21057795">
+            <a:off x="2826171" y="5371031"/>
+            <a:ext cx="902204" cy="357064"/>
+          </a:xfrm>
+          <a:prstGeom prst="roundRect">
+            <a:avLst/>
+          </a:prstGeom>
+          <a:solidFill>
+            <a:schemeClr val="accent6">
+              <a:lumMod val="60000"/>
+              <a:lumOff val="40000"/>
             </a:schemeClr>
           </a:solidFill>
           <a:ln>
@@ -20130,28 +20807,46 @@
           </a:fontRef>
         </p:style>
         <p:txBody>
-          <a:bodyPr lIns="36000" tIns="36000" rIns="36000" bIns="36000" rtlCol="0" anchor="ctr"/>
+          <a:bodyPr lIns="36000" tIns="36000" rIns="36000" bIns="36000" rtlCol="0" anchor="t"/>
           <a:lstStyle/>
           <a:p>
             <a:pPr algn="ctr"/>
             <a:r>
-              <a:rPr lang="de-DE" sz="900" dirty="0">
+              <a:rPr lang="de-DE" sz="800" dirty="0">
                 <a:solidFill>
-                  <a:schemeClr val="bg1"/>
+                  <a:schemeClr val="tx1"/>
                 </a:solidFill>
                 <a:latin typeface="SBB Light" pitchFamily="2" charset="0"/>
               </a:rPr>
-              <a:t>Schlüsselkompetenzen S1</a:t>
+              <a:t>Architektur</a:t>
             </a:r>
+          </a:p>
+          <a:p>
+            <a:pPr algn="ctr"/>
+            <a:r>
+              <a:rPr lang="de-DE" sz="800" dirty="0">
+                <a:solidFill>
+                  <a:schemeClr val="tx1"/>
+                </a:solidFill>
+                <a:latin typeface="SBB Light" pitchFamily="2" charset="0"/>
+              </a:rPr>
+              <a:t>Workshop Puzzle</a:t>
+            </a:r>
+            <a:endParaRPr lang="de-DE" sz="400" dirty="0">
+              <a:solidFill>
+                <a:schemeClr val="tx1"/>
+              </a:solidFill>
+              <a:latin typeface="SBB Light" pitchFamily="2" charset="0"/>
+            </a:endParaRPr>
           </a:p>
         </p:txBody>
       </p:sp>
       <p:sp>
         <p:nvSpPr>
-          <p:cNvPr id="269" name="Rechteck: abgerundete Ecken 268">
-            <a:extLst>
-              <a:ext uri="{FF2B5EF4-FFF2-40B4-BE49-F238E27FC236}">
-                <a16:creationId xmlns:a16="http://schemas.microsoft.com/office/drawing/2014/main" id="{7A2E22F8-05D0-7205-B23C-4ADA9BF669CE}"/>
+          <p:cNvPr id="76" name="Pfeil: nach unten gekrümmt 75">
+            <a:extLst>
+              <a:ext uri="{FF2B5EF4-FFF2-40B4-BE49-F238E27FC236}">
+                <a16:creationId xmlns:a16="http://schemas.microsoft.com/office/drawing/2014/main" id="{80350C06-731E-672B-B2BB-AF3E8A44C99C}"/>
               </a:ext>
             </a:extLst>
           </p:cNvPr>
@@ -20159,21 +20854,13 @@
           <p:nvPr/>
         </p:nvSpPr>
         <p:spPr>
-          <a:xfrm>
-            <a:off x="9895557" y="5772053"/>
-            <a:ext cx="1154415" cy="232551"/>
+          <a:xfrm flipH="1">
+            <a:off x="2394155" y="47753"/>
+            <a:ext cx="3895161" cy="321755"/>
           </a:xfrm>
-          <a:prstGeom prst="roundRect">
+          <a:prstGeom prst="curvedDownArrow">
             <a:avLst/>
           </a:prstGeom>
-          <a:solidFill>
-            <a:schemeClr val="accent2">
-              <a:lumMod val="75000"/>
-            </a:schemeClr>
-          </a:solidFill>
-          <a:ln>
-            <a:noFill/>
-          </a:ln>
         </p:spPr>
         <p:style>
           <a:lnRef idx="2">
@@ -20192,681 +20879,11 @@
           </a:fontRef>
         </p:style>
         <p:txBody>
-          <a:bodyPr lIns="36000" tIns="36000" rIns="36000" bIns="36000" rtlCol="0" anchor="ctr"/>
+          <a:bodyPr rtlCol="0" anchor="ctr"/>
           <a:lstStyle/>
           <a:p>
             <a:pPr algn="ctr"/>
-            <a:r>
-              <a:rPr lang="de-DE" sz="900" dirty="0">
-                <a:solidFill>
-                  <a:schemeClr val="bg1"/>
-                </a:solidFill>
-                <a:latin typeface="SBB Light" pitchFamily="2" charset="0"/>
-              </a:rPr>
-              <a:t>Arbeitsmethodik A2</a:t>
-            </a:r>
-          </a:p>
-        </p:txBody>
-      </p:sp>
-      <p:sp>
-        <p:nvSpPr>
-          <p:cNvPr id="270" name="Rechteck: abgerundete Ecken 269">
-            <a:extLst>
-              <a:ext uri="{FF2B5EF4-FFF2-40B4-BE49-F238E27FC236}">
-                <a16:creationId xmlns:a16="http://schemas.microsoft.com/office/drawing/2014/main" id="{75AEEB2F-36E9-C484-359B-AA19B5FFC02B}"/>
-              </a:ext>
-            </a:extLst>
-          </p:cNvPr>
-          <p:cNvSpPr/>
-          <p:nvPr/>
-        </p:nvSpPr>
-        <p:spPr>
-          <a:xfrm>
-            <a:off x="978803" y="5799180"/>
-            <a:ext cx="1399545" cy="205424"/>
-          </a:xfrm>
-          <a:prstGeom prst="roundRect">
-            <a:avLst/>
-          </a:prstGeom>
-          <a:solidFill>
-            <a:schemeClr val="accent2">
-              <a:lumMod val="75000"/>
-            </a:schemeClr>
-          </a:solidFill>
-          <a:ln>
-            <a:noFill/>
-          </a:ln>
-        </p:spPr>
-        <p:style>
-          <a:lnRef idx="2">
-            <a:schemeClr val="accent1">
-              <a:shade val="15000"/>
-            </a:schemeClr>
-          </a:lnRef>
-          <a:fillRef idx="1">
-            <a:schemeClr val="accent1"/>
-          </a:fillRef>
-          <a:effectRef idx="0">
-            <a:schemeClr val="accent1"/>
-          </a:effectRef>
-          <a:fontRef idx="minor">
-            <a:schemeClr val="lt1"/>
-          </a:fontRef>
-        </p:style>
-        <p:txBody>
-          <a:bodyPr lIns="36000" tIns="36000" rIns="36000" bIns="36000" rtlCol="0" anchor="ctr"/>
-          <a:lstStyle/>
-          <a:p>
-            <a:pPr algn="ctr"/>
-            <a:r>
-              <a:rPr lang="de-DE" sz="900" dirty="0">
-                <a:solidFill>
-                  <a:schemeClr val="bg1"/>
-                </a:solidFill>
-                <a:latin typeface="SBB Light" pitchFamily="2" charset="0"/>
-              </a:rPr>
-              <a:t>Schlüsselkompetenzen S3</a:t>
-            </a:r>
-          </a:p>
-        </p:txBody>
-      </p:sp>
-      <p:sp>
-        <p:nvSpPr>
-          <p:cNvPr id="272" name="Rechteck: abgerundete Ecken 271">
-            <a:extLst>
-              <a:ext uri="{FF2B5EF4-FFF2-40B4-BE49-F238E27FC236}">
-                <a16:creationId xmlns:a16="http://schemas.microsoft.com/office/drawing/2014/main" id="{2F0B24E8-8990-9B37-E0B3-856043ACD4FC}"/>
-              </a:ext>
-            </a:extLst>
-          </p:cNvPr>
-          <p:cNvSpPr/>
-          <p:nvPr/>
-        </p:nvSpPr>
-        <p:spPr>
-          <a:xfrm>
-            <a:off x="6934695" y="5772053"/>
-            <a:ext cx="1154415" cy="232551"/>
-          </a:xfrm>
-          <a:prstGeom prst="roundRect">
-            <a:avLst/>
-          </a:prstGeom>
-          <a:solidFill>
-            <a:schemeClr val="accent2">
-              <a:lumMod val="75000"/>
-            </a:schemeClr>
-          </a:solidFill>
-          <a:ln>
-            <a:noFill/>
-          </a:ln>
-        </p:spPr>
-        <p:style>
-          <a:lnRef idx="2">
-            <a:schemeClr val="accent1">
-              <a:shade val="15000"/>
-            </a:schemeClr>
-          </a:lnRef>
-          <a:fillRef idx="1">
-            <a:schemeClr val="accent1"/>
-          </a:fillRef>
-          <a:effectRef idx="0">
-            <a:schemeClr val="accent1"/>
-          </a:effectRef>
-          <a:fontRef idx="minor">
-            <a:schemeClr val="lt1"/>
-          </a:fontRef>
-        </p:style>
-        <p:txBody>
-          <a:bodyPr lIns="36000" tIns="36000" rIns="36000" bIns="36000" rtlCol="0" anchor="ctr"/>
-          <a:lstStyle/>
-          <a:p>
-            <a:pPr algn="ctr"/>
-            <a:r>
-              <a:rPr lang="de-DE" sz="900" dirty="0">
-                <a:solidFill>
-                  <a:schemeClr val="bg1"/>
-                </a:solidFill>
-                <a:latin typeface="SBB Light" pitchFamily="2" charset="0"/>
-              </a:rPr>
-              <a:t>Arbeitsmethodik A2</a:t>
-            </a:r>
-          </a:p>
-        </p:txBody>
-      </p:sp>
-      <p:sp>
-        <p:nvSpPr>
-          <p:cNvPr id="120" name="Pfeil: nach rechts 119">
-            <a:extLst>
-              <a:ext uri="{FF2B5EF4-FFF2-40B4-BE49-F238E27FC236}">
-                <a16:creationId xmlns:a16="http://schemas.microsoft.com/office/drawing/2014/main" id="{2B26E032-3A92-8E3F-1F7E-C2F9012D2FB9}"/>
-              </a:ext>
-            </a:extLst>
-          </p:cNvPr>
-          <p:cNvSpPr/>
-          <p:nvPr/>
-        </p:nvSpPr>
-        <p:spPr>
-          <a:xfrm>
-            <a:off x="7902070" y="2988884"/>
-            <a:ext cx="716520" cy="186970"/>
-          </a:xfrm>
-          <a:prstGeom prst="rightArrow">
-            <a:avLst>
-              <a:gd name="adj1" fmla="val 100000"/>
-              <a:gd name="adj2" fmla="val 50000"/>
-            </a:avLst>
-          </a:prstGeom>
-          <a:solidFill>
-            <a:srgbClr val="83CBEB"/>
-          </a:solidFill>
-          <a:ln w="12700"/>
-        </p:spPr>
-        <p:style>
-          <a:lnRef idx="2">
-            <a:schemeClr val="accent1">
-              <a:shade val="15000"/>
-            </a:schemeClr>
-          </a:lnRef>
-          <a:fillRef idx="1">
-            <a:schemeClr val="accent1"/>
-          </a:fillRef>
-          <a:effectRef idx="0">
-            <a:schemeClr val="accent1"/>
-          </a:effectRef>
-          <a:fontRef idx="minor">
-            <a:schemeClr val="lt1"/>
-          </a:fontRef>
-        </p:style>
-        <p:txBody>
-          <a:bodyPr lIns="0" tIns="0" rIns="0" bIns="0" rtlCol="0" anchor="ctr"/>
-          <a:lstStyle/>
-          <a:p>
-            <a:r>
-              <a:rPr lang="de-DE" sz="600" dirty="0">
-                <a:solidFill>
-                  <a:schemeClr val="tx1"/>
-                </a:solidFill>
-                <a:latin typeface="SBB Light" pitchFamily="2" charset="0"/>
-              </a:rPr>
-              <a:t> 2: 20.11. - 28.11.</a:t>
-            </a:r>
-            <a:br>
-              <a:rPr lang="de-DE" sz="600" dirty="0">
-                <a:solidFill>
-                  <a:schemeClr val="tx1"/>
-                </a:solidFill>
-                <a:latin typeface="SBB Light" pitchFamily="2" charset="0"/>
-              </a:rPr>
-            </a:br>
-            <a:r>
-              <a:rPr lang="de-DE" sz="600" dirty="0">
-                <a:solidFill>
-                  <a:schemeClr val="tx1"/>
-                </a:solidFill>
-                <a:latin typeface="SBB Light" pitchFamily="2" charset="0"/>
-              </a:rPr>
-              <a:t> 3: 27.11. – 5.12.</a:t>
-            </a:r>
-            <a:endParaRPr lang="de-CH" sz="600" dirty="0">
-              <a:solidFill>
-                <a:schemeClr val="tx1"/>
-              </a:solidFill>
-              <a:latin typeface="SBB Light" pitchFamily="2" charset="0"/>
-            </a:endParaRPr>
-          </a:p>
-        </p:txBody>
-      </p:sp>
-      <p:sp>
-        <p:nvSpPr>
-          <p:cNvPr id="64" name="Rechteck 63">
-            <a:extLst>
-              <a:ext uri="{FF2B5EF4-FFF2-40B4-BE49-F238E27FC236}">
-                <a16:creationId xmlns:a16="http://schemas.microsoft.com/office/drawing/2014/main" id="{2000120B-9442-2E8F-46B2-4327946FACA2}"/>
-              </a:ext>
-            </a:extLst>
-          </p:cNvPr>
-          <p:cNvSpPr/>
-          <p:nvPr/>
-        </p:nvSpPr>
-        <p:spPr>
-          <a:xfrm>
-            <a:off x="8000468" y="2090248"/>
-            <a:ext cx="849206" cy="402898"/>
-          </a:xfrm>
-          <a:prstGeom prst="rect">
-            <a:avLst/>
-          </a:prstGeom>
-          <a:noFill/>
-          <a:ln>
-            <a:noFill/>
-          </a:ln>
-        </p:spPr>
-        <p:style>
-          <a:lnRef idx="2">
-            <a:schemeClr val="accent1">
-              <a:shade val="15000"/>
-            </a:schemeClr>
-          </a:lnRef>
-          <a:fillRef idx="1">
-            <a:schemeClr val="accent1"/>
-          </a:fillRef>
-          <a:effectRef idx="0">
-            <a:schemeClr val="accent1"/>
-          </a:effectRef>
-          <a:fontRef idx="minor">
-            <a:schemeClr val="lt1"/>
-          </a:fontRef>
-        </p:style>
-        <p:txBody>
-          <a:bodyPr rtlCol="0" anchor="t"/>
-          <a:lstStyle/>
-          <a:p>
-            <a:r>
-              <a:rPr lang="de-DE" sz="700" dirty="0">
-                <a:solidFill>
-                  <a:schemeClr val="tx1"/>
-                </a:solidFill>
-                <a:latin typeface="SBB Light" pitchFamily="2" charset="0"/>
-              </a:rPr>
-              <a:t>Kursgruppen:</a:t>
-            </a:r>
-          </a:p>
-          <a:p>
-            <a:r>
-              <a:rPr lang="de-DE" sz="700" dirty="0">
-                <a:solidFill>
-                  <a:schemeClr val="tx1"/>
-                </a:solidFill>
-                <a:latin typeface="SBB Light" pitchFamily="2" charset="0"/>
-              </a:rPr>
-              <a:t>2: 187-AE-K2-24</a:t>
-            </a:r>
-          </a:p>
-          <a:p>
-            <a:r>
-              <a:rPr lang="de-DE" sz="700" dirty="0">
-                <a:solidFill>
-                  <a:schemeClr val="tx1"/>
-                </a:solidFill>
-                <a:latin typeface="SBB Light" pitchFamily="2" charset="0"/>
-              </a:rPr>
-              <a:t>3: 187-AE-K3-24</a:t>
-            </a:r>
-            <a:br>
-              <a:rPr lang="de-DE" sz="700" dirty="0">
-                <a:solidFill>
-                  <a:schemeClr val="tx1"/>
-                </a:solidFill>
-                <a:latin typeface="SBB Light" pitchFamily="2" charset="0"/>
-              </a:rPr>
-            </a:br>
-            <a:endParaRPr lang="de-CH" sz="700" dirty="0">
-              <a:solidFill>
-                <a:schemeClr val="tx1"/>
-              </a:solidFill>
-              <a:latin typeface="SBB Light" pitchFamily="2" charset="0"/>
-            </a:endParaRPr>
-          </a:p>
-        </p:txBody>
-      </p:sp>
-      <p:sp>
-        <p:nvSpPr>
-          <p:cNvPr id="65" name="Pfeil: nach rechts 64">
-            <a:extLst>
-              <a:ext uri="{FF2B5EF4-FFF2-40B4-BE49-F238E27FC236}">
-                <a16:creationId xmlns:a16="http://schemas.microsoft.com/office/drawing/2014/main" id="{7F555871-FC67-799D-C5F1-AC181D63A124}"/>
-              </a:ext>
-            </a:extLst>
-          </p:cNvPr>
-          <p:cNvSpPr/>
-          <p:nvPr/>
-        </p:nvSpPr>
-        <p:spPr>
-          <a:xfrm>
-            <a:off x="8977666" y="6150372"/>
-            <a:ext cx="716520" cy="186970"/>
-          </a:xfrm>
-          <a:prstGeom prst="rightArrow">
-            <a:avLst>
-              <a:gd name="adj1" fmla="val 100000"/>
-              <a:gd name="adj2" fmla="val 50000"/>
-            </a:avLst>
-          </a:prstGeom>
-          <a:solidFill>
-            <a:srgbClr val="83CBEB"/>
-          </a:solidFill>
-          <a:ln w="12700"/>
-        </p:spPr>
-        <p:style>
-          <a:lnRef idx="2">
-            <a:schemeClr val="accent1">
-              <a:shade val="15000"/>
-            </a:schemeClr>
-          </a:lnRef>
-          <a:fillRef idx="1">
-            <a:schemeClr val="accent1"/>
-          </a:fillRef>
-          <a:effectRef idx="0">
-            <a:schemeClr val="accent1"/>
-          </a:effectRef>
-          <a:fontRef idx="minor">
-            <a:schemeClr val="lt1"/>
-          </a:fontRef>
-        </p:style>
-        <p:txBody>
-          <a:bodyPr lIns="0" tIns="0" rIns="0" bIns="0" rtlCol="0" anchor="ctr"/>
-          <a:lstStyle/>
-          <a:p>
-            <a:r>
-              <a:rPr lang="de-DE" sz="600" dirty="0">
-                <a:solidFill>
-                  <a:schemeClr val="tx1"/>
-                </a:solidFill>
-                <a:latin typeface="SBB Light" pitchFamily="2" charset="0"/>
-              </a:rPr>
-              <a:t> 3: 4.6. – 13.6. </a:t>
-            </a:r>
-            <a:br>
-              <a:rPr lang="de-DE" sz="600" dirty="0">
-                <a:solidFill>
-                  <a:schemeClr val="tx1"/>
-                </a:solidFill>
-                <a:latin typeface="SBB Light" pitchFamily="2" charset="0"/>
-              </a:rPr>
-            </a:br>
-            <a:r>
-              <a:rPr lang="de-DE" sz="600" dirty="0">
-                <a:solidFill>
-                  <a:schemeClr val="tx1"/>
-                </a:solidFill>
-                <a:latin typeface="SBB Light" pitchFamily="2" charset="0"/>
-              </a:rPr>
-              <a:t> 2: 18.6. – 26.6.</a:t>
-            </a:r>
-            <a:endParaRPr lang="de-CH" sz="600" dirty="0">
-              <a:solidFill>
-                <a:schemeClr val="tx1"/>
-              </a:solidFill>
-              <a:latin typeface="SBB Light" pitchFamily="2" charset="0"/>
-            </a:endParaRPr>
-          </a:p>
-        </p:txBody>
-      </p:sp>
-      <p:sp>
-        <p:nvSpPr>
-          <p:cNvPr id="66" name="Rechteck 65">
-            <a:extLst>
-              <a:ext uri="{FF2B5EF4-FFF2-40B4-BE49-F238E27FC236}">
-                <a16:creationId xmlns:a16="http://schemas.microsoft.com/office/drawing/2014/main" id="{B672839B-34A8-4F87-679B-5E13FBA3D450}"/>
-              </a:ext>
-            </a:extLst>
-          </p:cNvPr>
-          <p:cNvSpPr/>
-          <p:nvPr/>
-        </p:nvSpPr>
-        <p:spPr>
-          <a:xfrm>
-            <a:off x="8913782" y="5251560"/>
-            <a:ext cx="906467" cy="402898"/>
-          </a:xfrm>
-          <a:prstGeom prst="rect">
-            <a:avLst/>
-          </a:prstGeom>
-          <a:noFill/>
-          <a:ln>
-            <a:noFill/>
-          </a:ln>
-        </p:spPr>
-        <p:style>
-          <a:lnRef idx="2">
-            <a:schemeClr val="accent1">
-              <a:shade val="15000"/>
-            </a:schemeClr>
-          </a:lnRef>
-          <a:fillRef idx="1">
-            <a:schemeClr val="accent1"/>
-          </a:fillRef>
-          <a:effectRef idx="0">
-            <a:schemeClr val="accent1"/>
-          </a:effectRef>
-          <a:fontRef idx="minor">
-            <a:schemeClr val="lt1"/>
-          </a:fontRef>
-        </p:style>
-        <p:txBody>
-          <a:bodyPr rtlCol="0" anchor="t"/>
-          <a:lstStyle/>
-          <a:p>
-            <a:r>
-              <a:rPr lang="de-DE" sz="700" dirty="0">
-                <a:solidFill>
-                  <a:schemeClr val="tx1"/>
-                </a:solidFill>
-                <a:latin typeface="SBB Light" pitchFamily="2" charset="0"/>
-              </a:rPr>
-              <a:t>Kursgruppen:</a:t>
-            </a:r>
-          </a:p>
-          <a:p>
-            <a:r>
-              <a:rPr lang="de-DE" sz="700" dirty="0">
-                <a:solidFill>
-                  <a:schemeClr val="tx1"/>
-                </a:solidFill>
-                <a:latin typeface="SBB Light" pitchFamily="2" charset="0"/>
-              </a:rPr>
-              <a:t>3: 106-AE-K3-24</a:t>
-            </a:r>
-          </a:p>
-          <a:p>
-            <a:r>
-              <a:rPr lang="de-DE" sz="700" dirty="0">
-                <a:solidFill>
-                  <a:schemeClr val="tx1"/>
-                </a:solidFill>
-                <a:latin typeface="SBB Light" pitchFamily="2" charset="0"/>
-              </a:rPr>
-              <a:t>2: 106-AE-K2-24</a:t>
-            </a:r>
-            <a:br>
-              <a:rPr lang="de-DE" sz="700" dirty="0">
-                <a:solidFill>
-                  <a:schemeClr val="tx1"/>
-                </a:solidFill>
-                <a:latin typeface="SBB Light" pitchFamily="2" charset="0"/>
-              </a:rPr>
-            </a:br>
-            <a:endParaRPr lang="de-CH" sz="700" dirty="0">
-              <a:solidFill>
-                <a:schemeClr val="tx1"/>
-              </a:solidFill>
-              <a:latin typeface="SBB Light" pitchFamily="2" charset="0"/>
-            </a:endParaRPr>
-          </a:p>
-        </p:txBody>
-      </p:sp>
-      <p:sp>
-        <p:nvSpPr>
-          <p:cNvPr id="271" name="Rechteck: abgerundete Ecken 270">
-            <a:extLst>
-              <a:ext uri="{FF2B5EF4-FFF2-40B4-BE49-F238E27FC236}">
-                <a16:creationId xmlns:a16="http://schemas.microsoft.com/office/drawing/2014/main" id="{6AAE397B-F5BA-828B-34DF-067B2E020C3D}"/>
-              </a:ext>
-            </a:extLst>
-          </p:cNvPr>
-          <p:cNvSpPr/>
-          <p:nvPr/>
-        </p:nvSpPr>
-        <p:spPr>
-          <a:xfrm>
-            <a:off x="608786" y="5557907"/>
-            <a:ext cx="1705516" cy="212066"/>
-          </a:xfrm>
-          <a:prstGeom prst="roundRect">
-            <a:avLst/>
-          </a:prstGeom>
-          <a:solidFill>
-            <a:schemeClr val="accent2">
-              <a:lumMod val="75000"/>
-            </a:schemeClr>
-          </a:solidFill>
-          <a:ln>
-            <a:noFill/>
-          </a:ln>
-        </p:spPr>
-        <p:style>
-          <a:lnRef idx="2">
-            <a:schemeClr val="accent1">
-              <a:shade val="15000"/>
-            </a:schemeClr>
-          </a:lnRef>
-          <a:fillRef idx="1">
-            <a:schemeClr val="accent1"/>
-          </a:fillRef>
-          <a:effectRef idx="0">
-            <a:schemeClr val="accent1"/>
-          </a:effectRef>
-          <a:fontRef idx="minor">
-            <a:schemeClr val="lt1"/>
-          </a:fontRef>
-        </p:style>
-        <p:txBody>
-          <a:bodyPr lIns="36000" tIns="36000" rIns="36000" bIns="36000" rtlCol="0" anchor="ctr"/>
-          <a:lstStyle/>
-          <a:p>
-            <a:pPr algn="ctr"/>
-            <a:r>
-              <a:rPr lang="de-DE" sz="900" dirty="0">
-                <a:solidFill>
-                  <a:schemeClr val="bg1">
-                    <a:lumMod val="95000"/>
-                  </a:schemeClr>
-                </a:solidFill>
-                <a:latin typeface="SBB Light" pitchFamily="2" charset="0"/>
-              </a:rPr>
-              <a:t>Barrierefreiheit/Accessibility</a:t>
-            </a:r>
-          </a:p>
-        </p:txBody>
-      </p:sp>
-      <p:sp>
-        <p:nvSpPr>
-          <p:cNvPr id="70" name="Textfeld 69">
-            <a:extLst>
-              <a:ext uri="{FF2B5EF4-FFF2-40B4-BE49-F238E27FC236}">
-                <a16:creationId xmlns:a16="http://schemas.microsoft.com/office/drawing/2014/main" id="{42697A38-BA43-BB46-0E29-AE20908BE8DA}"/>
-              </a:ext>
-            </a:extLst>
-          </p:cNvPr>
-          <p:cNvSpPr txBox="1"/>
-          <p:nvPr/>
-        </p:nvSpPr>
-        <p:spPr>
-          <a:xfrm>
-            <a:off x="2280947" y="5556027"/>
-            <a:ext cx="554729" cy="200055"/>
-          </a:xfrm>
-          <a:prstGeom prst="rect">
-            <a:avLst/>
-          </a:prstGeom>
-          <a:noFill/>
-          <a:ln>
-            <a:noFill/>
-          </a:ln>
-        </p:spPr>
-        <p:style>
-          <a:lnRef idx="2">
-            <a:schemeClr val="accent1">
-              <a:shade val="15000"/>
-            </a:schemeClr>
-          </a:lnRef>
-          <a:fillRef idx="1">
-            <a:schemeClr val="accent1"/>
-          </a:fillRef>
-          <a:effectRef idx="0">
-            <a:schemeClr val="accent1"/>
-          </a:effectRef>
-          <a:fontRef idx="minor">
-            <a:schemeClr val="lt1"/>
-          </a:fontRef>
-        </p:style>
-        <p:txBody>
-          <a:bodyPr rtlCol="0" anchor="t"/>
-          <a:lstStyle>
-            <a:defPPr>
-              <a:defRPr lang="de-DE"/>
-            </a:defPPr>
-            <a:lvl1pPr>
-              <a:defRPr sz="700">
-                <a:latin typeface="SBB Light" pitchFamily="2" charset="0"/>
-              </a:defRPr>
-            </a:lvl1pPr>
-            <a:lvl2pPr>
-              <a:defRPr>
-                <a:solidFill>
-                  <a:schemeClr val="lt1"/>
-                </a:solidFill>
-              </a:defRPr>
-            </a:lvl2pPr>
-            <a:lvl3pPr>
-              <a:defRPr>
-                <a:solidFill>
-                  <a:schemeClr val="lt1"/>
-                </a:solidFill>
-              </a:defRPr>
-            </a:lvl3pPr>
-            <a:lvl4pPr>
-              <a:defRPr>
-                <a:solidFill>
-                  <a:schemeClr val="lt1"/>
-                </a:solidFill>
-              </a:defRPr>
-            </a:lvl4pPr>
-            <a:lvl5pPr>
-              <a:defRPr>
-                <a:solidFill>
-                  <a:schemeClr val="lt1"/>
-                </a:solidFill>
-              </a:defRPr>
-            </a:lvl5pPr>
-            <a:lvl6pPr>
-              <a:defRPr>
-                <a:solidFill>
-                  <a:schemeClr val="lt1"/>
-                </a:solidFill>
-              </a:defRPr>
-            </a:lvl6pPr>
-            <a:lvl7pPr>
-              <a:defRPr>
-                <a:solidFill>
-                  <a:schemeClr val="lt1"/>
-                </a:solidFill>
-              </a:defRPr>
-            </a:lvl7pPr>
-            <a:lvl8pPr>
-              <a:defRPr>
-                <a:solidFill>
-                  <a:schemeClr val="lt1"/>
-                </a:solidFill>
-              </a:defRPr>
-            </a:lvl8pPr>
-            <a:lvl9pPr>
-              <a:defRPr>
-                <a:solidFill>
-                  <a:schemeClr val="lt1"/>
-                </a:solidFill>
-              </a:defRPr>
-            </a:lvl9pPr>
-          </a:lstStyle>
-          <a:p>
-            <a:r>
-              <a:rPr lang="de-DE" dirty="0">
-                <a:solidFill>
-                  <a:schemeClr val="tx1"/>
-                </a:solidFill>
-              </a:rPr>
-              <a:t>29.1./5.2</a:t>
-            </a:r>
-            <a:endParaRPr lang="de-CH" dirty="0">
+            <a:endParaRPr lang="de-CH">
               <a:solidFill>
                 <a:schemeClr val="tx1"/>
               </a:solidFill>

</xml_diff>

<commit_message>
feature(refactor-overview): new ordering of modules, added link from personal_bitbucket_repo.md to git install
</commit_message>
<xml_diff>
--- a/content/en/docs/overview/INF_Basisausbildung_Teil_1_Modulplan.pptx
+++ b/content/en/docs/overview/INF_Basisausbildung_Teil_1_Modulplan.pptx
@@ -3066,7 +3066,7 @@
           <a:p>
             <a:fld id="{37C84E4B-B338-4193-A47A-275E09D9F7E4}" type="datetimeFigureOut">
               <a:rPr lang="de-CH" smtClean="0"/>
-              <a:t>21.10.2024</a:t>
+              <a:t>22.10.2024</a:t>
             </a:fld>
             <a:endParaRPr lang="de-CH" dirty="0"/>
           </a:p>
@@ -3567,7 +3567,7 @@
           <a:p>
             <a:fld id="{19D283FB-C38C-4A98-BBD1-312954666360}" type="datetimeFigureOut">
               <a:rPr lang="de-CH" smtClean="0"/>
-              <a:t>21.10.2024</a:t>
+              <a:t>22.10.2024</a:t>
             </a:fld>
             <a:endParaRPr lang="de-CH" dirty="0"/>
           </a:p>
@@ -3767,7 +3767,7 @@
           <a:p>
             <a:fld id="{19D283FB-C38C-4A98-BBD1-312954666360}" type="datetimeFigureOut">
               <a:rPr lang="de-CH" smtClean="0"/>
-              <a:t>21.10.2024</a:t>
+              <a:t>22.10.2024</a:t>
             </a:fld>
             <a:endParaRPr lang="de-CH" dirty="0"/>
           </a:p>
@@ -3977,7 +3977,7 @@
           <a:p>
             <a:fld id="{19D283FB-C38C-4A98-BBD1-312954666360}" type="datetimeFigureOut">
               <a:rPr lang="de-CH" smtClean="0"/>
-              <a:t>21.10.2024</a:t>
+              <a:t>22.10.2024</a:t>
             </a:fld>
             <a:endParaRPr lang="de-CH" dirty="0"/>
           </a:p>
@@ -4177,7 +4177,7 @@
           <a:p>
             <a:fld id="{19D283FB-C38C-4A98-BBD1-312954666360}" type="datetimeFigureOut">
               <a:rPr lang="de-CH" smtClean="0"/>
-              <a:t>21.10.2024</a:t>
+              <a:t>22.10.2024</a:t>
             </a:fld>
             <a:endParaRPr lang="de-CH" dirty="0"/>
           </a:p>
@@ -4453,7 +4453,7 @@
           <a:p>
             <a:fld id="{19D283FB-C38C-4A98-BBD1-312954666360}" type="datetimeFigureOut">
               <a:rPr lang="de-CH" smtClean="0"/>
-              <a:t>21.10.2024</a:t>
+              <a:t>22.10.2024</a:t>
             </a:fld>
             <a:endParaRPr lang="de-CH" dirty="0"/>
           </a:p>
@@ -4721,7 +4721,7 @@
           <a:p>
             <a:fld id="{19D283FB-C38C-4A98-BBD1-312954666360}" type="datetimeFigureOut">
               <a:rPr lang="de-CH" smtClean="0"/>
-              <a:t>21.10.2024</a:t>
+              <a:t>22.10.2024</a:t>
             </a:fld>
             <a:endParaRPr lang="de-CH" dirty="0"/>
           </a:p>
@@ -5136,7 +5136,7 @@
           <a:p>
             <a:fld id="{19D283FB-C38C-4A98-BBD1-312954666360}" type="datetimeFigureOut">
               <a:rPr lang="de-CH" smtClean="0"/>
-              <a:t>21.10.2024</a:t>
+              <a:t>22.10.2024</a:t>
             </a:fld>
             <a:endParaRPr lang="de-CH" dirty="0"/>
           </a:p>
@@ -5278,7 +5278,7 @@
           <a:p>
             <a:fld id="{19D283FB-C38C-4A98-BBD1-312954666360}" type="datetimeFigureOut">
               <a:rPr lang="de-CH" smtClean="0"/>
-              <a:t>21.10.2024</a:t>
+              <a:t>22.10.2024</a:t>
             </a:fld>
             <a:endParaRPr lang="de-CH" dirty="0"/>
           </a:p>
@@ -5391,7 +5391,7 @@
           <a:p>
             <a:fld id="{19D283FB-C38C-4A98-BBD1-312954666360}" type="datetimeFigureOut">
               <a:rPr lang="de-CH" smtClean="0"/>
-              <a:t>21.10.2024</a:t>
+              <a:t>22.10.2024</a:t>
             </a:fld>
             <a:endParaRPr lang="de-CH" dirty="0"/>
           </a:p>
@@ -5704,7 +5704,7 @@
           <a:p>
             <a:fld id="{19D283FB-C38C-4A98-BBD1-312954666360}" type="datetimeFigureOut">
               <a:rPr lang="de-CH" smtClean="0"/>
-              <a:t>21.10.2024</a:t>
+              <a:t>22.10.2024</a:t>
             </a:fld>
             <a:endParaRPr lang="de-CH" dirty="0"/>
           </a:p>
@@ -5993,7 +5993,7 @@
           <a:p>
             <a:fld id="{19D283FB-C38C-4A98-BBD1-312954666360}" type="datetimeFigureOut">
               <a:rPr lang="de-CH" smtClean="0"/>
-              <a:t>21.10.2024</a:t>
+              <a:t>22.10.2024</a:t>
             </a:fld>
             <a:endParaRPr lang="de-CH" dirty="0"/>
           </a:p>
@@ -6236,7 +6236,7 @@
           <a:p>
             <a:fld id="{19D283FB-C38C-4A98-BBD1-312954666360}" type="datetimeFigureOut">
               <a:rPr lang="de-CH" smtClean="0"/>
-              <a:t>21.10.2024</a:t>
+              <a:t>22.10.2024</a:t>
             </a:fld>
             <a:endParaRPr lang="de-CH" dirty="0"/>
           </a:p>
@@ -20888,6 +20888,52 @@
                 <a:schemeClr val="tx1"/>
               </a:solidFill>
             </a:endParaRPr>
+          </a:p>
+        </p:txBody>
+      </p:sp>
+      <p:sp>
+        <p:nvSpPr>
+          <p:cNvPr id="228" name="Pfeil: nach unten 227">
+            <a:extLst>
+              <a:ext uri="{FF2B5EF4-FFF2-40B4-BE49-F238E27FC236}">
+                <a16:creationId xmlns:a16="http://schemas.microsoft.com/office/drawing/2014/main" id="{CC30F1E1-8247-84F3-05C5-1A431B2DF181}"/>
+              </a:ext>
+            </a:extLst>
+          </p:cNvPr>
+          <p:cNvSpPr/>
+          <p:nvPr/>
+        </p:nvSpPr>
+        <p:spPr>
+          <a:xfrm rot="2807483">
+            <a:off x="5830921" y="1911872"/>
+            <a:ext cx="220323" cy="1861435"/>
+          </a:xfrm>
+          <a:prstGeom prst="downArrow">
+            <a:avLst/>
+          </a:prstGeom>
+        </p:spPr>
+        <p:style>
+          <a:lnRef idx="2">
+            <a:schemeClr val="accent1">
+              <a:shade val="15000"/>
+            </a:schemeClr>
+          </a:lnRef>
+          <a:fillRef idx="1">
+            <a:schemeClr val="accent1"/>
+          </a:fillRef>
+          <a:effectRef idx="0">
+            <a:schemeClr val="accent1"/>
+          </a:effectRef>
+          <a:fontRef idx="minor">
+            <a:schemeClr val="lt1"/>
+          </a:fontRef>
+        </p:style>
+        <p:txBody>
+          <a:bodyPr rtlCol="0" anchor="ctr"/>
+          <a:lstStyle/>
+          <a:p>
+            <a:pPr algn="ctr"/>
+            <a:endParaRPr lang="de-CH"/>
           </a:p>
         </p:txBody>
       </p:sp>

</xml_diff>

<commit_message>
feature(refactor-overview): new ordering of modules, added link from lombok to git module,  moved debugging to java-grundlagen and updated links, replaced #Jxy module numbers with new correct ones
</commit_message>
<xml_diff>
--- a/content/en/docs/overview/INF_Basisausbildung_Teil_1_Modulplan.pptx
+++ b/content/en/docs/overview/INF_Basisausbildung_Teil_1_Modulplan.pptx
@@ -3066,7 +3066,7 @@
           <a:p>
             <a:fld id="{37C84E4B-B338-4193-A47A-275E09D9F7E4}" type="datetimeFigureOut">
               <a:rPr lang="de-CH" smtClean="0"/>
-              <a:t>22.10.2024</a:t>
+              <a:t>23.10.2024</a:t>
             </a:fld>
             <a:endParaRPr lang="de-CH" dirty="0"/>
           </a:p>
@@ -3567,7 +3567,7 @@
           <a:p>
             <a:fld id="{19D283FB-C38C-4A98-BBD1-312954666360}" type="datetimeFigureOut">
               <a:rPr lang="de-CH" smtClean="0"/>
-              <a:t>22.10.2024</a:t>
+              <a:t>23.10.2024</a:t>
             </a:fld>
             <a:endParaRPr lang="de-CH" dirty="0"/>
           </a:p>
@@ -3767,7 +3767,7 @@
           <a:p>
             <a:fld id="{19D283FB-C38C-4A98-BBD1-312954666360}" type="datetimeFigureOut">
               <a:rPr lang="de-CH" smtClean="0"/>
-              <a:t>22.10.2024</a:t>
+              <a:t>23.10.2024</a:t>
             </a:fld>
             <a:endParaRPr lang="de-CH" dirty="0"/>
           </a:p>
@@ -3977,7 +3977,7 @@
           <a:p>
             <a:fld id="{19D283FB-C38C-4A98-BBD1-312954666360}" type="datetimeFigureOut">
               <a:rPr lang="de-CH" smtClean="0"/>
-              <a:t>22.10.2024</a:t>
+              <a:t>23.10.2024</a:t>
             </a:fld>
             <a:endParaRPr lang="de-CH" dirty="0"/>
           </a:p>
@@ -4177,7 +4177,7 @@
           <a:p>
             <a:fld id="{19D283FB-C38C-4A98-BBD1-312954666360}" type="datetimeFigureOut">
               <a:rPr lang="de-CH" smtClean="0"/>
-              <a:t>22.10.2024</a:t>
+              <a:t>23.10.2024</a:t>
             </a:fld>
             <a:endParaRPr lang="de-CH" dirty="0"/>
           </a:p>
@@ -4453,7 +4453,7 @@
           <a:p>
             <a:fld id="{19D283FB-C38C-4A98-BBD1-312954666360}" type="datetimeFigureOut">
               <a:rPr lang="de-CH" smtClean="0"/>
-              <a:t>22.10.2024</a:t>
+              <a:t>23.10.2024</a:t>
             </a:fld>
             <a:endParaRPr lang="de-CH" dirty="0"/>
           </a:p>
@@ -4721,7 +4721,7 @@
           <a:p>
             <a:fld id="{19D283FB-C38C-4A98-BBD1-312954666360}" type="datetimeFigureOut">
               <a:rPr lang="de-CH" smtClean="0"/>
-              <a:t>22.10.2024</a:t>
+              <a:t>23.10.2024</a:t>
             </a:fld>
             <a:endParaRPr lang="de-CH" dirty="0"/>
           </a:p>
@@ -5136,7 +5136,7 @@
           <a:p>
             <a:fld id="{19D283FB-C38C-4A98-BBD1-312954666360}" type="datetimeFigureOut">
               <a:rPr lang="de-CH" smtClean="0"/>
-              <a:t>22.10.2024</a:t>
+              <a:t>23.10.2024</a:t>
             </a:fld>
             <a:endParaRPr lang="de-CH" dirty="0"/>
           </a:p>
@@ -5278,7 +5278,7 @@
           <a:p>
             <a:fld id="{19D283FB-C38C-4A98-BBD1-312954666360}" type="datetimeFigureOut">
               <a:rPr lang="de-CH" smtClean="0"/>
-              <a:t>22.10.2024</a:t>
+              <a:t>23.10.2024</a:t>
             </a:fld>
             <a:endParaRPr lang="de-CH" dirty="0"/>
           </a:p>
@@ -5391,7 +5391,7 @@
           <a:p>
             <a:fld id="{19D283FB-C38C-4A98-BBD1-312954666360}" type="datetimeFigureOut">
               <a:rPr lang="de-CH" smtClean="0"/>
-              <a:t>22.10.2024</a:t>
+              <a:t>23.10.2024</a:t>
             </a:fld>
             <a:endParaRPr lang="de-CH" dirty="0"/>
           </a:p>
@@ -5704,7 +5704,7 @@
           <a:p>
             <a:fld id="{19D283FB-C38C-4A98-BBD1-312954666360}" type="datetimeFigureOut">
               <a:rPr lang="de-CH" smtClean="0"/>
-              <a:t>22.10.2024</a:t>
+              <a:t>23.10.2024</a:t>
             </a:fld>
             <a:endParaRPr lang="de-CH" dirty="0"/>
           </a:p>
@@ -5993,7 +5993,7 @@
           <a:p>
             <a:fld id="{19D283FB-C38C-4A98-BBD1-312954666360}" type="datetimeFigureOut">
               <a:rPr lang="de-CH" smtClean="0"/>
-              <a:t>22.10.2024</a:t>
+              <a:t>23.10.2024</a:t>
             </a:fld>
             <a:endParaRPr lang="de-CH" dirty="0"/>
           </a:p>
@@ -6236,7 +6236,7 @@
           <a:p>
             <a:fld id="{19D283FB-C38C-4A98-BBD1-312954666360}" type="datetimeFigureOut">
               <a:rPr lang="de-CH" smtClean="0"/>
-              <a:t>22.10.2024</a:t>
+              <a:t>23.10.2024</a:t>
             </a:fld>
             <a:endParaRPr lang="de-CH" dirty="0"/>
           </a:p>
@@ -6755,8 +6755,8 @@
         </p:nvSpPr>
         <p:spPr>
           <a:xfrm>
-            <a:off x="10858809" y="1823168"/>
-            <a:ext cx="1213288" cy="1133967"/>
+            <a:off x="10858809" y="3695972"/>
+            <a:ext cx="1154412" cy="1241028"/>
           </a:xfrm>
           <a:prstGeom prst="rect">
             <a:avLst/>
@@ -6908,8 +6908,8 @@
         </p:nvSpPr>
         <p:spPr>
           <a:xfrm>
-            <a:off x="11256092" y="240546"/>
-            <a:ext cx="820358" cy="1523887"/>
+            <a:off x="11256092" y="672517"/>
+            <a:ext cx="820358" cy="1290309"/>
           </a:xfrm>
           <a:prstGeom prst="rect">
             <a:avLst/>
@@ -6999,7 +6999,7 @@
                 </a:solidFill>
                 <a:latin typeface="SBB Light" pitchFamily="2" charset="0"/>
               </a:rPr>
-              <a:t>Maven / Testing</a:t>
+              <a:t>Spring</a:t>
             </a:r>
           </a:p>
           <a:p>
@@ -7015,30 +7015,8 @@
                 </a:solidFill>
                 <a:latin typeface="SBB Light" pitchFamily="2" charset="0"/>
               </a:rPr>
-              <a:t>Spring </a:t>
+              <a:t>Projektreife </a:t>
             </a:r>
-          </a:p>
-          <a:p>
-            <a:pPr>
-              <a:lnSpc>
-                <a:spcPct val="200000"/>
-              </a:lnSpc>
-            </a:pPr>
-            <a:r>
-              <a:rPr lang="de-DE" sz="800" dirty="0">
-                <a:solidFill>
-                  <a:schemeClr val="tx1"/>
-                </a:solidFill>
-                <a:latin typeface="SBB Light" pitchFamily="2" charset="0"/>
-              </a:rPr>
-              <a:t>Projektreife</a:t>
-            </a:r>
-            <a:endParaRPr lang="de-CH" sz="800" dirty="0">
-              <a:solidFill>
-                <a:schemeClr val="tx1"/>
-              </a:solidFill>
-              <a:latin typeface="SBB Light" pitchFamily="2" charset="0"/>
-            </a:endParaRPr>
           </a:p>
         </p:txBody>
       </p:sp>
@@ -7655,10 +7633,7 @@
             <a:chExt cx="914400" cy="1608399"/>
           </a:xfrm>
           <a:solidFill>
-            <a:schemeClr val="accent6">
-              <a:lumMod val="60000"/>
-              <a:lumOff val="40000"/>
-            </a:schemeClr>
+            <a:srgbClr val="5AC036"/>
           </a:solidFill>
         </p:grpSpPr>
         <p:sp>
@@ -7857,226 +7832,6 @@
       </p:grpSp>
       <p:grpSp>
         <p:nvGrpSpPr>
-          <p:cNvPr id="27" name="Gruppieren 26">
-            <a:extLst>
-              <a:ext uri="{FF2B5EF4-FFF2-40B4-BE49-F238E27FC236}">
-                <a16:creationId xmlns:a16="http://schemas.microsoft.com/office/drawing/2014/main" id="{41C79572-E199-19FF-6B28-DB93A550215B}"/>
-              </a:ext>
-            </a:extLst>
-          </p:cNvPr>
-          <p:cNvGrpSpPr/>
-          <p:nvPr/>
-        </p:nvGrpSpPr>
-        <p:grpSpPr>
-          <a:xfrm>
-            <a:off x="3370046" y="482233"/>
-            <a:ext cx="914400" cy="1608399"/>
-            <a:chOff x="1097280" y="1092558"/>
-            <a:chExt cx="914400" cy="1608399"/>
-          </a:xfrm>
-          <a:solidFill>
-            <a:schemeClr val="accent6">
-              <a:lumMod val="60000"/>
-              <a:lumOff val="40000"/>
-            </a:schemeClr>
-          </a:solidFill>
-        </p:grpSpPr>
-        <p:sp>
-          <p:nvSpPr>
-            <p:cNvPr id="28" name="Rechteck: abgerundete Ecken 27">
-              <a:extLst>
-                <a:ext uri="{FF2B5EF4-FFF2-40B4-BE49-F238E27FC236}">
-                  <a16:creationId xmlns:a16="http://schemas.microsoft.com/office/drawing/2014/main" id="{5EE31C42-18D7-6D0A-796D-30F478865109}"/>
-                </a:ext>
-              </a:extLst>
-            </p:cNvPr>
-            <p:cNvSpPr/>
-            <p:nvPr/>
-          </p:nvSpPr>
-          <p:spPr>
-            <a:xfrm>
-              <a:off x="1097280" y="1092558"/>
-              <a:ext cx="914400" cy="1608399"/>
-            </a:xfrm>
-            <a:prstGeom prst="roundRect">
-              <a:avLst/>
-            </a:prstGeom>
-            <a:grpFill/>
-            <a:ln>
-              <a:noFill/>
-            </a:ln>
-          </p:spPr>
-          <p:style>
-            <a:lnRef idx="2">
-              <a:schemeClr val="accent1">
-                <a:shade val="15000"/>
-              </a:schemeClr>
-            </a:lnRef>
-            <a:fillRef idx="1">
-              <a:schemeClr val="accent1"/>
-            </a:fillRef>
-            <a:effectRef idx="0">
-              <a:schemeClr val="accent1"/>
-            </a:effectRef>
-            <a:fontRef idx="minor">
-              <a:schemeClr val="lt1"/>
-            </a:fontRef>
-          </p:style>
-          <p:txBody>
-            <a:bodyPr lIns="36000" tIns="36000" rIns="36000" bIns="36000" rtlCol="0" anchor="t"/>
-            <a:lstStyle/>
-            <a:p>
-              <a:pPr algn="ctr"/>
-              <a:r>
-                <a:rPr lang="de-DE" sz="1100" dirty="0">
-                  <a:solidFill>
-                    <a:schemeClr val="tx1"/>
-                  </a:solidFill>
-                  <a:latin typeface="SBB Light" pitchFamily="2" charset="0"/>
-                </a:rPr>
-                <a:t>Java</a:t>
-              </a:r>
-              <a:br>
-                <a:rPr lang="de-DE" sz="1100" dirty="0">
-                  <a:solidFill>
-                    <a:schemeClr val="tx1"/>
-                  </a:solidFill>
-                  <a:latin typeface="SBB Light" pitchFamily="2" charset="0"/>
-                </a:rPr>
-              </a:br>
-              <a:r>
-                <a:rPr lang="de-DE" sz="1100" dirty="0">
-                  <a:solidFill>
-                    <a:schemeClr val="tx1"/>
-                  </a:solidFill>
-                  <a:latin typeface="SBB Light" pitchFamily="2" charset="0"/>
-                </a:rPr>
-                <a:t>Grundlagen</a:t>
-              </a:r>
-            </a:p>
-            <a:p>
-              <a:pPr algn="ctr"/>
-              <a:endParaRPr lang="de-DE" sz="800" dirty="0">
-                <a:solidFill>
-                  <a:schemeClr val="tx1"/>
-                </a:solidFill>
-                <a:latin typeface="SBB Light" pitchFamily="2" charset="0"/>
-              </a:endParaRPr>
-            </a:p>
-            <a:p>
-              <a:pPr algn="ctr"/>
-              <a:endParaRPr lang="de-DE" sz="800" dirty="0">
-                <a:solidFill>
-                  <a:schemeClr val="tx1"/>
-                </a:solidFill>
-                <a:latin typeface="SBB Light" pitchFamily="2" charset="0"/>
-              </a:endParaRPr>
-            </a:p>
-            <a:p>
-              <a:pPr algn="ctr"/>
-              <a:r>
-                <a:rPr lang="de-DE" sz="800" dirty="0">
-                  <a:solidFill>
-                    <a:schemeClr val="tx1"/>
-                  </a:solidFill>
-                  <a:latin typeface="SBB Light" pitchFamily="2" charset="0"/>
-                </a:rPr>
-                <a:t>OOP</a:t>
-              </a:r>
-            </a:p>
-          </p:txBody>
-        </p:sp>
-        <p:cxnSp>
-          <p:nvCxnSpPr>
-            <p:cNvPr id="29" name="Gerader Verbinder 28">
-              <a:extLst>
-                <a:ext uri="{FF2B5EF4-FFF2-40B4-BE49-F238E27FC236}">
-                  <a16:creationId xmlns:a16="http://schemas.microsoft.com/office/drawing/2014/main" id="{9CEB2AA0-2CA1-ABF6-896C-0402E8A017E4}"/>
-                </a:ext>
-              </a:extLst>
-            </p:cNvPr>
-            <p:cNvCxnSpPr>
-              <a:cxnSpLocks/>
-            </p:cNvCxnSpPr>
-            <p:nvPr/>
-          </p:nvCxnSpPr>
-          <p:spPr>
-            <a:xfrm>
-              <a:off x="1167384" y="1541272"/>
-              <a:ext cx="777240" cy="0"/>
-            </a:xfrm>
-            <a:prstGeom prst="line">
-              <a:avLst/>
-            </a:prstGeom>
-            <a:grpFill/>
-            <a:ln>
-              <a:solidFill>
-                <a:schemeClr val="bg1"/>
-              </a:solidFill>
-            </a:ln>
-          </p:spPr>
-          <p:style>
-            <a:lnRef idx="2">
-              <a:schemeClr val="accent1"/>
-            </a:lnRef>
-            <a:fillRef idx="0">
-              <a:schemeClr val="accent1"/>
-            </a:fillRef>
-            <a:effectRef idx="1">
-              <a:schemeClr val="accent1"/>
-            </a:effectRef>
-            <a:fontRef idx="minor">
-              <a:schemeClr val="tx1"/>
-            </a:fontRef>
-          </p:style>
-        </p:cxnSp>
-        <p:cxnSp>
-          <p:nvCxnSpPr>
-            <p:cNvPr id="30" name="Gerader Verbinder 29">
-              <a:extLst>
-                <a:ext uri="{FF2B5EF4-FFF2-40B4-BE49-F238E27FC236}">
-                  <a16:creationId xmlns:a16="http://schemas.microsoft.com/office/drawing/2014/main" id="{89BAB7A7-69FC-92C2-5C0D-523428FF5C3F}"/>
-                </a:ext>
-              </a:extLst>
-            </p:cNvPr>
-            <p:cNvCxnSpPr>
-              <a:cxnSpLocks/>
-            </p:cNvCxnSpPr>
-            <p:nvPr/>
-          </p:nvCxnSpPr>
-          <p:spPr>
-            <a:xfrm>
-              <a:off x="1167384" y="2376404"/>
-              <a:ext cx="777240" cy="0"/>
-            </a:xfrm>
-            <a:prstGeom prst="line">
-              <a:avLst/>
-            </a:prstGeom>
-            <a:grpFill/>
-            <a:ln>
-              <a:solidFill>
-                <a:schemeClr val="bg1"/>
-              </a:solidFill>
-            </a:ln>
-          </p:spPr>
-          <p:style>
-            <a:lnRef idx="2">
-              <a:schemeClr val="accent1"/>
-            </a:lnRef>
-            <a:fillRef idx="0">
-              <a:schemeClr val="accent1"/>
-            </a:fillRef>
-            <a:effectRef idx="1">
-              <a:schemeClr val="accent1"/>
-            </a:effectRef>
-            <a:fontRef idx="minor">
-              <a:schemeClr val="tx1"/>
-            </a:fontRef>
-          </p:style>
-        </p:cxnSp>
-      </p:grpSp>
-      <p:grpSp>
-        <p:nvGrpSpPr>
           <p:cNvPr id="31" name="Gruppieren 30">
             <a:extLst>
               <a:ext uri="{FF2B5EF4-FFF2-40B4-BE49-F238E27FC236}">
@@ -8089,16 +7844,13 @@
         </p:nvGrpSpPr>
         <p:grpSpPr>
           <a:xfrm>
-            <a:off x="4300852" y="482233"/>
+            <a:off x="3365831" y="482233"/>
             <a:ext cx="914400" cy="1599517"/>
             <a:chOff x="1097280" y="1092558"/>
             <a:chExt cx="914400" cy="1599517"/>
           </a:xfrm>
           <a:solidFill>
-            <a:schemeClr val="accent6">
-              <a:lumMod val="60000"/>
-              <a:lumOff val="40000"/>
-            </a:schemeClr>
+            <a:srgbClr val="5AC036"/>
           </a:solidFill>
         </p:grpSpPr>
         <p:sp>
@@ -8201,7 +7953,7 @@
                   </a:solidFill>
                   <a:latin typeface="SBB Light" pitchFamily="2" charset="0"/>
                 </a:rPr>
-                <a:t>Listen, Streams, Generics</a:t>
+                <a:t>OOP</a:t>
               </a:r>
             </a:p>
           </p:txBody>
@@ -8309,7 +8061,7 @@
         </p:nvGrpSpPr>
         <p:grpSpPr>
           <a:xfrm>
-            <a:off x="6155895" y="482233"/>
+            <a:off x="7093689" y="482233"/>
             <a:ext cx="914400" cy="1608398"/>
             <a:chOff x="1097280" y="1092558"/>
             <a:chExt cx="914400" cy="1608398"/>
@@ -8557,16 +8309,13 @@
         </p:nvGrpSpPr>
         <p:grpSpPr>
           <a:xfrm>
-            <a:off x="7088149" y="482233"/>
+            <a:off x="8023170" y="482233"/>
             <a:ext cx="914400" cy="1608398"/>
             <a:chOff x="1097280" y="1092558"/>
             <a:chExt cx="914400" cy="1608398"/>
           </a:xfrm>
           <a:solidFill>
-            <a:schemeClr val="accent6">
-              <a:lumMod val="60000"/>
-              <a:lumOff val="40000"/>
-            </a:schemeClr>
+            <a:srgbClr val="5AC036"/>
           </a:solidFill>
         </p:grpSpPr>
         <p:sp>
@@ -8777,11 +8526,14 @@
         </p:nvGrpSpPr>
         <p:grpSpPr>
           <a:xfrm>
-            <a:off x="8950795" y="491900"/>
+            <a:off x="4300321" y="484489"/>
             <a:ext cx="914400" cy="1599517"/>
             <a:chOff x="1097280" y="1092558"/>
             <a:chExt cx="914400" cy="1599517"/>
           </a:xfrm>
+          <a:solidFill>
+            <a:srgbClr val="5AC036"/>
+          </a:solidFill>
         </p:grpSpPr>
         <p:sp>
           <p:nvSpPr>
@@ -8803,12 +8555,7 @@
             <a:prstGeom prst="roundRect">
               <a:avLst/>
             </a:prstGeom>
-            <a:solidFill>
-              <a:schemeClr val="accent6">
-                <a:lumMod val="60000"/>
-                <a:lumOff val="40000"/>
-              </a:schemeClr>
-            </a:solidFill>
+            <a:grpFill/>
             <a:ln>
               <a:noFill/>
             </a:ln>
@@ -8889,7 +8636,7 @@
             <a:p>
               <a:pPr algn="ctr"/>
               <a:r>
-                <a:rPr lang="de-DE" sz="800" dirty="0" err="1">
+                <a:rPr lang="de-DE" sz="800" dirty="0">
                   <a:solidFill>
                     <a:schemeClr val="tx1"/>
                   </a:solidFill>
@@ -8897,12 +8644,6 @@
                 </a:rPr>
                 <a:t>Artifactory</a:t>
               </a:r>
-              <a:endParaRPr lang="de-DE" sz="800" dirty="0">
-                <a:solidFill>
-                  <a:schemeClr val="tx1"/>
-                </a:solidFill>
-                <a:latin typeface="SBB Light" pitchFamily="2" charset="0"/>
-              </a:endParaRPr>
             </a:p>
             <a:p>
               <a:pPr algn="ctr"/>
@@ -8940,6 +8681,7 @@
             <a:prstGeom prst="line">
               <a:avLst/>
             </a:prstGeom>
+            <a:grpFill/>
             <a:ln>
               <a:solidFill>
                 <a:schemeClr val="bg1"/>
@@ -8983,6 +8725,7 @@
             <a:prstGeom prst="line">
               <a:avLst/>
             </a:prstGeom>
+            <a:grpFill/>
             <a:ln>
               <a:solidFill>
                 <a:schemeClr val="bg1"/>
@@ -9025,10 +8768,7 @@
             <a:chExt cx="914400" cy="1608398"/>
           </a:xfrm>
           <a:solidFill>
-            <a:schemeClr val="accent6">
-              <a:lumMod val="60000"/>
-              <a:lumOff val="40000"/>
-            </a:schemeClr>
+            <a:srgbClr val="5AC036"/>
           </a:solidFill>
         </p:grpSpPr>
         <p:sp>
@@ -9078,7 +8818,7 @@
             <a:p>
               <a:pPr algn="ctr"/>
               <a:r>
-                <a:rPr lang="de-DE" sz="1100" dirty="0" err="1">
+                <a:rPr lang="de-DE" sz="1100" dirty="0">
                   <a:solidFill>
                     <a:schemeClr val="tx1"/>
                   </a:solidFill>
@@ -9086,12 +8826,6 @@
                 </a:rPr>
                 <a:t>Testing</a:t>
               </a:r>
-              <a:endParaRPr lang="de-DE" sz="1100" dirty="0">
-                <a:solidFill>
-                  <a:schemeClr val="tx1"/>
-                </a:solidFill>
-                <a:latin typeface="SBB Light" pitchFamily="2" charset="0"/>
-              </a:endParaRPr>
             </a:p>
             <a:p>
               <a:pPr algn="ctr"/>
@@ -9316,7 +9050,7 @@
         </p:nvGrpSpPr>
         <p:grpSpPr>
           <a:xfrm>
-            <a:off x="8019401" y="486959"/>
+            <a:off x="8954422" y="486959"/>
             <a:ext cx="914400" cy="1608398"/>
             <a:chOff x="1097280" y="1092558"/>
             <a:chExt cx="914400" cy="1608398"/>
@@ -9522,10 +9256,7 @@
             <a:chExt cx="914400" cy="1608398"/>
           </a:xfrm>
           <a:solidFill>
-            <a:schemeClr val="accent6">
-              <a:lumMod val="60000"/>
-              <a:lumOff val="40000"/>
-            </a:schemeClr>
+            <a:srgbClr val="5AC036"/>
           </a:solidFill>
         </p:grpSpPr>
         <p:sp>
@@ -9725,8 +9456,8 @@
         </p:nvSpPr>
         <p:spPr>
           <a:xfrm>
-            <a:off x="10863164" y="78190"/>
-            <a:ext cx="1213288" cy="1686243"/>
+            <a:off x="10863164" y="510162"/>
+            <a:ext cx="1150057" cy="1506056"/>
           </a:xfrm>
           <a:prstGeom prst="rect">
             <a:avLst/>
@@ -9786,7 +9517,7 @@
         </p:nvSpPr>
         <p:spPr>
           <a:xfrm>
-            <a:off x="10946950" y="268665"/>
+            <a:off x="10946950" y="700636"/>
             <a:ext cx="252549" cy="252549"/>
           </a:xfrm>
           <a:prstGeom prst="ellipse">
@@ -9997,10 +9728,7 @@
             <a:avLst/>
           </a:prstGeom>
           <a:solidFill>
-            <a:schemeClr val="accent6">
-              <a:lumMod val="60000"/>
-              <a:lumOff val="40000"/>
-            </a:schemeClr>
+            <a:srgbClr val="5AC036"/>
           </a:solidFill>
           <a:ln>
             <a:noFill/>
@@ -10058,7 +9786,7 @@
         </p:nvSpPr>
         <p:spPr>
           <a:xfrm>
-            <a:off x="10942593" y="515275"/>
+            <a:off x="10942593" y="947246"/>
             <a:ext cx="252549" cy="252549"/>
           </a:xfrm>
           <a:prstGeom prst="ellipse">
@@ -10128,7 +9856,7 @@
         </p:nvSpPr>
         <p:spPr>
           <a:xfrm>
-            <a:off x="10942592" y="762223"/>
+            <a:off x="10942592" y="1194194"/>
             <a:ext cx="252549" cy="252549"/>
           </a:xfrm>
           <a:prstGeom prst="ellipse">
@@ -10198,7 +9926,7 @@
         </p:nvSpPr>
         <p:spPr>
           <a:xfrm>
-            <a:off x="10942591" y="1002439"/>
+            <a:off x="10942591" y="1434410"/>
             <a:ext cx="252549" cy="252549"/>
           </a:xfrm>
           <a:prstGeom prst="ellipse">
@@ -10268,7 +9996,7 @@
         </p:nvSpPr>
         <p:spPr>
           <a:xfrm>
-            <a:off x="10942591" y="1253518"/>
+            <a:off x="10942591" y="1685489"/>
             <a:ext cx="252549" cy="252549"/>
           </a:xfrm>
           <a:prstGeom prst="ellipse">
@@ -10326,76 +10054,6 @@
       </p:sp>
       <p:sp>
         <p:nvSpPr>
-          <p:cNvPr id="85" name="Ellipse 84">
-            <a:extLst>
-              <a:ext uri="{FF2B5EF4-FFF2-40B4-BE49-F238E27FC236}">
-                <a16:creationId xmlns:a16="http://schemas.microsoft.com/office/drawing/2014/main" id="{4D21AF21-99C3-158E-A860-341CDB11186D}"/>
-              </a:ext>
-            </a:extLst>
-          </p:cNvPr>
-          <p:cNvSpPr/>
-          <p:nvPr/>
-        </p:nvSpPr>
-        <p:spPr>
-          <a:xfrm>
-            <a:off x="10946945" y="1500375"/>
-            <a:ext cx="252549" cy="252549"/>
-          </a:xfrm>
-          <a:prstGeom prst="ellipse">
-            <a:avLst/>
-          </a:prstGeom>
-          <a:solidFill>
-            <a:schemeClr val="bg1">
-              <a:lumMod val="75000"/>
-            </a:schemeClr>
-          </a:solidFill>
-          <a:ln>
-            <a:solidFill>
-              <a:schemeClr val="bg1"/>
-            </a:solidFill>
-          </a:ln>
-        </p:spPr>
-        <p:style>
-          <a:lnRef idx="2">
-            <a:schemeClr val="accent1">
-              <a:shade val="15000"/>
-            </a:schemeClr>
-          </a:lnRef>
-          <a:fillRef idx="1">
-            <a:schemeClr val="accent1"/>
-          </a:fillRef>
-          <a:effectRef idx="0">
-            <a:schemeClr val="accent1"/>
-          </a:effectRef>
-          <a:fontRef idx="minor">
-            <a:schemeClr val="lt1"/>
-          </a:fontRef>
-        </p:style>
-        <p:txBody>
-          <a:bodyPr rtlCol="0" anchor="ctr"/>
-          <a:lstStyle/>
-          <a:p>
-            <a:pPr algn="ctr"/>
-            <a:r>
-              <a:rPr lang="de-DE" sz="1000" b="1" dirty="0">
-                <a:solidFill>
-                  <a:schemeClr val="bg1"/>
-                </a:solidFill>
-                <a:latin typeface="SBB Light" pitchFamily="2" charset="0"/>
-              </a:rPr>
-              <a:t>5</a:t>
-            </a:r>
-            <a:endParaRPr lang="de-CH" sz="1000" b="1" dirty="0">
-              <a:solidFill>
-                <a:schemeClr val="bg1"/>
-              </a:solidFill>
-              <a:latin typeface="SBB Light" pitchFamily="2" charset="0"/>
-            </a:endParaRPr>
-          </a:p>
-        </p:txBody>
-      </p:sp>
-      <p:sp>
-        <p:nvSpPr>
           <p:cNvPr id="87" name="Rechteck 86">
             <a:extLst>
               <a:ext uri="{FF2B5EF4-FFF2-40B4-BE49-F238E27FC236}">
@@ -10408,7 +10066,7 @@
         </p:nvSpPr>
         <p:spPr>
           <a:xfrm>
-            <a:off x="11258325" y="1956948"/>
+            <a:off x="11258325" y="3829752"/>
             <a:ext cx="690475" cy="937724"/>
           </a:xfrm>
           <a:prstGeom prst="rect">
@@ -10518,7 +10176,7 @@
         </p:nvSpPr>
         <p:spPr>
           <a:xfrm>
-            <a:off x="10926693" y="2005972"/>
+            <a:off x="10926693" y="3878776"/>
             <a:ext cx="208800" cy="208800"/>
           </a:xfrm>
           <a:prstGeom prst="ellipse">
@@ -10589,7 +10247,7 @@
         </p:nvSpPr>
         <p:spPr>
           <a:xfrm>
-            <a:off x="10926693" y="2245711"/>
+            <a:off x="10926693" y="4118515"/>
             <a:ext cx="208800" cy="208800"/>
           </a:xfrm>
           <a:prstGeom prst="ellipse">
@@ -10660,7 +10318,7 @@
         </p:nvSpPr>
         <p:spPr>
           <a:xfrm>
-            <a:off x="10926693" y="2473672"/>
+            <a:off x="10926693" y="4356256"/>
             <a:ext cx="208800" cy="208800"/>
           </a:xfrm>
           <a:prstGeom prst="ellipse">
@@ -10731,7 +10389,7 @@
         </p:nvSpPr>
         <p:spPr>
           <a:xfrm>
-            <a:off x="10926693" y="2694538"/>
+            <a:off x="10926693" y="4601572"/>
             <a:ext cx="208800" cy="208800"/>
           </a:xfrm>
           <a:prstGeom prst="ellipse">
@@ -10802,17 +10460,14 @@
         </p:nvSpPr>
         <p:spPr>
           <a:xfrm>
-            <a:off x="4300852" y="2107196"/>
+            <a:off x="3365831" y="2107196"/>
             <a:ext cx="903400" cy="176592"/>
           </a:xfrm>
           <a:prstGeom prst="rect">
             <a:avLst/>
           </a:prstGeom>
           <a:solidFill>
-            <a:schemeClr val="accent6">
-              <a:lumMod val="60000"/>
-              <a:lumOff val="40000"/>
-            </a:schemeClr>
+            <a:srgbClr val="5AC036"/>
           </a:solidFill>
           <a:ln>
             <a:noFill/>
@@ -10870,17 +10525,14 @@
         </p:nvSpPr>
         <p:spPr>
           <a:xfrm>
-            <a:off x="7088149" y="2109902"/>
+            <a:off x="8023170" y="2109902"/>
             <a:ext cx="903400" cy="176592"/>
           </a:xfrm>
           <a:prstGeom prst="rect">
             <a:avLst/>
           </a:prstGeom>
           <a:solidFill>
-            <a:schemeClr val="accent6">
-              <a:lumMod val="60000"/>
-              <a:lumOff val="40000"/>
-            </a:schemeClr>
+            <a:srgbClr val="5AC036"/>
           </a:solidFill>
           <a:ln>
             <a:noFill/>
@@ -10945,10 +10597,7 @@
             <a:avLst/>
           </a:prstGeom>
           <a:solidFill>
-            <a:schemeClr val="accent6">
-              <a:lumMod val="60000"/>
-              <a:lumOff val="40000"/>
-            </a:schemeClr>
+            <a:srgbClr val="5AC036"/>
           </a:solidFill>
           <a:ln>
             <a:noFill/>
@@ -10994,10 +10643,10 @@
       </p:sp>
       <p:sp>
         <p:nvSpPr>
-          <p:cNvPr id="98" name="Ellipse 97">
+          <p:cNvPr id="99" name="Ellipse 98">
             <a:extLst>
               <a:ext uri="{FF2B5EF4-FFF2-40B4-BE49-F238E27FC236}">
-                <a16:creationId xmlns:a16="http://schemas.microsoft.com/office/drawing/2014/main" id="{A9AC84EE-03CB-E6EE-2AEC-95E0C7E031F7}"/>
+                <a16:creationId xmlns:a16="http://schemas.microsoft.com/office/drawing/2014/main" id="{45659069-615F-E7EC-5A89-A8FFB2B1B6D1}"/>
               </a:ext>
             </a:extLst>
           </p:cNvPr>
@@ -11006,7 +10655,7 @@
         </p:nvSpPr>
         <p:spPr>
           <a:xfrm>
-            <a:off x="3358261" y="1820492"/>
+            <a:off x="3351465" y="1838454"/>
             <a:ext cx="252549" cy="252549"/>
           </a:xfrm>
           <a:prstGeom prst="ellipse">
@@ -11064,10 +10713,10 @@
       </p:sp>
       <p:sp>
         <p:nvSpPr>
-          <p:cNvPr id="99" name="Ellipse 98">
+          <p:cNvPr id="101" name="Ellipse 100">
             <a:extLst>
               <a:ext uri="{FF2B5EF4-FFF2-40B4-BE49-F238E27FC236}">
-                <a16:creationId xmlns:a16="http://schemas.microsoft.com/office/drawing/2014/main" id="{45659069-615F-E7EC-5A89-A8FFB2B1B6D1}"/>
+                <a16:creationId xmlns:a16="http://schemas.microsoft.com/office/drawing/2014/main" id="{AA11313C-16BA-D24E-51C3-9018B062631E}"/>
               </a:ext>
             </a:extLst>
           </p:cNvPr>
@@ -11076,7 +10725,7 @@
         </p:nvSpPr>
         <p:spPr>
           <a:xfrm>
-            <a:off x="4286486" y="1838454"/>
+            <a:off x="8022008" y="1829201"/>
             <a:ext cx="252549" cy="252549"/>
           </a:xfrm>
           <a:prstGeom prst="ellipse">
@@ -11121,357 +10770,7 @@
                 </a:solidFill>
                 <a:latin typeface="SBB Light" pitchFamily="2" charset="0"/>
               </a:rPr>
-              <a:t>1</a:t>
-            </a:r>
-            <a:endParaRPr lang="de-CH" sz="1000" b="1" dirty="0">
-              <a:solidFill>
-                <a:schemeClr val="bg1"/>
-              </a:solidFill>
-              <a:latin typeface="SBB Light" pitchFamily="2" charset="0"/>
-            </a:endParaRPr>
-          </a:p>
-        </p:txBody>
-      </p:sp>
-      <p:sp>
-        <p:nvSpPr>
-          <p:cNvPr id="100" name="Ellipse 99">
-            <a:extLst>
-              <a:ext uri="{FF2B5EF4-FFF2-40B4-BE49-F238E27FC236}">
-                <a16:creationId xmlns:a16="http://schemas.microsoft.com/office/drawing/2014/main" id="{906441AD-BB23-61E6-CDF6-43163E1BAA93}"/>
-              </a:ext>
-            </a:extLst>
-          </p:cNvPr>
-          <p:cNvSpPr/>
-          <p:nvPr/>
-        </p:nvSpPr>
-        <p:spPr>
-          <a:xfrm>
-            <a:off x="6163046" y="1831958"/>
-            <a:ext cx="252549" cy="252549"/>
-          </a:xfrm>
-          <a:prstGeom prst="ellipse">
-            <a:avLst/>
-          </a:prstGeom>
-          <a:solidFill>
-            <a:schemeClr val="bg1">
-              <a:lumMod val="75000"/>
-            </a:schemeClr>
-          </a:solidFill>
-          <a:ln>
-            <a:solidFill>
-              <a:schemeClr val="bg1"/>
-            </a:solidFill>
-          </a:ln>
-        </p:spPr>
-        <p:style>
-          <a:lnRef idx="2">
-            <a:schemeClr val="accent1">
-              <a:shade val="15000"/>
-            </a:schemeClr>
-          </a:lnRef>
-          <a:fillRef idx="1">
-            <a:schemeClr val="accent1"/>
-          </a:fillRef>
-          <a:effectRef idx="0">
-            <a:schemeClr val="accent1"/>
-          </a:effectRef>
-          <a:fontRef idx="minor">
-            <a:schemeClr val="lt1"/>
-          </a:fontRef>
-        </p:style>
-        <p:txBody>
-          <a:bodyPr rtlCol="0" anchor="ctr"/>
-          <a:lstStyle/>
-          <a:p>
-            <a:pPr algn="ctr"/>
-            <a:r>
-              <a:rPr lang="de-DE" sz="1000" b="1" dirty="0">
-                <a:solidFill>
-                  <a:schemeClr val="bg1"/>
-                </a:solidFill>
-                <a:latin typeface="SBB Light" pitchFamily="2" charset="0"/>
-              </a:rPr>
               <a:t>2</a:t>
-            </a:r>
-            <a:endParaRPr lang="de-CH" sz="1000" b="1" dirty="0">
-              <a:solidFill>
-                <a:schemeClr val="bg1"/>
-              </a:solidFill>
-              <a:latin typeface="SBB Light" pitchFamily="2" charset="0"/>
-            </a:endParaRPr>
-          </a:p>
-        </p:txBody>
-      </p:sp>
-      <p:sp>
-        <p:nvSpPr>
-          <p:cNvPr id="101" name="Ellipse 100">
-            <a:extLst>
-              <a:ext uri="{FF2B5EF4-FFF2-40B4-BE49-F238E27FC236}">
-                <a16:creationId xmlns:a16="http://schemas.microsoft.com/office/drawing/2014/main" id="{AA11313C-16BA-D24E-51C3-9018B062631E}"/>
-              </a:ext>
-            </a:extLst>
-          </p:cNvPr>
-          <p:cNvSpPr/>
-          <p:nvPr/>
-        </p:nvSpPr>
-        <p:spPr>
-          <a:xfrm>
-            <a:off x="7086987" y="1829201"/>
-            <a:ext cx="252549" cy="252549"/>
-          </a:xfrm>
-          <a:prstGeom prst="ellipse">
-            <a:avLst/>
-          </a:prstGeom>
-          <a:solidFill>
-            <a:schemeClr val="bg1">
-              <a:lumMod val="75000"/>
-            </a:schemeClr>
-          </a:solidFill>
-          <a:ln>
-            <a:solidFill>
-              <a:schemeClr val="bg1"/>
-            </a:solidFill>
-          </a:ln>
-        </p:spPr>
-        <p:style>
-          <a:lnRef idx="2">
-            <a:schemeClr val="accent1">
-              <a:shade val="15000"/>
-            </a:schemeClr>
-          </a:lnRef>
-          <a:fillRef idx="1">
-            <a:schemeClr val="accent1"/>
-          </a:fillRef>
-          <a:effectRef idx="0">
-            <a:schemeClr val="accent1"/>
-          </a:effectRef>
-          <a:fontRef idx="minor">
-            <a:schemeClr val="lt1"/>
-          </a:fontRef>
-        </p:style>
-        <p:txBody>
-          <a:bodyPr rtlCol="0" anchor="ctr"/>
-          <a:lstStyle/>
-          <a:p>
-            <a:pPr algn="ctr"/>
-            <a:r>
-              <a:rPr lang="de-DE" sz="1000" b="1" dirty="0">
-                <a:solidFill>
-                  <a:schemeClr val="bg1"/>
-                </a:solidFill>
-                <a:latin typeface="SBB Light" pitchFamily="2" charset="0"/>
-              </a:rPr>
-              <a:t>2</a:t>
-            </a:r>
-            <a:endParaRPr lang="de-CH" sz="1000" b="1" dirty="0">
-              <a:solidFill>
-                <a:schemeClr val="bg1"/>
-              </a:solidFill>
-              <a:latin typeface="SBB Light" pitchFamily="2" charset="0"/>
-            </a:endParaRPr>
-          </a:p>
-        </p:txBody>
-      </p:sp>
-      <p:sp>
-        <p:nvSpPr>
-          <p:cNvPr id="102" name="Ellipse 101">
-            <a:extLst>
-              <a:ext uri="{FF2B5EF4-FFF2-40B4-BE49-F238E27FC236}">
-                <a16:creationId xmlns:a16="http://schemas.microsoft.com/office/drawing/2014/main" id="{1E7BD1D6-8D5F-8937-1246-CA2D2D8254C8}"/>
-              </a:ext>
-            </a:extLst>
-          </p:cNvPr>
-          <p:cNvSpPr/>
-          <p:nvPr/>
-        </p:nvSpPr>
-        <p:spPr>
-          <a:xfrm>
-            <a:off x="8951646" y="1838868"/>
-            <a:ext cx="252549" cy="252549"/>
-          </a:xfrm>
-          <a:prstGeom prst="ellipse">
-            <a:avLst/>
-          </a:prstGeom>
-          <a:solidFill>
-            <a:schemeClr val="bg1">
-              <a:lumMod val="75000"/>
-            </a:schemeClr>
-          </a:solidFill>
-          <a:ln>
-            <a:solidFill>
-              <a:schemeClr val="bg1"/>
-            </a:solidFill>
-          </a:ln>
-        </p:spPr>
-        <p:style>
-          <a:lnRef idx="2">
-            <a:schemeClr val="accent1">
-              <a:shade val="15000"/>
-            </a:schemeClr>
-          </a:lnRef>
-          <a:fillRef idx="1">
-            <a:schemeClr val="accent1"/>
-          </a:fillRef>
-          <a:effectRef idx="0">
-            <a:schemeClr val="accent1"/>
-          </a:effectRef>
-          <a:fontRef idx="minor">
-            <a:schemeClr val="lt1"/>
-          </a:fontRef>
-        </p:style>
-        <p:txBody>
-          <a:bodyPr rtlCol="0" anchor="ctr"/>
-          <a:lstStyle/>
-          <a:p>
-            <a:pPr algn="ctr"/>
-            <a:r>
-              <a:rPr lang="de-DE" sz="1000" b="1" dirty="0">
-                <a:solidFill>
-                  <a:schemeClr val="bg1"/>
-                </a:solidFill>
-                <a:latin typeface="SBB Light" pitchFamily="2" charset="0"/>
-              </a:rPr>
-              <a:t>3</a:t>
-            </a:r>
-            <a:endParaRPr lang="de-CH" sz="1000" b="1" dirty="0">
-              <a:solidFill>
-                <a:schemeClr val="bg1"/>
-              </a:solidFill>
-              <a:latin typeface="SBB Light" pitchFamily="2" charset="0"/>
-            </a:endParaRPr>
-          </a:p>
-        </p:txBody>
-      </p:sp>
-      <p:sp>
-        <p:nvSpPr>
-          <p:cNvPr id="103" name="Ellipse 102">
-            <a:extLst>
-              <a:ext uri="{FF2B5EF4-FFF2-40B4-BE49-F238E27FC236}">
-                <a16:creationId xmlns:a16="http://schemas.microsoft.com/office/drawing/2014/main" id="{556636FB-227F-0D93-8D88-B8677C80CADE}"/>
-              </a:ext>
-            </a:extLst>
-          </p:cNvPr>
-          <p:cNvSpPr/>
-          <p:nvPr/>
-        </p:nvSpPr>
-        <p:spPr>
-          <a:xfrm>
-            <a:off x="9875546" y="1838521"/>
-            <a:ext cx="252549" cy="252549"/>
-          </a:xfrm>
-          <a:prstGeom prst="ellipse">
-            <a:avLst/>
-          </a:prstGeom>
-          <a:solidFill>
-            <a:schemeClr val="bg1">
-              <a:lumMod val="75000"/>
-            </a:schemeClr>
-          </a:solidFill>
-          <a:ln>
-            <a:solidFill>
-              <a:schemeClr val="bg1"/>
-            </a:solidFill>
-          </a:ln>
-        </p:spPr>
-        <p:style>
-          <a:lnRef idx="2">
-            <a:schemeClr val="accent1">
-              <a:shade val="15000"/>
-            </a:schemeClr>
-          </a:lnRef>
-          <a:fillRef idx="1">
-            <a:schemeClr val="accent1"/>
-          </a:fillRef>
-          <a:effectRef idx="0">
-            <a:schemeClr val="accent1"/>
-          </a:effectRef>
-          <a:fontRef idx="minor">
-            <a:schemeClr val="lt1"/>
-          </a:fontRef>
-        </p:style>
-        <p:txBody>
-          <a:bodyPr rtlCol="0" anchor="ctr"/>
-          <a:lstStyle/>
-          <a:p>
-            <a:pPr algn="ctr"/>
-            <a:r>
-              <a:rPr lang="de-DE" sz="1000" b="1" dirty="0">
-                <a:solidFill>
-                  <a:schemeClr val="bg1"/>
-                </a:solidFill>
-                <a:latin typeface="SBB Light" pitchFamily="2" charset="0"/>
-              </a:rPr>
-              <a:t>3</a:t>
-            </a:r>
-            <a:endParaRPr lang="de-CH" sz="1000" b="1" dirty="0">
-              <a:solidFill>
-                <a:schemeClr val="bg1"/>
-              </a:solidFill>
-              <a:latin typeface="SBB Light" pitchFamily="2" charset="0"/>
-            </a:endParaRPr>
-          </a:p>
-        </p:txBody>
-      </p:sp>
-      <p:sp>
-        <p:nvSpPr>
-          <p:cNvPr id="104" name="Ellipse 103">
-            <a:extLst>
-              <a:ext uri="{FF2B5EF4-FFF2-40B4-BE49-F238E27FC236}">
-                <a16:creationId xmlns:a16="http://schemas.microsoft.com/office/drawing/2014/main" id="{4919E085-60A6-95C0-9328-9E1D3F0BC0C3}"/>
-              </a:ext>
-            </a:extLst>
-          </p:cNvPr>
-          <p:cNvSpPr/>
-          <p:nvPr/>
-        </p:nvSpPr>
-        <p:spPr>
-          <a:xfrm>
-            <a:off x="538402" y="4995008"/>
-            <a:ext cx="252549" cy="252549"/>
-          </a:xfrm>
-          <a:prstGeom prst="ellipse">
-            <a:avLst/>
-          </a:prstGeom>
-          <a:solidFill>
-            <a:schemeClr val="bg1">
-              <a:lumMod val="75000"/>
-            </a:schemeClr>
-          </a:solidFill>
-          <a:ln>
-            <a:solidFill>
-              <a:schemeClr val="bg1"/>
-            </a:solidFill>
-          </a:ln>
-        </p:spPr>
-        <p:style>
-          <a:lnRef idx="2">
-            <a:schemeClr val="accent1">
-              <a:shade val="15000"/>
-            </a:schemeClr>
-          </a:lnRef>
-          <a:fillRef idx="1">
-            <a:schemeClr val="accent1"/>
-          </a:fillRef>
-          <a:effectRef idx="0">
-            <a:schemeClr val="accent1"/>
-          </a:effectRef>
-          <a:fontRef idx="minor">
-            <a:schemeClr val="lt1"/>
-          </a:fontRef>
-        </p:style>
-        <p:txBody>
-          <a:bodyPr rtlCol="0" anchor="ctr"/>
-          <a:lstStyle/>
-          <a:p>
-            <a:pPr algn="ctr"/>
-            <a:r>
-              <a:rPr lang="de-DE" sz="1000" b="1" dirty="0">
-                <a:solidFill>
-                  <a:schemeClr val="bg1"/>
-                </a:solidFill>
-                <a:latin typeface="SBB Light" pitchFamily="2" charset="0"/>
-              </a:rPr>
-              <a:t>3</a:t>
             </a:r>
             <a:endParaRPr lang="de-CH" sz="1000" b="1" dirty="0">
               <a:solidFill>
@@ -11496,7 +10795,7 @@
         </p:nvSpPr>
         <p:spPr>
           <a:xfrm>
-            <a:off x="8011234" y="1842809"/>
+            <a:off x="8946255" y="1842809"/>
             <a:ext cx="252549" cy="252549"/>
           </a:xfrm>
           <a:prstGeom prst="ellipse">
@@ -11555,10 +10854,10 @@
       </p:sp>
       <p:sp>
         <p:nvSpPr>
-          <p:cNvPr id="106" name="Rechteck: abgerundete Ecken 105">
+          <p:cNvPr id="107" name="Rechteck: abgerundete Ecken 106">
             <a:extLst>
               <a:ext uri="{FF2B5EF4-FFF2-40B4-BE49-F238E27FC236}">
-                <a16:creationId xmlns:a16="http://schemas.microsoft.com/office/drawing/2014/main" id="{59A0ECB6-CA80-2A69-7356-1B15F2C4EE6C}"/>
+                <a16:creationId xmlns:a16="http://schemas.microsoft.com/office/drawing/2014/main" id="{76273311-B2B7-1D86-EE30-77EFC4592299}"/>
               </a:ext>
             </a:extLst>
           </p:cNvPr>
@@ -11567,7 +10866,7 @@
         </p:nvSpPr>
         <p:spPr>
           <a:xfrm>
-            <a:off x="3690556" y="1803723"/>
+            <a:off x="3696906" y="1811988"/>
             <a:ext cx="498599" cy="235995"/>
           </a:xfrm>
           <a:prstGeom prst="roundRect">
@@ -11619,10 +10918,10 @@
       </p:sp>
       <p:sp>
         <p:nvSpPr>
-          <p:cNvPr id="107" name="Rechteck: abgerundete Ecken 106">
+          <p:cNvPr id="108" name="Rechteck: abgerundete Ecken 107">
             <a:extLst>
               <a:ext uri="{FF2B5EF4-FFF2-40B4-BE49-F238E27FC236}">
-                <a16:creationId xmlns:a16="http://schemas.microsoft.com/office/drawing/2014/main" id="{76273311-B2B7-1D86-EE30-77EFC4592299}"/>
+                <a16:creationId xmlns:a16="http://schemas.microsoft.com/office/drawing/2014/main" id="{37540EE6-2489-5334-C991-F086E7962D18}"/>
               </a:ext>
             </a:extLst>
           </p:cNvPr>
@@ -11631,7 +10930,7 @@
         </p:nvSpPr>
         <p:spPr>
           <a:xfrm>
-            <a:off x="4631927" y="1811988"/>
+            <a:off x="7457760" y="1811544"/>
             <a:ext cx="498599" cy="235995"/>
           </a:xfrm>
           <a:prstGeom prst="roundRect">
@@ -11670,7 +10969,7 @@
                 </a:solidFill>
                 <a:latin typeface="SBB Light" pitchFamily="2" charset="0"/>
               </a:rPr>
-              <a:t>#J2</a:t>
+              <a:t>#S1</a:t>
             </a:r>
             <a:endParaRPr lang="de-CH" sz="1000" dirty="0">
               <a:solidFill>
@@ -11683,10 +10982,10 @@
       </p:sp>
       <p:sp>
         <p:nvSpPr>
-          <p:cNvPr id="108" name="Rechteck: abgerundete Ecken 107">
+          <p:cNvPr id="109" name="Rechteck: abgerundete Ecken 108">
             <a:extLst>
               <a:ext uri="{FF2B5EF4-FFF2-40B4-BE49-F238E27FC236}">
-                <a16:creationId xmlns:a16="http://schemas.microsoft.com/office/drawing/2014/main" id="{37540EE6-2489-5334-C991-F086E7962D18}"/>
+                <a16:creationId xmlns:a16="http://schemas.microsoft.com/office/drawing/2014/main" id="{4594E220-51C1-FF85-D151-166622C73ABF}"/>
               </a:ext>
             </a:extLst>
           </p:cNvPr>
@@ -11695,7 +10994,7 @@
         </p:nvSpPr>
         <p:spPr>
           <a:xfrm>
-            <a:off x="6519966" y="1811544"/>
+            <a:off x="8368619" y="1809417"/>
             <a:ext cx="498599" cy="235995"/>
           </a:xfrm>
           <a:prstGeom prst="roundRect">
@@ -11734,70 +11033,6 @@
                 </a:solidFill>
                 <a:latin typeface="SBB Light" pitchFamily="2" charset="0"/>
               </a:rPr>
-              <a:t>#S1</a:t>
-            </a:r>
-            <a:endParaRPr lang="de-CH" sz="1000" dirty="0">
-              <a:solidFill>
-                <a:schemeClr val="tx1"/>
-              </a:solidFill>
-              <a:latin typeface="SBB Light" pitchFamily="2" charset="0"/>
-            </a:endParaRPr>
-          </a:p>
-        </p:txBody>
-      </p:sp>
-      <p:sp>
-        <p:nvSpPr>
-          <p:cNvPr id="109" name="Rechteck: abgerundete Ecken 108">
-            <a:extLst>
-              <a:ext uri="{FF2B5EF4-FFF2-40B4-BE49-F238E27FC236}">
-                <a16:creationId xmlns:a16="http://schemas.microsoft.com/office/drawing/2014/main" id="{4594E220-51C1-FF85-D151-166622C73ABF}"/>
-              </a:ext>
-            </a:extLst>
-          </p:cNvPr>
-          <p:cNvSpPr/>
-          <p:nvPr/>
-        </p:nvSpPr>
-        <p:spPr>
-          <a:xfrm>
-            <a:off x="7433598" y="1809417"/>
-            <a:ext cx="498599" cy="235995"/>
-          </a:xfrm>
-          <a:prstGeom prst="roundRect">
-            <a:avLst/>
-          </a:prstGeom>
-          <a:solidFill>
-            <a:schemeClr val="bg1"/>
-          </a:solidFill>
-          <a:ln w="9525"/>
-        </p:spPr>
-        <p:style>
-          <a:lnRef idx="2">
-            <a:schemeClr val="accent1">
-              <a:shade val="15000"/>
-            </a:schemeClr>
-          </a:lnRef>
-          <a:fillRef idx="1">
-            <a:schemeClr val="accent1"/>
-          </a:fillRef>
-          <a:effectRef idx="0">
-            <a:schemeClr val="accent1"/>
-          </a:effectRef>
-          <a:fontRef idx="minor">
-            <a:schemeClr val="lt1"/>
-          </a:fontRef>
-        </p:style>
-        <p:txBody>
-          <a:bodyPr rtlCol="0" anchor="ctr"/>
-          <a:lstStyle/>
-          <a:p>
-            <a:pPr algn="ctr"/>
-            <a:r>
-              <a:rPr lang="de-DE" sz="1000" dirty="0">
-                <a:solidFill>
-                  <a:schemeClr val="tx1"/>
-                </a:solidFill>
-                <a:latin typeface="SBB Light" pitchFamily="2" charset="0"/>
-              </a:rPr>
               <a:t>#J3</a:t>
             </a:r>
             <a:endParaRPr lang="de-CH" sz="1000" dirty="0">
@@ -11823,7 +11058,7 @@
         </p:nvSpPr>
         <p:spPr>
           <a:xfrm>
-            <a:off x="9285871" y="1809414"/>
+            <a:off x="4635397" y="1802003"/>
             <a:ext cx="498599" cy="235995"/>
           </a:xfrm>
           <a:prstGeom prst="roundRect">
@@ -11951,7 +11186,7 @@
         </p:nvSpPr>
         <p:spPr>
           <a:xfrm>
-            <a:off x="8356675" y="1816269"/>
+            <a:off x="9291696" y="1816269"/>
             <a:ext cx="498599" cy="235995"/>
           </a:xfrm>
           <a:prstGeom prst="roundRect">
@@ -12171,7 +11406,7 @@
           </a:fontRef>
         </p:style>
         <p:txBody>
-          <a:bodyPr rtlCol="0" anchor="ctr"/>
+          <a:bodyPr lIns="72000" rIns="72000" rtlCol="0" anchor="ctr"/>
           <a:lstStyle/>
           <a:p>
             <a:pPr algn="ctr"/>
@@ -12179,7 +11414,7 @@
               <a:rPr lang="de-DE" sz="800" dirty="0">
                 <a:latin typeface="SBB Light" pitchFamily="2" charset="0"/>
               </a:rPr>
-              <a:t>BBC</a:t>
+              <a:t>Learn Factory</a:t>
             </a:r>
             <a:endParaRPr lang="de-CH" sz="800" dirty="0">
               <a:latin typeface="SBB Light" pitchFamily="2" charset="0"/>
@@ -12331,8 +11566,8 @@
         </p:nvSpPr>
         <p:spPr>
           <a:xfrm>
-            <a:off x="1271587" y="3010082"/>
-            <a:ext cx="6779604" cy="185448"/>
+            <a:off x="1271586" y="3010082"/>
+            <a:ext cx="7722595" cy="185448"/>
           </a:xfrm>
           <a:prstGeom prst="rightArrow">
             <a:avLst>
@@ -12386,8 +11621,8 @@
         </p:nvSpPr>
         <p:spPr>
           <a:xfrm>
-            <a:off x="8960666" y="3003744"/>
-            <a:ext cx="1849697" cy="189449"/>
+            <a:off x="9895963" y="3003744"/>
+            <a:ext cx="914400" cy="189449"/>
           </a:xfrm>
           <a:prstGeom prst="rightArrow">
             <a:avLst>
@@ -15497,76 +14732,6 @@
       </p:sp>
       <p:sp>
         <p:nvSpPr>
-          <p:cNvPr id="276" name="Ellipse 275">
-            <a:extLst>
-              <a:ext uri="{FF2B5EF4-FFF2-40B4-BE49-F238E27FC236}">
-                <a16:creationId xmlns:a16="http://schemas.microsoft.com/office/drawing/2014/main" id="{12CD96D9-F380-146E-FDBB-81CAF53E1664}"/>
-              </a:ext>
-            </a:extLst>
-          </p:cNvPr>
-          <p:cNvSpPr/>
-          <p:nvPr/>
-        </p:nvSpPr>
-        <p:spPr>
-          <a:xfrm>
-            <a:off x="3344940" y="5003615"/>
-            <a:ext cx="252549" cy="252549"/>
-          </a:xfrm>
-          <a:prstGeom prst="ellipse">
-            <a:avLst/>
-          </a:prstGeom>
-          <a:solidFill>
-            <a:schemeClr val="bg1">
-              <a:lumMod val="75000"/>
-            </a:schemeClr>
-          </a:solidFill>
-          <a:ln>
-            <a:solidFill>
-              <a:schemeClr val="bg1"/>
-            </a:solidFill>
-          </a:ln>
-        </p:spPr>
-        <p:style>
-          <a:lnRef idx="2">
-            <a:schemeClr val="accent1">
-              <a:shade val="15000"/>
-            </a:schemeClr>
-          </a:lnRef>
-          <a:fillRef idx="1">
-            <a:schemeClr val="accent1"/>
-          </a:fillRef>
-          <a:effectRef idx="0">
-            <a:schemeClr val="accent1"/>
-          </a:effectRef>
-          <a:fontRef idx="minor">
-            <a:schemeClr val="lt1"/>
-          </a:fontRef>
-        </p:style>
-        <p:txBody>
-          <a:bodyPr rtlCol="0" anchor="ctr"/>
-          <a:lstStyle/>
-          <a:p>
-            <a:pPr algn="ctr"/>
-            <a:r>
-              <a:rPr lang="de-DE" sz="1000" b="1" dirty="0">
-                <a:solidFill>
-                  <a:schemeClr val="bg1"/>
-                </a:solidFill>
-                <a:latin typeface="SBB Light" pitchFamily="2" charset="0"/>
-              </a:rPr>
-              <a:t>4</a:t>
-            </a:r>
-            <a:endParaRPr lang="de-CH" sz="1000" b="1" dirty="0">
-              <a:solidFill>
-                <a:schemeClr val="bg1"/>
-              </a:solidFill>
-              <a:latin typeface="SBB Light" pitchFamily="2" charset="0"/>
-            </a:endParaRPr>
-          </a:p>
-        </p:txBody>
-      </p:sp>
-      <p:sp>
-        <p:nvSpPr>
           <p:cNvPr id="277" name="Ellipse 276">
             <a:extLst>
               <a:ext uri="{FF2B5EF4-FFF2-40B4-BE49-F238E27FC236}">
@@ -15624,7 +14789,7 @@
                 </a:solidFill>
                 <a:latin typeface="SBB Light" pitchFamily="2" charset="0"/>
               </a:rPr>
-              <a:t>4</a:t>
+              <a:t>3</a:t>
             </a:r>
             <a:endParaRPr lang="de-CH" sz="1000" b="1" dirty="0">
               <a:solidFill>
@@ -15708,77 +14873,6 @@
       </p:sp>
       <p:sp>
         <p:nvSpPr>
-          <p:cNvPr id="280" name="Ellipse 279">
-            <a:extLst>
-              <a:ext uri="{FF2B5EF4-FFF2-40B4-BE49-F238E27FC236}">
-                <a16:creationId xmlns:a16="http://schemas.microsoft.com/office/drawing/2014/main" id="{DAD21ACB-D566-E4B3-1C45-3252DF5CF6A2}"/>
-              </a:ext>
-            </a:extLst>
-          </p:cNvPr>
-          <p:cNvSpPr/>
-          <p:nvPr/>
-        </p:nvSpPr>
-        <p:spPr>
-          <a:xfrm>
-            <a:off x="6170731" y="5012324"/>
-            <a:ext cx="252549" cy="252549"/>
-          </a:xfrm>
-          <a:prstGeom prst="ellipse">
-            <a:avLst/>
-          </a:prstGeom>
-          <a:solidFill>
-            <a:srgbClr val="FFCC66"/>
-          </a:solidFill>
-          <a:ln>
-            <a:solidFill>
-              <a:schemeClr val="accent2">
-                <a:lumMod val="60000"/>
-                <a:lumOff val="40000"/>
-              </a:schemeClr>
-            </a:solidFill>
-          </a:ln>
-        </p:spPr>
-        <p:style>
-          <a:lnRef idx="2">
-            <a:schemeClr val="accent1">
-              <a:shade val="15000"/>
-            </a:schemeClr>
-          </a:lnRef>
-          <a:fillRef idx="1">
-            <a:schemeClr val="accent1"/>
-          </a:fillRef>
-          <a:effectRef idx="0">
-            <a:schemeClr val="accent1"/>
-          </a:effectRef>
-          <a:fontRef idx="minor">
-            <a:schemeClr val="lt1"/>
-          </a:fontRef>
-        </p:style>
-        <p:txBody>
-          <a:bodyPr rtlCol="0" anchor="ctr"/>
-          <a:lstStyle/>
-          <a:p>
-            <a:pPr algn="ctr"/>
-            <a:r>
-              <a:rPr lang="de-DE" sz="1000" b="1" dirty="0">
-                <a:solidFill>
-                  <a:schemeClr val="bg1"/>
-                </a:solidFill>
-                <a:latin typeface="SBB Light" pitchFamily="2" charset="0"/>
-              </a:rPr>
-              <a:t>0</a:t>
-            </a:r>
-            <a:endParaRPr lang="de-CH" sz="1000" b="1" dirty="0">
-              <a:solidFill>
-                <a:schemeClr val="bg1"/>
-              </a:solidFill>
-              <a:latin typeface="SBB Light" pitchFamily="2" charset="0"/>
-            </a:endParaRPr>
-          </a:p>
-        </p:txBody>
-      </p:sp>
-      <p:sp>
-        <p:nvSpPr>
           <p:cNvPr id="281" name="Ellipse 280">
             <a:extLst>
               <a:ext uri="{FF2B5EF4-FFF2-40B4-BE49-F238E27FC236}">
@@ -15992,70 +15086,6 @@
       </p:sp>
       <p:sp>
         <p:nvSpPr>
-          <p:cNvPr id="284" name="Rechteck: abgerundete Ecken 283">
-            <a:extLst>
-              <a:ext uri="{FF2B5EF4-FFF2-40B4-BE49-F238E27FC236}">
-                <a16:creationId xmlns:a16="http://schemas.microsoft.com/office/drawing/2014/main" id="{138D2AF1-8700-C6FD-058E-1A658D51F2B9}"/>
-              </a:ext>
-            </a:extLst>
-          </p:cNvPr>
-          <p:cNvSpPr/>
-          <p:nvPr/>
-        </p:nvSpPr>
-        <p:spPr>
-          <a:xfrm>
-            <a:off x="3677235" y="4986846"/>
-            <a:ext cx="498599" cy="235995"/>
-          </a:xfrm>
-          <a:prstGeom prst="roundRect">
-            <a:avLst/>
-          </a:prstGeom>
-          <a:solidFill>
-            <a:schemeClr val="bg1"/>
-          </a:solidFill>
-          <a:ln w="9525"/>
-        </p:spPr>
-        <p:style>
-          <a:lnRef idx="2">
-            <a:schemeClr val="accent1">
-              <a:shade val="15000"/>
-            </a:schemeClr>
-          </a:lnRef>
-          <a:fillRef idx="1">
-            <a:schemeClr val="accent1"/>
-          </a:fillRef>
-          <a:effectRef idx="0">
-            <a:schemeClr val="accent1"/>
-          </a:effectRef>
-          <a:fontRef idx="minor">
-            <a:schemeClr val="lt1"/>
-          </a:fontRef>
-        </p:style>
-        <p:txBody>
-          <a:bodyPr rtlCol="0" anchor="ctr"/>
-          <a:lstStyle/>
-          <a:p>
-            <a:pPr algn="ctr"/>
-            <a:r>
-              <a:rPr lang="de-DE" sz="1000" dirty="0">
-                <a:solidFill>
-                  <a:schemeClr val="tx1"/>
-                </a:solidFill>
-                <a:latin typeface="SBB Light" pitchFamily="2" charset="0"/>
-              </a:rPr>
-              <a:t>#J10</a:t>
-            </a:r>
-            <a:endParaRPr lang="de-CH" sz="1000" dirty="0">
-              <a:solidFill>
-                <a:schemeClr val="tx1"/>
-              </a:solidFill>
-              <a:latin typeface="SBB Light" pitchFamily="2" charset="0"/>
-            </a:endParaRPr>
-          </a:p>
-        </p:txBody>
-      </p:sp>
-      <p:sp>
-        <p:nvSpPr>
           <p:cNvPr id="285" name="Rechteck: abgerundete Ecken 284">
             <a:extLst>
               <a:ext uri="{FF2B5EF4-FFF2-40B4-BE49-F238E27FC236}">
@@ -16107,7 +15137,7 @@
                 </a:solidFill>
                 <a:latin typeface="SBB Light" pitchFamily="2" charset="0"/>
               </a:rPr>
-              <a:t>#J11</a:t>
+              <a:t>#J8</a:t>
             </a:r>
             <a:endParaRPr lang="de-CH" sz="1000" dirty="0">
               <a:solidFill>
@@ -16495,76 +15525,6 @@
       </p:sp>
       <p:sp>
         <p:nvSpPr>
-          <p:cNvPr id="294" name="Ellipse 293">
-            <a:extLst>
-              <a:ext uri="{FF2B5EF4-FFF2-40B4-BE49-F238E27FC236}">
-                <a16:creationId xmlns:a16="http://schemas.microsoft.com/office/drawing/2014/main" id="{9066EC92-C8BD-78A5-9797-9EB17B73CF43}"/>
-              </a:ext>
-            </a:extLst>
-          </p:cNvPr>
-          <p:cNvSpPr/>
-          <p:nvPr/>
-        </p:nvSpPr>
-        <p:spPr>
-          <a:xfrm>
-            <a:off x="1456968" y="5014019"/>
-            <a:ext cx="252549" cy="252549"/>
-          </a:xfrm>
-          <a:prstGeom prst="ellipse">
-            <a:avLst/>
-          </a:prstGeom>
-          <a:solidFill>
-            <a:schemeClr val="bg1">
-              <a:lumMod val="75000"/>
-            </a:schemeClr>
-          </a:solidFill>
-          <a:ln>
-            <a:solidFill>
-              <a:schemeClr val="bg1"/>
-            </a:solidFill>
-          </a:ln>
-        </p:spPr>
-        <p:style>
-          <a:lnRef idx="2">
-            <a:schemeClr val="accent1">
-              <a:shade val="15000"/>
-            </a:schemeClr>
-          </a:lnRef>
-          <a:fillRef idx="1">
-            <a:schemeClr val="accent1"/>
-          </a:fillRef>
-          <a:effectRef idx="0">
-            <a:schemeClr val="accent1"/>
-          </a:effectRef>
-          <a:fontRef idx="minor">
-            <a:schemeClr val="lt1"/>
-          </a:fontRef>
-        </p:style>
-        <p:txBody>
-          <a:bodyPr rtlCol="0" anchor="ctr"/>
-          <a:lstStyle/>
-          <a:p>
-            <a:pPr algn="ctr"/>
-            <a:r>
-              <a:rPr lang="de-DE" sz="1000" b="1" dirty="0">
-                <a:solidFill>
-                  <a:schemeClr val="bg1"/>
-                </a:solidFill>
-                <a:latin typeface="SBB Light" pitchFamily="2" charset="0"/>
-              </a:rPr>
-              <a:t>4</a:t>
-            </a:r>
-            <a:endParaRPr lang="de-CH" sz="1000" b="1" dirty="0">
-              <a:solidFill>
-                <a:schemeClr val="bg1"/>
-              </a:solidFill>
-              <a:latin typeface="SBB Light" pitchFamily="2" charset="0"/>
-            </a:endParaRPr>
-          </a:p>
-        </p:txBody>
-      </p:sp>
-      <p:sp>
-        <p:nvSpPr>
           <p:cNvPr id="295" name="Rechteck: abgerundete Ecken 294">
             <a:extLst>
               <a:ext uri="{FF2B5EF4-FFF2-40B4-BE49-F238E27FC236}">
@@ -16616,81 +15576,11 @@
                 </a:solidFill>
                 <a:latin typeface="SBB Light" pitchFamily="2" charset="0"/>
               </a:rPr>
-              <a:t>#J7</a:t>
+              <a:t>#J6</a:t>
             </a:r>
             <a:endParaRPr lang="de-CH" sz="1000" dirty="0">
               <a:solidFill>
                 <a:schemeClr val="tx1"/>
-              </a:solidFill>
-              <a:latin typeface="SBB Light" pitchFamily="2" charset="0"/>
-            </a:endParaRPr>
-          </a:p>
-        </p:txBody>
-      </p:sp>
-      <p:sp>
-        <p:nvSpPr>
-          <p:cNvPr id="296" name="Ellipse 295">
-            <a:extLst>
-              <a:ext uri="{FF2B5EF4-FFF2-40B4-BE49-F238E27FC236}">
-                <a16:creationId xmlns:a16="http://schemas.microsoft.com/office/drawing/2014/main" id="{49573702-AF55-DE38-4B70-99BAAADAD269}"/>
-              </a:ext>
-            </a:extLst>
-          </p:cNvPr>
-          <p:cNvSpPr/>
-          <p:nvPr/>
-        </p:nvSpPr>
-        <p:spPr>
-          <a:xfrm>
-            <a:off x="2415866" y="5013281"/>
-            <a:ext cx="252549" cy="252549"/>
-          </a:xfrm>
-          <a:prstGeom prst="ellipse">
-            <a:avLst/>
-          </a:prstGeom>
-          <a:solidFill>
-            <a:schemeClr val="bg1">
-              <a:lumMod val="75000"/>
-            </a:schemeClr>
-          </a:solidFill>
-          <a:ln>
-            <a:solidFill>
-              <a:schemeClr val="bg1"/>
-            </a:solidFill>
-          </a:ln>
-        </p:spPr>
-        <p:style>
-          <a:lnRef idx="2">
-            <a:schemeClr val="accent1">
-              <a:shade val="15000"/>
-            </a:schemeClr>
-          </a:lnRef>
-          <a:fillRef idx="1">
-            <a:schemeClr val="accent1"/>
-          </a:fillRef>
-          <a:effectRef idx="0">
-            <a:schemeClr val="accent1"/>
-          </a:effectRef>
-          <a:fontRef idx="minor">
-            <a:schemeClr val="lt1"/>
-          </a:fontRef>
-        </p:style>
-        <p:txBody>
-          <a:bodyPr rtlCol="0" anchor="ctr"/>
-          <a:lstStyle/>
-          <a:p>
-            <a:pPr algn="ctr"/>
-            <a:r>
-              <a:rPr lang="de-DE" sz="1000" b="1" dirty="0">
-                <a:solidFill>
-                  <a:schemeClr val="bg1"/>
-                </a:solidFill>
-                <a:latin typeface="SBB Light" pitchFamily="2" charset="0"/>
-              </a:rPr>
-              <a:t>4</a:t>
-            </a:r>
-            <a:endParaRPr lang="de-CH" sz="1000" b="1" dirty="0">
-              <a:solidFill>
-                <a:schemeClr val="bg1"/>
               </a:solidFill>
               <a:latin typeface="SBB Light" pitchFamily="2" charset="0"/>
             </a:endParaRPr>
@@ -16750,7 +15640,7 @@
                 </a:solidFill>
                 <a:latin typeface="SBB Light" pitchFamily="2" charset="0"/>
               </a:rPr>
-              <a:t>#J8</a:t>
+              <a:t>#J7</a:t>
             </a:r>
             <a:endParaRPr lang="de-CH" sz="1000" dirty="0">
               <a:solidFill>
@@ -16941,7 +15831,7 @@
         <p:grpSpPr>
           <a:xfrm>
             <a:off x="9896156" y="3665356"/>
-            <a:ext cx="1154414" cy="1608398"/>
+            <a:ext cx="914207" cy="1608398"/>
             <a:chOff x="1097280" y="1092558"/>
             <a:chExt cx="914400" cy="1608398"/>
           </a:xfrm>
@@ -17194,7 +16084,7 @@
                 </a:solidFill>
                 <a:latin typeface="SBB Light" pitchFamily="2" charset="0"/>
               </a:rPr>
-              <a:t>5</a:t>
+              <a:t>4</a:t>
             </a:r>
             <a:endParaRPr lang="de-CH" sz="1000" b="1" dirty="0">
               <a:solidFill>
@@ -17479,7 +16369,7 @@
         </p:nvSpPr>
         <p:spPr>
           <a:xfrm>
-            <a:off x="4822659" y="2835057"/>
+            <a:off x="5061399" y="2835057"/>
             <a:ext cx="825315" cy="147195"/>
           </a:xfrm>
           <a:prstGeom prst="rect">
@@ -17589,7 +16479,7 @@
         </p:nvCxnSpPr>
         <p:spPr>
           <a:xfrm flipV="1">
-            <a:off x="6154043" y="2871359"/>
+            <a:off x="6893895" y="2888699"/>
             <a:ext cx="0" cy="304494"/>
           </a:xfrm>
           <a:prstGeom prst="line">
@@ -17663,69 +16553,6 @@
       </p:cxnSp>
       <p:sp>
         <p:nvSpPr>
-          <p:cNvPr id="309" name="Pfeil: nach rechts 308">
-            <a:extLst>
-              <a:ext uri="{FF2B5EF4-FFF2-40B4-BE49-F238E27FC236}">
-                <a16:creationId xmlns:a16="http://schemas.microsoft.com/office/drawing/2014/main" id="{DAA8E3C3-086E-E14C-1037-E1FFD3211F3D}"/>
-              </a:ext>
-            </a:extLst>
-          </p:cNvPr>
-          <p:cNvSpPr/>
-          <p:nvPr/>
-        </p:nvSpPr>
-        <p:spPr>
-          <a:xfrm>
-            <a:off x="4072079" y="3035388"/>
-            <a:ext cx="1295680" cy="176591"/>
-          </a:xfrm>
-          <a:prstGeom prst="rightArrow">
-            <a:avLst>
-              <a:gd name="adj1" fmla="val 100000"/>
-              <a:gd name="adj2" fmla="val 50000"/>
-            </a:avLst>
-          </a:prstGeom>
-          <a:solidFill>
-            <a:schemeClr val="bg1">
-              <a:lumMod val="75000"/>
-            </a:schemeClr>
-          </a:solidFill>
-          <a:ln w="12700"/>
-        </p:spPr>
-        <p:style>
-          <a:lnRef idx="2">
-            <a:schemeClr val="accent1">
-              <a:shade val="15000"/>
-            </a:schemeClr>
-          </a:lnRef>
-          <a:fillRef idx="1">
-            <a:schemeClr val="accent1"/>
-          </a:fillRef>
-          <a:effectRef idx="0">
-            <a:schemeClr val="accent1"/>
-          </a:effectRef>
-          <a:fontRef idx="minor">
-            <a:schemeClr val="lt1"/>
-          </a:fontRef>
-        </p:style>
-        <p:txBody>
-          <a:bodyPr rtlCol="0" anchor="ctr"/>
-          <a:lstStyle/>
-          <a:p>
-            <a:pPr algn="ctr"/>
-            <a:r>
-              <a:rPr lang="de-DE" sz="800" dirty="0">
-                <a:latin typeface="SBB Light" pitchFamily="2" charset="0"/>
-              </a:rPr>
-              <a:t>23.9.-13.10.</a:t>
-            </a:r>
-            <a:endParaRPr lang="de-CH" sz="800" dirty="0">
-              <a:latin typeface="SBB Light" pitchFamily="2" charset="0"/>
-            </a:endParaRPr>
-          </a:p>
-        </p:txBody>
-      </p:sp>
-      <p:sp>
-        <p:nvSpPr>
           <p:cNvPr id="318" name="Rechteck 317">
             <a:extLst>
               <a:ext uri="{FF2B5EF4-FFF2-40B4-BE49-F238E27FC236}">
@@ -17804,7 +16631,7 @@
         </p:nvCxnSpPr>
         <p:spPr>
           <a:xfrm flipV="1">
-            <a:off x="8223999" y="2871359"/>
+            <a:off x="9869161" y="2871359"/>
             <a:ext cx="0" cy="304494"/>
           </a:xfrm>
           <a:prstGeom prst="line">
@@ -17890,7 +16717,7 @@
         </p:nvSpPr>
         <p:spPr>
           <a:xfrm>
-            <a:off x="6669712" y="2832271"/>
+            <a:off x="8072207" y="2832271"/>
             <a:ext cx="825315" cy="147195"/>
           </a:xfrm>
           <a:prstGeom prst="rect">
@@ -17954,7 +16781,7 @@
         </p:nvSpPr>
         <p:spPr>
           <a:xfrm>
-            <a:off x="9049773" y="2825464"/>
+            <a:off x="9930449" y="2825464"/>
             <a:ext cx="825315" cy="147195"/>
           </a:xfrm>
           <a:prstGeom prst="rect">
@@ -18775,7 +17602,7 @@
         </p:nvSpPr>
         <p:spPr>
           <a:xfrm>
-            <a:off x="6769246" y="6526542"/>
+            <a:off x="6798586" y="6526542"/>
             <a:ext cx="1657685" cy="278334"/>
           </a:xfrm>
           <a:prstGeom prst="roundRect">
@@ -18859,7 +17686,7 @@
         </p:nvSpPr>
         <p:spPr>
           <a:xfrm>
-            <a:off x="8466691" y="6526541"/>
+            <a:off x="8486251" y="6526541"/>
             <a:ext cx="1657685" cy="277015"/>
           </a:xfrm>
           <a:prstGeom prst="roundRect">
@@ -19015,7 +17842,7 @@
         </p:nvSpPr>
         <p:spPr>
           <a:xfrm>
-            <a:off x="6776960" y="6540322"/>
+            <a:off x="6806300" y="6540322"/>
             <a:ext cx="252549" cy="252549"/>
           </a:xfrm>
           <a:prstGeom prst="ellipse">
@@ -19157,7 +17984,7 @@
         </p:nvSpPr>
         <p:spPr>
           <a:xfrm>
-            <a:off x="8474405" y="6540322"/>
+            <a:off x="8493965" y="6540322"/>
             <a:ext cx="252549" cy="252549"/>
           </a:xfrm>
           <a:prstGeom prst="ellipse">
@@ -19368,7 +18195,7 @@
         </p:nvGrpSpPr>
         <p:grpSpPr>
           <a:xfrm>
-            <a:off x="5198501" y="479207"/>
+            <a:off x="6136295" y="479207"/>
             <a:ext cx="953764" cy="1783084"/>
             <a:chOff x="3318640" y="485438"/>
             <a:chExt cx="953764" cy="1783084"/>
@@ -19614,77 +18441,6 @@
         </p:grpSp>
         <p:sp>
           <p:nvSpPr>
-            <p:cNvPr id="278" name="Ellipse 277">
-              <a:extLst>
-                <a:ext uri="{FF2B5EF4-FFF2-40B4-BE49-F238E27FC236}">
-                  <a16:creationId xmlns:a16="http://schemas.microsoft.com/office/drawing/2014/main" id="{32F86C01-C858-1987-372B-D2D61D769834}"/>
-                </a:ext>
-              </a:extLst>
-            </p:cNvPr>
-            <p:cNvSpPr/>
-            <p:nvPr/>
-          </p:nvSpPr>
-          <p:spPr>
-            <a:xfrm>
-              <a:off x="3380785" y="1835163"/>
-              <a:ext cx="252549" cy="252549"/>
-            </a:xfrm>
-            <a:prstGeom prst="ellipse">
-              <a:avLst/>
-            </a:prstGeom>
-            <a:solidFill>
-              <a:srgbClr val="FFCC66"/>
-            </a:solidFill>
-            <a:ln>
-              <a:solidFill>
-                <a:schemeClr val="accent2">
-                  <a:lumMod val="60000"/>
-                  <a:lumOff val="40000"/>
-                </a:schemeClr>
-              </a:solidFill>
-            </a:ln>
-          </p:spPr>
-          <p:style>
-            <a:lnRef idx="2">
-              <a:schemeClr val="accent1">
-                <a:shade val="15000"/>
-              </a:schemeClr>
-            </a:lnRef>
-            <a:fillRef idx="1">
-              <a:schemeClr val="accent1"/>
-            </a:fillRef>
-            <a:effectRef idx="0">
-              <a:schemeClr val="accent1"/>
-            </a:effectRef>
-            <a:fontRef idx="minor">
-              <a:schemeClr val="lt1"/>
-            </a:fontRef>
-          </p:style>
-          <p:txBody>
-            <a:bodyPr rtlCol="0" anchor="ctr"/>
-            <a:lstStyle/>
-            <a:p>
-              <a:pPr algn="ctr"/>
-              <a:r>
-                <a:rPr lang="de-DE" sz="1000" b="1" dirty="0">
-                  <a:solidFill>
-                    <a:schemeClr val="bg1"/>
-                  </a:solidFill>
-                  <a:latin typeface="SBB Light" pitchFamily="2" charset="0"/>
-                </a:rPr>
-                <a:t>0</a:t>
-              </a:r>
-              <a:endParaRPr lang="de-CH" sz="1000" b="1" dirty="0">
-                <a:solidFill>
-                  <a:schemeClr val="bg1"/>
-                </a:solidFill>
-                <a:latin typeface="SBB Light" pitchFamily="2" charset="0"/>
-              </a:endParaRPr>
-            </a:p>
-          </p:txBody>
-        </p:sp>
-        <p:sp>
-          <p:nvSpPr>
             <p:cNvPr id="286" name="Rechteck: abgerundete Ecken 285">
               <a:extLst>
                 <a:ext uri="{FF2B5EF4-FFF2-40B4-BE49-F238E27FC236}">
@@ -20136,7 +18892,7 @@
         </p:nvSpPr>
         <p:spPr>
           <a:xfrm>
-            <a:off x="8085611" y="3012976"/>
+            <a:off x="9030318" y="3008086"/>
             <a:ext cx="826594" cy="181472"/>
           </a:xfrm>
           <a:prstGeom prst="rightArrow">
@@ -20219,7 +18975,7 @@
         </p:nvSpPr>
         <p:spPr>
           <a:xfrm>
-            <a:off x="8000468" y="2090248"/>
+            <a:off x="8935489" y="2090248"/>
             <a:ext cx="849206" cy="402898"/>
           </a:xfrm>
           <a:prstGeom prst="rect">
@@ -20678,7 +19434,7 @@
         </p:nvSpPr>
         <p:spPr>
           <a:xfrm rot="21282194">
-            <a:off x="4718710" y="2259488"/>
+            <a:off x="5656504" y="2259488"/>
             <a:ext cx="1088515" cy="291717"/>
           </a:xfrm>
           <a:prstGeom prst="roundRect">
@@ -20713,22 +19469,13 @@
           <a:p>
             <a:pPr algn="ctr"/>
             <a:r>
-              <a:rPr lang="de-DE" sz="800" dirty="0" err="1">
-                <a:solidFill>
-                  <a:schemeClr val="tx1"/>
-                </a:solidFill>
-                <a:latin typeface="SBB Light" pitchFamily="2" charset="0"/>
-              </a:rPr>
-              <a:t>Innorookie</a:t>
-            </a:r>
-            <a:r>
               <a:rPr lang="de-DE" sz="800" dirty="0">
                 <a:solidFill>
                   <a:schemeClr val="tx1"/>
                 </a:solidFill>
                 <a:latin typeface="SBB Light" pitchFamily="2" charset="0"/>
               </a:rPr>
-              <a:t> Workshop</a:t>
+              <a:t>Innorookie Workshop</a:t>
             </a:r>
           </a:p>
           <a:p>
@@ -20740,16 +19487,7 @@
                 </a:solidFill>
                 <a:latin typeface="SBB Light" pitchFamily="2" charset="0"/>
               </a:rPr>
-              <a:t>Design </a:t>
-            </a:r>
-            <a:r>
-              <a:rPr lang="de-DE" sz="800" dirty="0" err="1">
-                <a:solidFill>
-                  <a:schemeClr val="tx1"/>
-                </a:solidFill>
-                <a:latin typeface="SBB Light" pitchFamily="2" charset="0"/>
-              </a:rPr>
-              <a:t>Thinking</a:t>
+              <a:t>Design Thinking</a:t>
             </a:r>
             <a:endParaRPr lang="de-DE" sz="400" dirty="0">
               <a:solidFill>
@@ -20781,10 +19519,7 @@
             <a:avLst/>
           </a:prstGeom>
           <a:solidFill>
-            <a:schemeClr val="accent6">
-              <a:lumMod val="60000"/>
-              <a:lumOff val="40000"/>
-            </a:schemeClr>
+            <a:srgbClr val="5AC036"/>
           </a:solidFill>
           <a:ln>
             <a:noFill/>
@@ -20843,10 +19578,10 @@
       </p:sp>
       <p:sp>
         <p:nvSpPr>
-          <p:cNvPr id="76" name="Pfeil: nach unten gekrümmt 75">
+          <p:cNvPr id="7" name="Pfeil: nach rechts 6">
             <a:extLst>
               <a:ext uri="{FF2B5EF4-FFF2-40B4-BE49-F238E27FC236}">
-                <a16:creationId xmlns:a16="http://schemas.microsoft.com/office/drawing/2014/main" id="{80350C06-731E-672B-B2BB-AF3E8A44C99C}"/>
+                <a16:creationId xmlns:a16="http://schemas.microsoft.com/office/drawing/2014/main" id="{4F2B4EAF-AC4D-3341-A25B-39E0E6F9FDF9}"/>
               </a:ext>
             </a:extLst>
           </p:cNvPr>
@@ -20854,13 +19589,20 @@
           <p:nvPr/>
         </p:nvSpPr>
         <p:spPr>
-          <a:xfrm flipH="1">
-            <a:off x="2394155" y="47753"/>
-            <a:ext cx="3895161" cy="321755"/>
+          <a:xfrm>
+            <a:off x="4335596" y="2949591"/>
+            <a:ext cx="373056" cy="180997"/>
           </a:xfrm>
-          <a:prstGeom prst="curvedDownArrow">
-            <a:avLst/>
+          <a:prstGeom prst="rightArrow">
+            <a:avLst>
+              <a:gd name="adj1" fmla="val 100000"/>
+              <a:gd name="adj2" fmla="val 50000"/>
+            </a:avLst>
           </a:prstGeom>
+          <a:solidFill>
+            <a:schemeClr val="bg1"/>
+          </a:solidFill>
+          <a:ln w="12700"/>
         </p:spPr>
         <p:style>
           <a:lnRef idx="2">
@@ -20879,24 +19621,25 @@
           </a:fontRef>
         </p:style>
         <p:txBody>
-          <a:bodyPr rtlCol="0" anchor="ctr"/>
+          <a:bodyPr lIns="0" tIns="0" rIns="0" bIns="0" rtlCol="0" anchor="ctr"/>
           <a:lstStyle/>
           <a:p>
             <a:pPr algn="ctr"/>
-            <a:endParaRPr lang="de-CH">
+            <a:endParaRPr lang="de-CH" sz="800" dirty="0">
               <a:solidFill>
                 <a:schemeClr val="tx1"/>
               </a:solidFill>
+              <a:latin typeface="SBB Light" pitchFamily="2" charset="0"/>
             </a:endParaRPr>
           </a:p>
         </p:txBody>
       </p:sp>
       <p:sp>
         <p:nvSpPr>
-          <p:cNvPr id="228" name="Pfeil: nach unten 227">
+          <p:cNvPr id="309" name="Pfeil: nach rechts 308">
             <a:extLst>
               <a:ext uri="{FF2B5EF4-FFF2-40B4-BE49-F238E27FC236}">
-                <a16:creationId xmlns:a16="http://schemas.microsoft.com/office/drawing/2014/main" id="{CC30F1E1-8247-84F3-05C5-1A431B2DF181}"/>
+                <a16:creationId xmlns:a16="http://schemas.microsoft.com/office/drawing/2014/main" id="{DAA8E3C3-086E-E14C-1037-E1FFD3211F3D}"/>
               </a:ext>
             </a:extLst>
           </p:cNvPr>
@@ -20904,13 +19647,22 @@
           <p:nvPr/>
         </p:nvSpPr>
         <p:spPr>
-          <a:xfrm rot="2807483">
-            <a:off x="5830921" y="1911872"/>
-            <a:ext cx="220323" cy="1861435"/>
+          <a:xfrm>
+            <a:off x="3883558" y="3035388"/>
+            <a:ext cx="1295680" cy="176591"/>
           </a:xfrm>
-          <a:prstGeom prst="downArrow">
-            <a:avLst/>
+          <a:prstGeom prst="rightArrow">
+            <a:avLst>
+              <a:gd name="adj1" fmla="val 100000"/>
+              <a:gd name="adj2" fmla="val 50000"/>
+            </a:avLst>
           </a:prstGeom>
+          <a:solidFill>
+            <a:schemeClr val="bg1">
+              <a:lumMod val="75000"/>
+            </a:schemeClr>
+          </a:solidFill>
+          <a:ln w="12700"/>
         </p:spPr>
         <p:style>
           <a:lnRef idx="2">
@@ -20933,10 +19685,365 @@
           <a:lstStyle/>
           <a:p>
             <a:pPr algn="ctr"/>
-            <a:endParaRPr lang="de-CH"/>
+            <a:r>
+              <a:rPr lang="de-DE" sz="800" dirty="0">
+                <a:latin typeface="SBB Light" pitchFamily="2" charset="0"/>
+              </a:rPr>
+              <a:t>23.9.-13.10.</a:t>
+            </a:r>
+            <a:endParaRPr lang="de-CH" sz="800" dirty="0">
+              <a:latin typeface="SBB Light" pitchFamily="2" charset="0"/>
+            </a:endParaRPr>
           </a:p>
         </p:txBody>
       </p:sp>
+      <p:sp>
+        <p:nvSpPr>
+          <p:cNvPr id="265" name="Textfeld 264">
+            <a:extLst>
+              <a:ext uri="{FF2B5EF4-FFF2-40B4-BE49-F238E27FC236}">
+                <a16:creationId xmlns:a16="http://schemas.microsoft.com/office/drawing/2014/main" id="{12F87D8F-B52E-E8B5-F623-BDE94F6F9F0A}"/>
+              </a:ext>
+            </a:extLst>
+          </p:cNvPr>
+          <p:cNvSpPr txBox="1"/>
+          <p:nvPr/>
+        </p:nvSpPr>
+        <p:spPr>
+          <a:xfrm>
+            <a:off x="4199255" y="2805385"/>
+            <a:ext cx="930918" cy="200055"/>
+          </a:xfrm>
+          <a:prstGeom prst="rect">
+            <a:avLst/>
+          </a:prstGeom>
+          <a:noFill/>
+          <a:ln>
+            <a:noFill/>
+          </a:ln>
+        </p:spPr>
+        <p:style>
+          <a:lnRef idx="2">
+            <a:schemeClr val="accent1">
+              <a:shade val="15000"/>
+            </a:schemeClr>
+          </a:lnRef>
+          <a:fillRef idx="1">
+            <a:schemeClr val="accent1"/>
+          </a:fillRef>
+          <a:effectRef idx="0">
+            <a:schemeClr val="accent1"/>
+          </a:effectRef>
+          <a:fontRef idx="minor">
+            <a:schemeClr val="lt1"/>
+          </a:fontRef>
+        </p:style>
+        <p:txBody>
+          <a:bodyPr rtlCol="0" anchor="t"/>
+          <a:lstStyle>
+            <a:defPPr>
+              <a:defRPr lang="de-DE"/>
+            </a:defPPr>
+            <a:lvl1pPr>
+              <a:defRPr sz="700">
+                <a:latin typeface="SBB Light" pitchFamily="2" charset="0"/>
+              </a:defRPr>
+            </a:lvl1pPr>
+            <a:lvl2pPr>
+              <a:defRPr>
+                <a:solidFill>
+                  <a:schemeClr val="lt1"/>
+                </a:solidFill>
+              </a:defRPr>
+            </a:lvl2pPr>
+            <a:lvl3pPr>
+              <a:defRPr>
+                <a:solidFill>
+                  <a:schemeClr val="lt1"/>
+                </a:solidFill>
+              </a:defRPr>
+            </a:lvl3pPr>
+            <a:lvl4pPr>
+              <a:defRPr>
+                <a:solidFill>
+                  <a:schemeClr val="lt1"/>
+                </a:solidFill>
+              </a:defRPr>
+            </a:lvl4pPr>
+            <a:lvl5pPr>
+              <a:defRPr>
+                <a:solidFill>
+                  <a:schemeClr val="lt1"/>
+                </a:solidFill>
+              </a:defRPr>
+            </a:lvl5pPr>
+            <a:lvl6pPr>
+              <a:defRPr>
+                <a:solidFill>
+                  <a:schemeClr val="lt1"/>
+                </a:solidFill>
+              </a:defRPr>
+            </a:lvl6pPr>
+            <a:lvl7pPr>
+              <a:defRPr>
+                <a:solidFill>
+                  <a:schemeClr val="lt1"/>
+                </a:solidFill>
+              </a:defRPr>
+            </a:lvl7pPr>
+            <a:lvl8pPr>
+              <a:defRPr>
+                <a:solidFill>
+                  <a:schemeClr val="lt1"/>
+                </a:solidFill>
+              </a:defRPr>
+            </a:lvl8pPr>
+            <a:lvl9pPr>
+              <a:defRPr>
+                <a:solidFill>
+                  <a:schemeClr val="lt1"/>
+                </a:solidFill>
+              </a:defRPr>
+            </a:lvl9pPr>
+          </a:lstStyle>
+          <a:p>
+            <a:r>
+              <a:rPr lang="de-DE" dirty="0">
+                <a:solidFill>
+                  <a:schemeClr val="tx1"/>
+                </a:solidFill>
+              </a:rPr>
+              <a:t>Login Transfer-Tag</a:t>
+            </a:r>
+            <a:endParaRPr lang="de-CH" dirty="0">
+              <a:solidFill>
+                <a:schemeClr val="tx1"/>
+              </a:solidFill>
+            </a:endParaRPr>
+          </a:p>
+        </p:txBody>
+      </p:sp>
+      <p:grpSp>
+        <p:nvGrpSpPr>
+          <p:cNvPr id="266" name="Gruppieren 265">
+            <a:extLst>
+              <a:ext uri="{FF2B5EF4-FFF2-40B4-BE49-F238E27FC236}">
+                <a16:creationId xmlns:a16="http://schemas.microsoft.com/office/drawing/2014/main" id="{BDFF7F91-9EAB-49F7-DF38-D21FF0CD1F19}"/>
+              </a:ext>
+            </a:extLst>
+          </p:cNvPr>
+          <p:cNvGrpSpPr/>
+          <p:nvPr/>
+        </p:nvGrpSpPr>
+        <p:grpSpPr>
+          <a:xfrm>
+            <a:off x="5234743" y="495330"/>
+            <a:ext cx="914400" cy="1599517"/>
+            <a:chOff x="1097280" y="1092558"/>
+            <a:chExt cx="914400" cy="1599517"/>
+          </a:xfrm>
+          <a:solidFill>
+            <a:srgbClr val="5AC036"/>
+          </a:solidFill>
+        </p:grpSpPr>
+        <p:sp>
+          <p:nvSpPr>
+            <p:cNvPr id="71" name="Rechteck: abgerundete Ecken 70">
+              <a:extLst>
+                <a:ext uri="{FF2B5EF4-FFF2-40B4-BE49-F238E27FC236}">
+                  <a16:creationId xmlns:a16="http://schemas.microsoft.com/office/drawing/2014/main" id="{2BA76329-B41E-268B-E3B0-0EC58AFF6B3C}"/>
+                </a:ext>
+              </a:extLst>
+            </p:cNvPr>
+            <p:cNvSpPr/>
+            <p:nvPr/>
+          </p:nvSpPr>
+          <p:spPr>
+            <a:xfrm>
+              <a:off x="1097280" y="1092558"/>
+              <a:ext cx="914400" cy="1599517"/>
+            </a:xfrm>
+            <a:prstGeom prst="roundRect">
+              <a:avLst/>
+            </a:prstGeom>
+            <a:grpFill/>
+            <a:ln>
+              <a:noFill/>
+            </a:ln>
+          </p:spPr>
+          <p:style>
+            <a:lnRef idx="2">
+              <a:schemeClr val="accent1">
+                <a:shade val="15000"/>
+              </a:schemeClr>
+            </a:lnRef>
+            <a:fillRef idx="1">
+              <a:schemeClr val="accent1"/>
+            </a:fillRef>
+            <a:effectRef idx="0">
+              <a:schemeClr val="accent1"/>
+            </a:effectRef>
+            <a:fontRef idx="minor">
+              <a:schemeClr val="lt1"/>
+            </a:fontRef>
+          </p:style>
+          <p:txBody>
+            <a:bodyPr lIns="36000" tIns="36000" rIns="36000" bIns="36000" rtlCol="0" anchor="t"/>
+            <a:lstStyle/>
+            <a:p>
+              <a:pPr algn="ctr"/>
+              <a:r>
+                <a:rPr lang="de-DE" sz="1100" dirty="0">
+                  <a:solidFill>
+                    <a:schemeClr val="tx1"/>
+                  </a:solidFill>
+                  <a:latin typeface="SBB Light" pitchFamily="2" charset="0"/>
+                </a:rPr>
+                <a:t>Lombok</a:t>
+              </a:r>
+            </a:p>
+            <a:p>
+              <a:pPr algn="ctr"/>
+              <a:endParaRPr lang="de-DE" sz="800" dirty="0">
+                <a:solidFill>
+                  <a:schemeClr val="tx1"/>
+                </a:solidFill>
+                <a:latin typeface="SBB Light" pitchFamily="2" charset="0"/>
+              </a:endParaRPr>
+            </a:p>
+            <a:p>
+              <a:pPr algn="ctr"/>
+              <a:endParaRPr lang="de-DE" sz="800" dirty="0">
+                <a:solidFill>
+                  <a:schemeClr val="tx1"/>
+                </a:solidFill>
+                <a:latin typeface="SBB Light" pitchFamily="2" charset="0"/>
+              </a:endParaRPr>
+            </a:p>
+            <a:p>
+              <a:pPr algn="ctr"/>
+              <a:endParaRPr lang="de-DE" sz="800" dirty="0">
+                <a:solidFill>
+                  <a:schemeClr val="tx1"/>
+                </a:solidFill>
+                <a:latin typeface="SBB Light" pitchFamily="2" charset="0"/>
+              </a:endParaRPr>
+            </a:p>
+            <a:p>
+              <a:pPr algn="ctr"/>
+              <a:r>
+                <a:rPr lang="de-DE" sz="800" dirty="0">
+                  <a:solidFill>
+                    <a:schemeClr val="tx1"/>
+                  </a:solidFill>
+                  <a:latin typeface="SBB Light" pitchFamily="2" charset="0"/>
+                </a:rPr>
+                <a:t>Reduce Boilerplate</a:t>
+              </a:r>
+            </a:p>
+            <a:p>
+              <a:pPr algn="ctr"/>
+              <a:r>
+                <a:rPr lang="de-DE" sz="800" dirty="0">
+                  <a:solidFill>
+                    <a:schemeClr val="tx1"/>
+                  </a:solidFill>
+                  <a:latin typeface="SBB Light" pitchFamily="2" charset="0"/>
+                </a:rPr>
+                <a:t>Code</a:t>
+              </a:r>
+            </a:p>
+          </p:txBody>
+        </p:sp>
+        <p:cxnSp>
+          <p:nvCxnSpPr>
+            <p:cNvPr id="72" name="Gerader Verbinder 71">
+              <a:extLst>
+                <a:ext uri="{FF2B5EF4-FFF2-40B4-BE49-F238E27FC236}">
+                  <a16:creationId xmlns:a16="http://schemas.microsoft.com/office/drawing/2014/main" id="{E383B0EE-4FD9-851C-7C64-3EF22F0939C6}"/>
+                </a:ext>
+              </a:extLst>
+            </p:cNvPr>
+            <p:cNvCxnSpPr>
+              <a:cxnSpLocks/>
+            </p:cNvCxnSpPr>
+            <p:nvPr/>
+          </p:nvCxnSpPr>
+          <p:spPr>
+            <a:xfrm>
+              <a:off x="1167384" y="1541272"/>
+              <a:ext cx="777240" cy="0"/>
+            </a:xfrm>
+            <a:prstGeom prst="line">
+              <a:avLst/>
+            </a:prstGeom>
+            <a:grpFill/>
+            <a:ln>
+              <a:solidFill>
+                <a:schemeClr val="bg1"/>
+              </a:solidFill>
+            </a:ln>
+          </p:spPr>
+          <p:style>
+            <a:lnRef idx="2">
+              <a:schemeClr val="accent1"/>
+            </a:lnRef>
+            <a:fillRef idx="0">
+              <a:schemeClr val="accent1"/>
+            </a:fillRef>
+            <a:effectRef idx="1">
+              <a:schemeClr val="accent1"/>
+            </a:effectRef>
+            <a:fontRef idx="minor">
+              <a:schemeClr val="tx1"/>
+            </a:fontRef>
+          </p:style>
+        </p:cxnSp>
+        <p:cxnSp>
+          <p:nvCxnSpPr>
+            <p:cNvPr id="73" name="Gerader Verbinder 72">
+              <a:extLst>
+                <a:ext uri="{FF2B5EF4-FFF2-40B4-BE49-F238E27FC236}">
+                  <a16:creationId xmlns:a16="http://schemas.microsoft.com/office/drawing/2014/main" id="{A76D251A-85E8-221E-19A6-3C0993462DB2}"/>
+                </a:ext>
+              </a:extLst>
+            </p:cNvPr>
+            <p:cNvCxnSpPr>
+              <a:cxnSpLocks/>
+            </p:cNvCxnSpPr>
+            <p:nvPr/>
+          </p:nvCxnSpPr>
+          <p:spPr>
+            <a:xfrm>
+              <a:off x="1167384" y="2367697"/>
+              <a:ext cx="777240" cy="0"/>
+            </a:xfrm>
+            <a:prstGeom prst="line">
+              <a:avLst/>
+            </a:prstGeom>
+            <a:grpFill/>
+            <a:ln>
+              <a:solidFill>
+                <a:schemeClr val="bg1"/>
+              </a:solidFill>
+            </a:ln>
+          </p:spPr>
+          <p:style>
+            <a:lnRef idx="2">
+              <a:schemeClr val="accent1"/>
+            </a:lnRef>
+            <a:fillRef idx="0">
+              <a:schemeClr val="accent1"/>
+            </a:fillRef>
+            <a:effectRef idx="1">
+              <a:schemeClr val="accent1"/>
+            </a:effectRef>
+            <a:fontRef idx="minor">
+              <a:schemeClr val="tx1"/>
+            </a:fontRef>
+          </p:style>
+        </p:cxnSp>
+      </p:grpSp>
     </p:spTree>
     <p:extLst>
       <p:ext uri="{BB962C8B-B14F-4D97-AF65-F5344CB8AC3E}">

</xml_diff>

<commit_message>
feature(refactor-overview): small fixes on module numbers with new correct ones (incl. overview)
</commit_message>
<xml_diff>
--- a/content/en/docs/overview/INF_Basisausbildung_Teil_1_Modulplan.pptx
+++ b/content/en/docs/overview/INF_Basisausbildung_Teil_1_Modulplan.pptx
@@ -3066,7 +3066,7 @@
           <a:p>
             <a:fld id="{37C84E4B-B338-4193-A47A-275E09D9F7E4}" type="datetimeFigureOut">
               <a:rPr lang="de-CH" smtClean="0"/>
-              <a:t>23.10.2024</a:t>
+              <a:t>25.10.2024</a:t>
             </a:fld>
             <a:endParaRPr lang="de-CH" dirty="0"/>
           </a:p>
@@ -3567,7 +3567,7 @@
           <a:p>
             <a:fld id="{19D283FB-C38C-4A98-BBD1-312954666360}" type="datetimeFigureOut">
               <a:rPr lang="de-CH" smtClean="0"/>
-              <a:t>23.10.2024</a:t>
+              <a:t>25.10.2024</a:t>
             </a:fld>
             <a:endParaRPr lang="de-CH" dirty="0"/>
           </a:p>
@@ -3767,7 +3767,7 @@
           <a:p>
             <a:fld id="{19D283FB-C38C-4A98-BBD1-312954666360}" type="datetimeFigureOut">
               <a:rPr lang="de-CH" smtClean="0"/>
-              <a:t>23.10.2024</a:t>
+              <a:t>25.10.2024</a:t>
             </a:fld>
             <a:endParaRPr lang="de-CH" dirty="0"/>
           </a:p>
@@ -3977,7 +3977,7 @@
           <a:p>
             <a:fld id="{19D283FB-C38C-4A98-BBD1-312954666360}" type="datetimeFigureOut">
               <a:rPr lang="de-CH" smtClean="0"/>
-              <a:t>23.10.2024</a:t>
+              <a:t>25.10.2024</a:t>
             </a:fld>
             <a:endParaRPr lang="de-CH" dirty="0"/>
           </a:p>
@@ -4177,7 +4177,7 @@
           <a:p>
             <a:fld id="{19D283FB-C38C-4A98-BBD1-312954666360}" type="datetimeFigureOut">
               <a:rPr lang="de-CH" smtClean="0"/>
-              <a:t>23.10.2024</a:t>
+              <a:t>25.10.2024</a:t>
             </a:fld>
             <a:endParaRPr lang="de-CH" dirty="0"/>
           </a:p>
@@ -4453,7 +4453,7 @@
           <a:p>
             <a:fld id="{19D283FB-C38C-4A98-BBD1-312954666360}" type="datetimeFigureOut">
               <a:rPr lang="de-CH" smtClean="0"/>
-              <a:t>23.10.2024</a:t>
+              <a:t>25.10.2024</a:t>
             </a:fld>
             <a:endParaRPr lang="de-CH" dirty="0"/>
           </a:p>
@@ -4721,7 +4721,7 @@
           <a:p>
             <a:fld id="{19D283FB-C38C-4A98-BBD1-312954666360}" type="datetimeFigureOut">
               <a:rPr lang="de-CH" smtClean="0"/>
-              <a:t>23.10.2024</a:t>
+              <a:t>25.10.2024</a:t>
             </a:fld>
             <a:endParaRPr lang="de-CH" dirty="0"/>
           </a:p>
@@ -5136,7 +5136,7 @@
           <a:p>
             <a:fld id="{19D283FB-C38C-4A98-BBD1-312954666360}" type="datetimeFigureOut">
               <a:rPr lang="de-CH" smtClean="0"/>
-              <a:t>23.10.2024</a:t>
+              <a:t>25.10.2024</a:t>
             </a:fld>
             <a:endParaRPr lang="de-CH" dirty="0"/>
           </a:p>
@@ -5278,7 +5278,7 @@
           <a:p>
             <a:fld id="{19D283FB-C38C-4A98-BBD1-312954666360}" type="datetimeFigureOut">
               <a:rPr lang="de-CH" smtClean="0"/>
-              <a:t>23.10.2024</a:t>
+              <a:t>25.10.2024</a:t>
             </a:fld>
             <a:endParaRPr lang="de-CH" dirty="0"/>
           </a:p>
@@ -5391,7 +5391,7 @@
           <a:p>
             <a:fld id="{19D283FB-C38C-4A98-BBD1-312954666360}" type="datetimeFigureOut">
               <a:rPr lang="de-CH" smtClean="0"/>
-              <a:t>23.10.2024</a:t>
+              <a:t>25.10.2024</a:t>
             </a:fld>
             <a:endParaRPr lang="de-CH" dirty="0"/>
           </a:p>
@@ -5704,7 +5704,7 @@
           <a:p>
             <a:fld id="{19D283FB-C38C-4A98-BBD1-312954666360}" type="datetimeFigureOut">
               <a:rPr lang="de-CH" smtClean="0"/>
-              <a:t>23.10.2024</a:t>
+              <a:t>25.10.2024</a:t>
             </a:fld>
             <a:endParaRPr lang="de-CH" dirty="0"/>
           </a:p>
@@ -5993,7 +5993,7 @@
           <a:p>
             <a:fld id="{19D283FB-C38C-4A98-BBD1-312954666360}" type="datetimeFigureOut">
               <a:rPr lang="de-CH" smtClean="0"/>
-              <a:t>23.10.2024</a:t>
+              <a:t>25.10.2024</a:t>
             </a:fld>
             <a:endParaRPr lang="de-CH" dirty="0"/>
           </a:p>
@@ -6236,7 +6236,7 @@
           <a:p>
             <a:fld id="{19D283FB-C38C-4A98-BBD1-312954666360}" type="datetimeFigureOut">
               <a:rPr lang="de-CH" smtClean="0"/>
-              <a:t>23.10.2024</a:t>
+              <a:t>25.10.2024</a:t>
             </a:fld>
             <a:endParaRPr lang="de-CH" dirty="0"/>
           </a:p>
@@ -20044,6 +20044,134 @@
           </p:style>
         </p:cxnSp>
       </p:grpSp>
+      <p:sp>
+        <p:nvSpPr>
+          <p:cNvPr id="27" name="Rechteck: abgerundete Ecken 26">
+            <a:extLst>
+              <a:ext uri="{FF2B5EF4-FFF2-40B4-BE49-F238E27FC236}">
+                <a16:creationId xmlns:a16="http://schemas.microsoft.com/office/drawing/2014/main" id="{E6CBC57F-3819-65EB-BCD8-D01270BBC726}"/>
+              </a:ext>
+            </a:extLst>
+          </p:cNvPr>
+          <p:cNvSpPr/>
+          <p:nvPr/>
+        </p:nvSpPr>
+        <p:spPr>
+          <a:xfrm>
+            <a:off x="5596335" y="1805753"/>
+            <a:ext cx="498599" cy="235995"/>
+          </a:xfrm>
+          <a:prstGeom prst="roundRect">
+            <a:avLst/>
+          </a:prstGeom>
+          <a:solidFill>
+            <a:schemeClr val="bg1"/>
+          </a:solidFill>
+          <a:ln w="9525"/>
+        </p:spPr>
+        <p:style>
+          <a:lnRef idx="2">
+            <a:schemeClr val="accent1">
+              <a:shade val="15000"/>
+            </a:schemeClr>
+          </a:lnRef>
+          <a:fillRef idx="1">
+            <a:schemeClr val="accent1"/>
+          </a:fillRef>
+          <a:effectRef idx="0">
+            <a:schemeClr val="accent1"/>
+          </a:effectRef>
+          <a:fontRef idx="minor">
+            <a:schemeClr val="lt1"/>
+          </a:fontRef>
+        </p:style>
+        <p:txBody>
+          <a:bodyPr rtlCol="0" anchor="ctr"/>
+          <a:lstStyle/>
+          <a:p>
+            <a:pPr algn="ctr"/>
+            <a:r>
+              <a:rPr lang="de-DE" sz="1000" dirty="0">
+                <a:solidFill>
+                  <a:schemeClr val="tx1"/>
+                </a:solidFill>
+                <a:latin typeface="SBB Light" pitchFamily="2" charset="0"/>
+              </a:rPr>
+              <a:t>#J3</a:t>
+            </a:r>
+            <a:endParaRPr lang="de-CH" sz="1000" dirty="0">
+              <a:solidFill>
+                <a:schemeClr val="tx1"/>
+              </a:solidFill>
+              <a:latin typeface="SBB Light" pitchFamily="2" charset="0"/>
+            </a:endParaRPr>
+          </a:p>
+        </p:txBody>
+      </p:sp>
+      <p:sp>
+        <p:nvSpPr>
+          <p:cNvPr id="28" name="Rechteck: abgerundete Ecken 27">
+            <a:extLst>
+              <a:ext uri="{FF2B5EF4-FFF2-40B4-BE49-F238E27FC236}">
+                <a16:creationId xmlns:a16="http://schemas.microsoft.com/office/drawing/2014/main" id="{BCA0B289-C902-C71A-6DEF-A5931A2104D6}"/>
+              </a:ext>
+            </a:extLst>
+          </p:cNvPr>
+          <p:cNvSpPr/>
+          <p:nvPr/>
+        </p:nvSpPr>
+        <p:spPr>
+          <a:xfrm>
+            <a:off x="3711492" y="4992539"/>
+            <a:ext cx="498599" cy="235995"/>
+          </a:xfrm>
+          <a:prstGeom prst="roundRect">
+            <a:avLst/>
+          </a:prstGeom>
+          <a:solidFill>
+            <a:schemeClr val="bg1"/>
+          </a:solidFill>
+          <a:ln w="9525"/>
+        </p:spPr>
+        <p:style>
+          <a:lnRef idx="2">
+            <a:schemeClr val="accent1">
+              <a:shade val="15000"/>
+            </a:schemeClr>
+          </a:lnRef>
+          <a:fillRef idx="1">
+            <a:schemeClr val="accent1"/>
+          </a:fillRef>
+          <a:effectRef idx="0">
+            <a:schemeClr val="accent1"/>
+          </a:effectRef>
+          <a:fontRef idx="minor">
+            <a:schemeClr val="lt1"/>
+          </a:fontRef>
+        </p:style>
+        <p:txBody>
+          <a:bodyPr rtlCol="0" anchor="ctr"/>
+          <a:lstStyle/>
+          <a:p>
+            <a:pPr algn="ctr"/>
+            <a:r>
+              <a:rPr lang="de-DE" sz="1000" dirty="0">
+                <a:solidFill>
+                  <a:schemeClr val="tx1"/>
+                </a:solidFill>
+                <a:latin typeface="SBB Light" pitchFamily="2" charset="0"/>
+              </a:rPr>
+              <a:t>#J8</a:t>
+            </a:r>
+            <a:endParaRPr lang="de-CH" sz="1000" dirty="0">
+              <a:solidFill>
+                <a:schemeClr val="tx1"/>
+              </a:solidFill>
+              <a:latin typeface="SBB Light" pitchFamily="2" charset="0"/>
+            </a:endParaRPr>
+          </a:p>
+        </p:txBody>
+      </p:sp>
     </p:spTree>
     <p:extLst>
       <p:ext uri="{BB962C8B-B14F-4D97-AF65-F5344CB8AC3E}">

</xml_diff>

<commit_message>
feature(refactor-overview): updates for overview-image, reordered labs based on docs ordering
</commit_message>
<xml_diff>
--- a/content/en/docs/overview/INF_Basisausbildung_Teil_1_Modulplan.pptx
+++ b/content/en/docs/overview/INF_Basisausbildung_Teil_1_Modulplan.pptx
@@ -3066,7 +3066,7 @@
           <a:p>
             <a:fld id="{37C84E4B-B338-4193-A47A-275E09D9F7E4}" type="datetimeFigureOut">
               <a:rPr lang="de-CH" smtClean="0"/>
-              <a:t>25.10.2024</a:t>
+              <a:t>30.10.2024</a:t>
             </a:fld>
             <a:endParaRPr lang="de-CH" dirty="0"/>
           </a:p>
@@ -3567,7 +3567,7 @@
           <a:p>
             <a:fld id="{19D283FB-C38C-4A98-BBD1-312954666360}" type="datetimeFigureOut">
               <a:rPr lang="de-CH" smtClean="0"/>
-              <a:t>25.10.2024</a:t>
+              <a:t>30.10.2024</a:t>
             </a:fld>
             <a:endParaRPr lang="de-CH" dirty="0"/>
           </a:p>
@@ -3767,7 +3767,7 @@
           <a:p>
             <a:fld id="{19D283FB-C38C-4A98-BBD1-312954666360}" type="datetimeFigureOut">
               <a:rPr lang="de-CH" smtClean="0"/>
-              <a:t>25.10.2024</a:t>
+              <a:t>30.10.2024</a:t>
             </a:fld>
             <a:endParaRPr lang="de-CH" dirty="0"/>
           </a:p>
@@ -3977,7 +3977,7 @@
           <a:p>
             <a:fld id="{19D283FB-C38C-4A98-BBD1-312954666360}" type="datetimeFigureOut">
               <a:rPr lang="de-CH" smtClean="0"/>
-              <a:t>25.10.2024</a:t>
+              <a:t>30.10.2024</a:t>
             </a:fld>
             <a:endParaRPr lang="de-CH" dirty="0"/>
           </a:p>
@@ -4177,7 +4177,7 @@
           <a:p>
             <a:fld id="{19D283FB-C38C-4A98-BBD1-312954666360}" type="datetimeFigureOut">
               <a:rPr lang="de-CH" smtClean="0"/>
-              <a:t>25.10.2024</a:t>
+              <a:t>30.10.2024</a:t>
             </a:fld>
             <a:endParaRPr lang="de-CH" dirty="0"/>
           </a:p>
@@ -4453,7 +4453,7 @@
           <a:p>
             <a:fld id="{19D283FB-C38C-4A98-BBD1-312954666360}" type="datetimeFigureOut">
               <a:rPr lang="de-CH" smtClean="0"/>
-              <a:t>25.10.2024</a:t>
+              <a:t>30.10.2024</a:t>
             </a:fld>
             <a:endParaRPr lang="de-CH" dirty="0"/>
           </a:p>
@@ -4721,7 +4721,7 @@
           <a:p>
             <a:fld id="{19D283FB-C38C-4A98-BBD1-312954666360}" type="datetimeFigureOut">
               <a:rPr lang="de-CH" smtClean="0"/>
-              <a:t>25.10.2024</a:t>
+              <a:t>30.10.2024</a:t>
             </a:fld>
             <a:endParaRPr lang="de-CH" dirty="0"/>
           </a:p>
@@ -5136,7 +5136,7 @@
           <a:p>
             <a:fld id="{19D283FB-C38C-4A98-BBD1-312954666360}" type="datetimeFigureOut">
               <a:rPr lang="de-CH" smtClean="0"/>
-              <a:t>25.10.2024</a:t>
+              <a:t>30.10.2024</a:t>
             </a:fld>
             <a:endParaRPr lang="de-CH" dirty="0"/>
           </a:p>
@@ -5278,7 +5278,7 @@
           <a:p>
             <a:fld id="{19D283FB-C38C-4A98-BBD1-312954666360}" type="datetimeFigureOut">
               <a:rPr lang="de-CH" smtClean="0"/>
-              <a:t>25.10.2024</a:t>
+              <a:t>30.10.2024</a:t>
             </a:fld>
             <a:endParaRPr lang="de-CH" dirty="0"/>
           </a:p>
@@ -5391,7 +5391,7 @@
           <a:p>
             <a:fld id="{19D283FB-C38C-4A98-BBD1-312954666360}" type="datetimeFigureOut">
               <a:rPr lang="de-CH" smtClean="0"/>
-              <a:t>25.10.2024</a:t>
+              <a:t>30.10.2024</a:t>
             </a:fld>
             <a:endParaRPr lang="de-CH" dirty="0"/>
           </a:p>
@@ -5704,7 +5704,7 @@
           <a:p>
             <a:fld id="{19D283FB-C38C-4A98-BBD1-312954666360}" type="datetimeFigureOut">
               <a:rPr lang="de-CH" smtClean="0"/>
-              <a:t>25.10.2024</a:t>
+              <a:t>30.10.2024</a:t>
             </a:fld>
             <a:endParaRPr lang="de-CH" dirty="0"/>
           </a:p>
@@ -5993,7 +5993,7 @@
           <a:p>
             <a:fld id="{19D283FB-C38C-4A98-BBD1-312954666360}" type="datetimeFigureOut">
               <a:rPr lang="de-CH" smtClean="0"/>
-              <a:t>25.10.2024</a:t>
+              <a:t>30.10.2024</a:t>
             </a:fld>
             <a:endParaRPr lang="de-CH" dirty="0"/>
           </a:p>
@@ -6236,7 +6236,7 @@
           <a:p>
             <a:fld id="{19D283FB-C38C-4A98-BBD1-312954666360}" type="datetimeFigureOut">
               <a:rPr lang="de-CH" smtClean="0"/>
-              <a:t>25.10.2024</a:t>
+              <a:t>30.10.2024</a:t>
             </a:fld>
             <a:endParaRPr lang="de-CH" dirty="0"/>
           </a:p>
@@ -6755,7 +6755,7 @@
         </p:nvSpPr>
         <p:spPr>
           <a:xfrm>
-            <a:off x="10858809" y="3695972"/>
+            <a:off x="10858809" y="1638572"/>
             <a:ext cx="1154412" cy="1241028"/>
           </a:xfrm>
           <a:prstGeom prst="rect">
@@ -6820,7 +6820,7 @@
         </p:nvCxnSpPr>
         <p:spPr>
           <a:xfrm flipV="1">
-            <a:off x="10746483" y="6059756"/>
+            <a:off x="11944347" y="6059756"/>
             <a:ext cx="0" cy="304494"/>
           </a:xfrm>
           <a:prstGeom prst="line">
@@ -6908,7 +6908,7 @@
         </p:nvSpPr>
         <p:spPr>
           <a:xfrm>
-            <a:off x="11256092" y="672517"/>
+            <a:off x="11256092" y="251893"/>
             <a:ext cx="820358" cy="1290309"/>
           </a:xfrm>
           <a:prstGeom prst="rect">
@@ -9456,7 +9456,7 @@
         </p:nvSpPr>
         <p:spPr>
           <a:xfrm>
-            <a:off x="10863164" y="510162"/>
+            <a:off x="10863164" y="89538"/>
             <a:ext cx="1150057" cy="1506056"/>
           </a:xfrm>
           <a:prstGeom prst="rect">
@@ -9517,7 +9517,7 @@
         </p:nvSpPr>
         <p:spPr>
           <a:xfrm>
-            <a:off x="10946950" y="700636"/>
+            <a:off x="10946950" y="280012"/>
             <a:ext cx="252549" cy="252549"/>
           </a:xfrm>
           <a:prstGeom prst="ellipse">
@@ -9786,7 +9786,7 @@
         </p:nvSpPr>
         <p:spPr>
           <a:xfrm>
-            <a:off x="10942593" y="947246"/>
+            <a:off x="10942593" y="526622"/>
             <a:ext cx="252549" cy="252549"/>
           </a:xfrm>
           <a:prstGeom prst="ellipse">
@@ -9856,7 +9856,7 @@
         </p:nvSpPr>
         <p:spPr>
           <a:xfrm>
-            <a:off x="10942592" y="1194194"/>
+            <a:off x="10942592" y="773570"/>
             <a:ext cx="252549" cy="252549"/>
           </a:xfrm>
           <a:prstGeom prst="ellipse">
@@ -9926,7 +9926,7 @@
         </p:nvSpPr>
         <p:spPr>
           <a:xfrm>
-            <a:off x="10942591" y="1434410"/>
+            <a:off x="10942591" y="1013786"/>
             <a:ext cx="252549" cy="252549"/>
           </a:xfrm>
           <a:prstGeom prst="ellipse">
@@ -9996,7 +9996,7 @@
         </p:nvSpPr>
         <p:spPr>
           <a:xfrm>
-            <a:off x="10942591" y="1685489"/>
+            <a:off x="10942591" y="1264865"/>
             <a:ext cx="252549" cy="252549"/>
           </a:xfrm>
           <a:prstGeom prst="ellipse">
@@ -10066,7 +10066,7 @@
         </p:nvSpPr>
         <p:spPr>
           <a:xfrm>
-            <a:off x="11258325" y="3829752"/>
+            <a:off x="11258325" y="1772352"/>
             <a:ext cx="690475" cy="937724"/>
           </a:xfrm>
           <a:prstGeom prst="rect">
@@ -10176,7 +10176,7 @@
         </p:nvSpPr>
         <p:spPr>
           <a:xfrm>
-            <a:off x="10926693" y="3878776"/>
+            <a:off x="10926693" y="1821376"/>
             <a:ext cx="208800" cy="208800"/>
           </a:xfrm>
           <a:prstGeom prst="ellipse">
@@ -10247,7 +10247,7 @@
         </p:nvSpPr>
         <p:spPr>
           <a:xfrm>
-            <a:off x="10926693" y="4118515"/>
+            <a:off x="10926693" y="2061115"/>
             <a:ext cx="208800" cy="208800"/>
           </a:xfrm>
           <a:prstGeom prst="ellipse">
@@ -10318,7 +10318,7 @@
         </p:nvSpPr>
         <p:spPr>
           <a:xfrm>
-            <a:off x="10926693" y="4356256"/>
+            <a:off x="10926693" y="2298856"/>
             <a:ext cx="208800" cy="208800"/>
           </a:xfrm>
           <a:prstGeom prst="ellipse">
@@ -10389,7 +10389,7 @@
         </p:nvSpPr>
         <p:spPr>
           <a:xfrm>
-            <a:off x="10926693" y="4601572"/>
+            <a:off x="10926693" y="2544172"/>
             <a:ext cx="208800" cy="208800"/>
           </a:xfrm>
           <a:prstGeom prst="ellipse">
@@ -10566,71 +10566,6 @@
                 <a:latin typeface="SBB Light" pitchFamily="2" charset="0"/>
               </a:rPr>
               <a:t>Exam 3</a:t>
-            </a:r>
-            <a:endParaRPr lang="de-CH" sz="1000" dirty="0">
-              <a:solidFill>
-                <a:schemeClr val="tx1"/>
-              </a:solidFill>
-              <a:latin typeface="SBB Light" pitchFamily="2" charset="0"/>
-            </a:endParaRPr>
-          </a:p>
-        </p:txBody>
-      </p:sp>
-      <p:sp>
-        <p:nvSpPr>
-          <p:cNvPr id="97" name="Rechteck 96">
-            <a:extLst>
-              <a:ext uri="{FF2B5EF4-FFF2-40B4-BE49-F238E27FC236}">
-                <a16:creationId xmlns:a16="http://schemas.microsoft.com/office/drawing/2014/main" id="{9E428900-841A-221D-EFC2-7F1CF80A330A}"/>
-              </a:ext>
-            </a:extLst>
-          </p:cNvPr>
-          <p:cNvSpPr/>
-          <p:nvPr/>
-        </p:nvSpPr>
-        <p:spPr>
-          <a:xfrm>
-            <a:off x="528189" y="5281168"/>
-            <a:ext cx="903400" cy="176592"/>
-          </a:xfrm>
-          <a:prstGeom prst="rect">
-            <a:avLst/>
-          </a:prstGeom>
-          <a:solidFill>
-            <a:srgbClr val="5AC036"/>
-          </a:solidFill>
-          <a:ln>
-            <a:noFill/>
-          </a:ln>
-        </p:spPr>
-        <p:style>
-          <a:lnRef idx="2">
-            <a:schemeClr val="accent1">
-              <a:shade val="15000"/>
-            </a:schemeClr>
-          </a:lnRef>
-          <a:fillRef idx="1">
-            <a:schemeClr val="accent1"/>
-          </a:fillRef>
-          <a:effectRef idx="0">
-            <a:schemeClr val="accent1"/>
-          </a:effectRef>
-          <a:fontRef idx="minor">
-            <a:schemeClr val="lt1"/>
-          </a:fontRef>
-        </p:style>
-        <p:txBody>
-          <a:bodyPr rtlCol="0" anchor="ctr"/>
-          <a:lstStyle/>
-          <a:p>
-            <a:r>
-              <a:rPr lang="de-DE" sz="1000" dirty="0">
-                <a:solidFill>
-                  <a:schemeClr val="tx1"/>
-                </a:solidFill>
-                <a:latin typeface="SBB Light" pitchFamily="2" charset="0"/>
-              </a:rPr>
-              <a:t>Exam 4</a:t>
             </a:r>
             <a:endParaRPr lang="de-CH" sz="1000" dirty="0">
               <a:solidFill>
@@ -11843,70 +11778,6 @@
       </p:sp>
       <p:sp>
         <p:nvSpPr>
-          <p:cNvPr id="126" name="Rechteck: abgerundete Ecken 125">
-            <a:extLst>
-              <a:ext uri="{FF2B5EF4-FFF2-40B4-BE49-F238E27FC236}">
-                <a16:creationId xmlns:a16="http://schemas.microsoft.com/office/drawing/2014/main" id="{6F3E13D2-6A2C-EA8A-512F-ADC3284BE6FE}"/>
-              </a:ext>
-            </a:extLst>
-          </p:cNvPr>
-          <p:cNvSpPr/>
-          <p:nvPr/>
-        </p:nvSpPr>
-        <p:spPr>
-          <a:xfrm>
-            <a:off x="1794502" y="2377057"/>
-            <a:ext cx="1107908" cy="232551"/>
-          </a:xfrm>
-          <a:prstGeom prst="roundRect">
-            <a:avLst/>
-          </a:prstGeom>
-          <a:solidFill>
-            <a:schemeClr val="accent2">
-              <a:lumMod val="75000"/>
-            </a:schemeClr>
-          </a:solidFill>
-          <a:ln>
-            <a:noFill/>
-          </a:ln>
-        </p:spPr>
-        <p:style>
-          <a:lnRef idx="2">
-            <a:schemeClr val="accent1">
-              <a:shade val="15000"/>
-            </a:schemeClr>
-          </a:lnRef>
-          <a:fillRef idx="1">
-            <a:schemeClr val="accent1"/>
-          </a:fillRef>
-          <a:effectRef idx="0">
-            <a:schemeClr val="accent1"/>
-          </a:effectRef>
-          <a:fontRef idx="minor">
-            <a:schemeClr val="lt1"/>
-          </a:fontRef>
-        </p:style>
-        <p:txBody>
-          <a:bodyPr lIns="36000" tIns="36000" rIns="36000" bIns="36000" rtlCol="0" anchor="ctr"/>
-          <a:lstStyle/>
-          <a:p>
-            <a:pPr algn="ctr"/>
-            <a:r>
-              <a:rPr lang="de-DE" sz="900" dirty="0">
-                <a:solidFill>
-                  <a:schemeClr val="bg1">
-                    <a:lumMod val="95000"/>
-                  </a:schemeClr>
-                </a:solidFill>
-                <a:latin typeface="SBB Light" pitchFamily="2" charset="0"/>
-              </a:rPr>
-              <a:t>Arbeitsmethodik A1</a:t>
-            </a:r>
-          </a:p>
-        </p:txBody>
-      </p:sp>
-      <p:sp>
-        <p:nvSpPr>
           <p:cNvPr id="129" name="Rechteck: abgerundete Ecken 128">
             <a:extLst>
               <a:ext uri="{FF2B5EF4-FFF2-40B4-BE49-F238E27FC236}">
@@ -11962,7 +11833,7 @@
                 </a:solidFill>
                 <a:latin typeface="SBB Light" pitchFamily="2" charset="0"/>
               </a:rPr>
-              <a:t>Schlüsselkompetenzen S2</a:t>
+              <a:t>Softskills 2</a:t>
             </a:r>
           </a:p>
         </p:txBody>
@@ -11981,8 +11852,8 @@
         </p:nvSpPr>
         <p:spPr>
           <a:xfrm>
-            <a:off x="3677731" y="5800782"/>
-            <a:ext cx="1516184" cy="203822"/>
+            <a:off x="3998563" y="5800782"/>
+            <a:ext cx="1195351" cy="200531"/>
           </a:xfrm>
           <a:prstGeom prst="roundRect">
             <a:avLst/>
@@ -14299,8 +14170,8 @@
         </p:nvGrpSpPr>
         <p:grpSpPr>
           <a:xfrm>
-            <a:off x="8960667" y="3665356"/>
-            <a:ext cx="914400" cy="1608398"/>
+            <a:off x="9920787" y="3665356"/>
+            <a:ext cx="1057010" cy="1608398"/>
             <a:chOff x="1097280" y="1092558"/>
             <a:chExt cx="914400" cy="1608398"/>
           </a:xfrm>
@@ -14366,23 +14237,15 @@
                 </a:rPr>
                 <a:t>Angular</a:t>
               </a:r>
-              <a:br>
-                <a:rPr lang="de-DE" sz="1100" dirty="0">
-                  <a:solidFill>
-                    <a:schemeClr val="tx1"/>
-                  </a:solidFill>
-                  <a:latin typeface="SBB Light" pitchFamily="2" charset="0"/>
-                </a:rPr>
-              </a:br>
-              <a:r>
-                <a:rPr lang="de-DE" sz="1100" dirty="0">
-                  <a:solidFill>
-                    <a:schemeClr val="tx1"/>
-                  </a:solidFill>
-                  <a:latin typeface="SBB Light" pitchFamily="2" charset="0"/>
-                </a:rPr>
-                <a:t>TypeScript</a:t>
-              </a:r>
+            </a:p>
+            <a:p>
+              <a:pPr algn="ctr"/>
+              <a:endParaRPr lang="de-DE" sz="800" dirty="0">
+                <a:solidFill>
+                  <a:schemeClr val="tx1"/>
+                </a:solidFill>
+                <a:latin typeface="SBB Light" pitchFamily="2" charset="0"/>
+              </a:endParaRPr>
             </a:p>
             <a:p>
               <a:pPr algn="ctr"/>
@@ -14436,6 +14299,30 @@
                   <a:latin typeface="SBB Light" pitchFamily="2" charset="0"/>
                 </a:rPr>
                 <a:t>Testing</a:t>
+              </a:r>
+            </a:p>
+            <a:p>
+              <a:pPr algn="ctr"/>
+              <a:r>
+                <a:rPr lang="de-DE" sz="800" dirty="0">
+                  <a:solidFill>
+                    <a:schemeClr val="tx1"/>
+                  </a:solidFill>
+                  <a:latin typeface="SBB Light" pitchFamily="2" charset="0"/>
+                </a:rPr>
+                <a:t>RxJS</a:t>
+              </a:r>
+            </a:p>
+            <a:p>
+              <a:pPr algn="ctr"/>
+              <a:r>
+                <a:rPr lang="de-DE" sz="800" dirty="0">
+                  <a:solidFill>
+                    <a:schemeClr val="tx1"/>
+                  </a:solidFill>
+                  <a:latin typeface="SBB Light" pitchFamily="2" charset="0"/>
+                </a:rPr>
+                <a:t>(NgRx)</a:t>
               </a:r>
             </a:p>
           </p:txBody>
@@ -14531,71 +14418,6 @@
       </p:grpSp>
       <p:sp>
         <p:nvSpPr>
-          <p:cNvPr id="273" name="Rechteck 272">
-            <a:extLst>
-              <a:ext uri="{FF2B5EF4-FFF2-40B4-BE49-F238E27FC236}">
-                <a16:creationId xmlns:a16="http://schemas.microsoft.com/office/drawing/2014/main" id="{F076F8C5-9FB1-31D0-2582-88675739A37E}"/>
-              </a:ext>
-            </a:extLst>
-          </p:cNvPr>
-          <p:cNvSpPr/>
-          <p:nvPr/>
-        </p:nvSpPr>
-        <p:spPr>
-          <a:xfrm>
-            <a:off x="4287531" y="5290319"/>
-            <a:ext cx="903400" cy="176592"/>
-          </a:xfrm>
-          <a:prstGeom prst="rect">
-            <a:avLst/>
-          </a:prstGeom>
-          <a:solidFill>
-            <a:srgbClr val="5AC036"/>
-          </a:solidFill>
-          <a:ln>
-            <a:noFill/>
-          </a:ln>
-        </p:spPr>
-        <p:style>
-          <a:lnRef idx="2">
-            <a:schemeClr val="accent1">
-              <a:shade val="15000"/>
-            </a:schemeClr>
-          </a:lnRef>
-          <a:fillRef idx="1">
-            <a:schemeClr val="accent1"/>
-          </a:fillRef>
-          <a:effectRef idx="0">
-            <a:schemeClr val="accent1"/>
-          </a:effectRef>
-          <a:fontRef idx="minor">
-            <a:schemeClr val="lt1"/>
-          </a:fontRef>
-        </p:style>
-        <p:txBody>
-          <a:bodyPr rtlCol="0" anchor="ctr"/>
-          <a:lstStyle/>
-          <a:p>
-            <a:r>
-              <a:rPr lang="de-DE" sz="1000" dirty="0">
-                <a:solidFill>
-                  <a:schemeClr val="tx1"/>
-                </a:solidFill>
-                <a:latin typeface="SBB Light" pitchFamily="2" charset="0"/>
-              </a:rPr>
-              <a:t>Exam 5</a:t>
-            </a:r>
-            <a:endParaRPr lang="de-CH" sz="1000" dirty="0">
-              <a:solidFill>
-                <a:schemeClr val="tx1"/>
-              </a:solidFill>
-              <a:latin typeface="SBB Light" pitchFamily="2" charset="0"/>
-            </a:endParaRPr>
-          </a:p>
-        </p:txBody>
-      </p:sp>
-      <p:sp>
-        <p:nvSpPr>
           <p:cNvPr id="274" name="Rechteck 273">
             <a:extLst>
               <a:ext uri="{FF2B5EF4-FFF2-40B4-BE49-F238E27FC236}">
@@ -14676,8 +14498,8 @@
         </p:nvSpPr>
         <p:spPr>
           <a:xfrm>
-            <a:off x="8952043" y="5290319"/>
-            <a:ext cx="903400" cy="176592"/>
+            <a:off x="9957883" y="5290319"/>
+            <a:ext cx="984708" cy="191388"/>
           </a:xfrm>
           <a:prstGeom prst="rect">
             <a:avLst/>
@@ -14956,7 +14778,7 @@
         </p:nvSpPr>
         <p:spPr>
           <a:xfrm>
-            <a:off x="8962256" y="5004159"/>
+            <a:off x="9922376" y="5004159"/>
             <a:ext cx="252549" cy="252549"/>
           </a:xfrm>
           <a:prstGeom prst="ellipse">
@@ -15418,8 +15240,8 @@
         </p:nvSpPr>
         <p:spPr>
           <a:xfrm>
-            <a:off x="9269389" y="5003615"/>
-            <a:ext cx="498599" cy="235995"/>
+            <a:off x="10229509" y="5003615"/>
+            <a:ext cx="677119" cy="235995"/>
           </a:xfrm>
           <a:prstGeom prst="roundRect">
             <a:avLst/>
@@ -15451,15 +15273,15 @@
           <a:p>
             <a:pPr algn="ctr"/>
             <a:r>
-              <a:rPr lang="de-DE" sz="1000" dirty="0">
+              <a:rPr lang="de-DE" sz="900" dirty="0">
                 <a:solidFill>
                   <a:schemeClr val="tx1"/>
                 </a:solidFill>
                 <a:latin typeface="SBB Light" pitchFamily="2" charset="0"/>
               </a:rPr>
-              <a:t>#F5</a:t>
+              <a:t>#F6 (#F7)</a:t>
             </a:r>
-            <a:endParaRPr lang="de-CH" sz="1000" dirty="0">
+            <a:endParaRPr lang="de-CH" sz="900" dirty="0">
               <a:solidFill>
                 <a:schemeClr val="tx1"/>
               </a:solidFill>
@@ -15733,8 +15555,8 @@
         </p:nvSpPr>
         <p:spPr>
           <a:xfrm>
-            <a:off x="8946300" y="6157166"/>
-            <a:ext cx="2104269" cy="169550"/>
+            <a:off x="8946300" y="6157165"/>
+            <a:ext cx="3002499" cy="191389"/>
           </a:xfrm>
           <a:prstGeom prst="rightArrow">
             <a:avLst>
@@ -15830,7 +15652,7 @@
         </p:nvGrpSpPr>
         <p:grpSpPr>
           <a:xfrm>
-            <a:off x="9896156" y="3665356"/>
+            <a:off x="11011724" y="3665356"/>
             <a:ext cx="914207" cy="1608398"/>
             <a:chOff x="1097280" y="1092558"/>
             <a:chExt cx="914400" cy="1608398"/>
@@ -16039,7 +15861,7 @@
         </p:nvSpPr>
         <p:spPr>
           <a:xfrm>
-            <a:off x="9896156" y="5021577"/>
+            <a:off x="11011724" y="5021577"/>
             <a:ext cx="252549" cy="252549"/>
           </a:xfrm>
           <a:prstGeom prst="ellipse">
@@ -16109,7 +15931,7 @@
         </p:nvSpPr>
         <p:spPr>
           <a:xfrm>
-            <a:off x="10161823" y="5021205"/>
+            <a:off x="11277391" y="5021205"/>
             <a:ext cx="252549" cy="252549"/>
           </a:xfrm>
           <a:prstGeom prst="ellipse">
@@ -16243,7 +16065,7 @@
         </p:nvSpPr>
         <p:spPr>
           <a:xfrm>
-            <a:off x="10015319" y="6198882"/>
+            <a:off x="11020211" y="6209186"/>
             <a:ext cx="1027937" cy="169550"/>
           </a:xfrm>
           <a:prstGeom prst="rightArrow">
@@ -17361,7 +17183,7 @@
         </p:nvSpPr>
         <p:spPr>
           <a:xfrm>
-            <a:off x="9075377" y="6009685"/>
+            <a:off x="9678881" y="6009685"/>
             <a:ext cx="903400" cy="147195"/>
           </a:xfrm>
           <a:prstGeom prst="rect">
@@ -18126,7 +17948,7 @@
         </p:nvSpPr>
         <p:spPr>
           <a:xfrm rot="20938405">
-            <a:off x="8863941" y="5537152"/>
+            <a:off x="8863941" y="5409136"/>
             <a:ext cx="631963" cy="315639"/>
           </a:xfrm>
           <a:prstGeom prst="roundRect">
@@ -18687,69 +18509,7 @@
                 </a:solidFill>
                 <a:latin typeface="SBB Light" pitchFamily="2" charset="0"/>
               </a:rPr>
-              <a:t>Schlüsselkompetenzen S1</a:t>
-            </a:r>
-          </a:p>
-        </p:txBody>
-      </p:sp>
-      <p:sp>
-        <p:nvSpPr>
-          <p:cNvPr id="269" name="Rechteck: abgerundete Ecken 268">
-            <a:extLst>
-              <a:ext uri="{FF2B5EF4-FFF2-40B4-BE49-F238E27FC236}">
-                <a16:creationId xmlns:a16="http://schemas.microsoft.com/office/drawing/2014/main" id="{7A2E22F8-05D0-7205-B23C-4ADA9BF669CE}"/>
-              </a:ext>
-            </a:extLst>
-          </p:cNvPr>
-          <p:cNvSpPr/>
-          <p:nvPr/>
-        </p:nvSpPr>
-        <p:spPr>
-          <a:xfrm>
-            <a:off x="9652276" y="5772053"/>
-            <a:ext cx="1154415" cy="232551"/>
-          </a:xfrm>
-          <a:prstGeom prst="roundRect">
-            <a:avLst/>
-          </a:prstGeom>
-          <a:solidFill>
-            <a:schemeClr val="accent2">
-              <a:lumMod val="75000"/>
-            </a:schemeClr>
-          </a:solidFill>
-          <a:ln>
-            <a:noFill/>
-          </a:ln>
-        </p:spPr>
-        <p:style>
-          <a:lnRef idx="2">
-            <a:schemeClr val="accent1">
-              <a:shade val="15000"/>
-            </a:schemeClr>
-          </a:lnRef>
-          <a:fillRef idx="1">
-            <a:schemeClr val="accent1"/>
-          </a:fillRef>
-          <a:effectRef idx="0">
-            <a:schemeClr val="accent1"/>
-          </a:effectRef>
-          <a:fontRef idx="minor">
-            <a:schemeClr val="lt1"/>
-          </a:fontRef>
-        </p:style>
-        <p:txBody>
-          <a:bodyPr lIns="36000" tIns="36000" rIns="36000" bIns="36000" rtlCol="0" anchor="ctr"/>
-          <a:lstStyle/>
-          <a:p>
-            <a:pPr algn="ctr"/>
-            <a:r>
-              <a:rPr lang="de-DE" sz="900" dirty="0">
-                <a:solidFill>
-                  <a:schemeClr val="bg1"/>
-                </a:solidFill>
-                <a:latin typeface="SBB Light" pitchFamily="2" charset="0"/>
-              </a:rPr>
-              <a:t>Arbeitsmethodik A2</a:t>
+              <a:t>Softskills 1</a:t>
             </a:r>
           </a:p>
         </p:txBody>
@@ -18768,7 +18528,7 @@
         </p:nvSpPr>
         <p:spPr>
           <a:xfrm>
-            <a:off x="978803" y="5799180"/>
+            <a:off x="2552228" y="5793609"/>
             <a:ext cx="1399545" cy="205424"/>
           </a:xfrm>
           <a:prstGeom prst="roundRect">
@@ -18811,7 +18571,7 @@
                 </a:solidFill>
                 <a:latin typeface="SBB Light" pitchFamily="2" charset="0"/>
               </a:rPr>
-              <a:t>Schlüsselkompetenzen S3</a:t>
+              <a:t>Softskills 3</a:t>
             </a:r>
           </a:p>
         </p:txBody>
@@ -18830,8 +18590,8 @@
         </p:nvSpPr>
         <p:spPr>
           <a:xfrm>
-            <a:off x="6934695" y="5772053"/>
-            <a:ext cx="1154415" cy="232551"/>
+            <a:off x="8899170" y="5809733"/>
+            <a:ext cx="1936689" cy="194871"/>
           </a:xfrm>
           <a:prstGeom prst="roundRect">
             <a:avLst/>
@@ -18873,7 +18633,7 @@
                 </a:solidFill>
                 <a:latin typeface="SBB Light" pitchFamily="2" charset="0"/>
               </a:rPr>
-              <a:t>Arbeitsmethodik A2</a:t>
+              <a:t>Agilität / SAFe / Projektmanagement</a:t>
             </a:r>
           </a:p>
         </p:txBody>
@@ -19244,8 +19004,8 @@
         </p:nvSpPr>
         <p:spPr>
           <a:xfrm>
-            <a:off x="608786" y="5557907"/>
-            <a:ext cx="1705516" cy="212066"/>
+            <a:off x="706249" y="5788966"/>
+            <a:ext cx="1705516" cy="197997"/>
           </a:xfrm>
           <a:prstGeom prst="roundRect">
             <a:avLst/>
@@ -19291,132 +19051,6 @@
               </a:rPr>
               <a:t>Barrierefreiheit/Accessibility</a:t>
             </a:r>
-          </a:p>
-        </p:txBody>
-      </p:sp>
-      <p:sp>
-        <p:nvSpPr>
-          <p:cNvPr id="70" name="Textfeld 69">
-            <a:extLst>
-              <a:ext uri="{FF2B5EF4-FFF2-40B4-BE49-F238E27FC236}">
-                <a16:creationId xmlns:a16="http://schemas.microsoft.com/office/drawing/2014/main" id="{42697A38-BA43-BB46-0E29-AE20908BE8DA}"/>
-              </a:ext>
-            </a:extLst>
-          </p:cNvPr>
-          <p:cNvSpPr txBox="1"/>
-          <p:nvPr/>
-        </p:nvSpPr>
-        <p:spPr>
-          <a:xfrm>
-            <a:off x="2280947" y="5556027"/>
-            <a:ext cx="554729" cy="200055"/>
-          </a:xfrm>
-          <a:prstGeom prst="rect">
-            <a:avLst/>
-          </a:prstGeom>
-          <a:noFill/>
-          <a:ln>
-            <a:noFill/>
-          </a:ln>
-        </p:spPr>
-        <p:style>
-          <a:lnRef idx="2">
-            <a:schemeClr val="accent1">
-              <a:shade val="15000"/>
-            </a:schemeClr>
-          </a:lnRef>
-          <a:fillRef idx="1">
-            <a:schemeClr val="accent1"/>
-          </a:fillRef>
-          <a:effectRef idx="0">
-            <a:schemeClr val="accent1"/>
-          </a:effectRef>
-          <a:fontRef idx="minor">
-            <a:schemeClr val="lt1"/>
-          </a:fontRef>
-        </p:style>
-        <p:txBody>
-          <a:bodyPr rtlCol="0" anchor="t"/>
-          <a:lstStyle>
-            <a:defPPr>
-              <a:defRPr lang="de-DE"/>
-            </a:defPPr>
-            <a:lvl1pPr>
-              <a:defRPr sz="700">
-                <a:latin typeface="SBB Light" pitchFamily="2" charset="0"/>
-              </a:defRPr>
-            </a:lvl1pPr>
-            <a:lvl2pPr>
-              <a:defRPr>
-                <a:solidFill>
-                  <a:schemeClr val="lt1"/>
-                </a:solidFill>
-              </a:defRPr>
-            </a:lvl2pPr>
-            <a:lvl3pPr>
-              <a:defRPr>
-                <a:solidFill>
-                  <a:schemeClr val="lt1"/>
-                </a:solidFill>
-              </a:defRPr>
-            </a:lvl3pPr>
-            <a:lvl4pPr>
-              <a:defRPr>
-                <a:solidFill>
-                  <a:schemeClr val="lt1"/>
-                </a:solidFill>
-              </a:defRPr>
-            </a:lvl4pPr>
-            <a:lvl5pPr>
-              <a:defRPr>
-                <a:solidFill>
-                  <a:schemeClr val="lt1"/>
-                </a:solidFill>
-              </a:defRPr>
-            </a:lvl5pPr>
-            <a:lvl6pPr>
-              <a:defRPr>
-                <a:solidFill>
-                  <a:schemeClr val="lt1"/>
-                </a:solidFill>
-              </a:defRPr>
-            </a:lvl6pPr>
-            <a:lvl7pPr>
-              <a:defRPr>
-                <a:solidFill>
-                  <a:schemeClr val="lt1"/>
-                </a:solidFill>
-              </a:defRPr>
-            </a:lvl7pPr>
-            <a:lvl8pPr>
-              <a:defRPr>
-                <a:solidFill>
-                  <a:schemeClr val="lt1"/>
-                </a:solidFill>
-              </a:defRPr>
-            </a:lvl8pPr>
-            <a:lvl9pPr>
-              <a:defRPr>
-                <a:solidFill>
-                  <a:schemeClr val="lt1"/>
-                </a:solidFill>
-              </a:defRPr>
-            </a:lvl9pPr>
-          </a:lstStyle>
-          <a:p>
-            <a:r>
-              <a:rPr lang="de-DE" dirty="0">
-                <a:solidFill>
-                  <a:schemeClr val="tx1"/>
-                </a:solidFill>
-              </a:rPr>
-              <a:t>29.1./5.2</a:t>
-            </a:r>
-            <a:endParaRPr lang="de-CH" dirty="0">
-              <a:solidFill>
-                <a:schemeClr val="tx1"/>
-              </a:solidFill>
-            </a:endParaRPr>
           </a:p>
         </p:txBody>
       </p:sp>
@@ -19512,7 +19146,7 @@
         </p:nvSpPr>
         <p:spPr>
           <a:xfrm rot="21057795">
-            <a:off x="2826171" y="5371031"/>
+            <a:off x="4252012" y="5371031"/>
             <a:ext cx="902204" cy="357064"/>
           </a:xfrm>
           <a:prstGeom prst="roundRect">
@@ -20162,6 +19796,362 @@
                 <a:latin typeface="SBB Light" pitchFamily="2" charset="0"/>
               </a:rPr>
               <a:t>#J8</a:t>
+            </a:r>
+            <a:endParaRPr lang="de-CH" sz="1000" dirty="0">
+              <a:solidFill>
+                <a:schemeClr val="tx1"/>
+              </a:solidFill>
+              <a:latin typeface="SBB Light" pitchFamily="2" charset="0"/>
+            </a:endParaRPr>
+          </a:p>
+        </p:txBody>
+      </p:sp>
+      <p:grpSp>
+        <p:nvGrpSpPr>
+          <p:cNvPr id="29" name="Gruppieren 28">
+            <a:extLst>
+              <a:ext uri="{FF2B5EF4-FFF2-40B4-BE49-F238E27FC236}">
+                <a16:creationId xmlns:a16="http://schemas.microsoft.com/office/drawing/2014/main" id="{E43A9D3F-EA85-BD12-ADEB-3510725848B5}"/>
+              </a:ext>
+            </a:extLst>
+          </p:cNvPr>
+          <p:cNvGrpSpPr/>
+          <p:nvPr/>
+        </p:nvGrpSpPr>
+        <p:grpSpPr>
+          <a:xfrm>
+            <a:off x="8974874" y="3663695"/>
+            <a:ext cx="914400" cy="1608398"/>
+            <a:chOff x="1097280" y="1092558"/>
+            <a:chExt cx="914400" cy="1608398"/>
+          </a:xfrm>
+          <a:solidFill>
+            <a:schemeClr val="accent5">
+              <a:lumMod val="60000"/>
+              <a:lumOff val="40000"/>
+            </a:schemeClr>
+          </a:solidFill>
+        </p:grpSpPr>
+        <p:sp>
+          <p:nvSpPr>
+            <p:cNvPr id="30" name="Rechteck: abgerundete Ecken 29">
+              <a:extLst>
+                <a:ext uri="{FF2B5EF4-FFF2-40B4-BE49-F238E27FC236}">
+                  <a16:creationId xmlns:a16="http://schemas.microsoft.com/office/drawing/2014/main" id="{0E06AA1C-92BB-943C-CA48-78E882A39295}"/>
+                </a:ext>
+              </a:extLst>
+            </p:cNvPr>
+            <p:cNvSpPr/>
+            <p:nvPr/>
+          </p:nvSpPr>
+          <p:spPr>
+            <a:xfrm>
+              <a:off x="1097280" y="1092558"/>
+              <a:ext cx="914400" cy="1608398"/>
+            </a:xfrm>
+            <a:prstGeom prst="roundRect">
+              <a:avLst/>
+            </a:prstGeom>
+            <a:grpFill/>
+            <a:ln>
+              <a:noFill/>
+            </a:ln>
+          </p:spPr>
+          <p:style>
+            <a:lnRef idx="2">
+              <a:schemeClr val="accent1">
+                <a:shade val="15000"/>
+              </a:schemeClr>
+            </a:lnRef>
+            <a:fillRef idx="1">
+              <a:schemeClr val="accent1"/>
+            </a:fillRef>
+            <a:effectRef idx="0">
+              <a:schemeClr val="accent1"/>
+            </a:effectRef>
+            <a:fontRef idx="minor">
+              <a:schemeClr val="lt1"/>
+            </a:fontRef>
+          </p:style>
+          <p:txBody>
+            <a:bodyPr lIns="36000" tIns="36000" rIns="36000" bIns="36000" rtlCol="0" anchor="t"/>
+            <a:lstStyle/>
+            <a:p>
+              <a:pPr algn="ctr"/>
+              <a:r>
+                <a:rPr lang="de-DE" sz="1100" dirty="0">
+                  <a:solidFill>
+                    <a:schemeClr val="tx1"/>
+                  </a:solidFill>
+                  <a:latin typeface="SBB Light" pitchFamily="2" charset="0"/>
+                </a:rPr>
+                <a:t>TypeScript</a:t>
+              </a:r>
+            </a:p>
+            <a:p>
+              <a:pPr algn="ctr"/>
+              <a:endParaRPr lang="de-DE" sz="800" dirty="0">
+                <a:solidFill>
+                  <a:schemeClr val="tx1"/>
+                </a:solidFill>
+                <a:latin typeface="SBB Light" pitchFamily="2" charset="0"/>
+              </a:endParaRPr>
+            </a:p>
+            <a:p>
+              <a:pPr algn="ctr"/>
+              <a:endParaRPr lang="de-DE" sz="800" dirty="0">
+                <a:solidFill>
+                  <a:schemeClr val="tx1"/>
+                </a:solidFill>
+                <a:latin typeface="SBB Light" pitchFamily="2" charset="0"/>
+              </a:endParaRPr>
+            </a:p>
+            <a:p>
+              <a:pPr algn="ctr"/>
+              <a:endParaRPr lang="de-DE" sz="800" dirty="0">
+                <a:solidFill>
+                  <a:schemeClr val="tx1"/>
+                </a:solidFill>
+                <a:latin typeface="SBB Light" pitchFamily="2" charset="0"/>
+              </a:endParaRPr>
+            </a:p>
+            <a:p>
+              <a:pPr algn="ctr"/>
+              <a:r>
+                <a:rPr lang="de-DE" sz="800" dirty="0">
+                  <a:solidFill>
+                    <a:schemeClr val="tx1"/>
+                  </a:solidFill>
+                  <a:latin typeface="SBB Light" pitchFamily="2" charset="0"/>
+                </a:rPr>
+                <a:t>Basics</a:t>
+              </a:r>
+            </a:p>
+            <a:p>
+              <a:pPr algn="ctr"/>
+              <a:endParaRPr lang="de-DE" sz="800" dirty="0">
+                <a:solidFill>
+                  <a:schemeClr val="tx1"/>
+                </a:solidFill>
+                <a:latin typeface="SBB Light" pitchFamily="2" charset="0"/>
+              </a:endParaRPr>
+            </a:p>
+          </p:txBody>
+        </p:sp>
+        <p:cxnSp>
+          <p:nvCxnSpPr>
+            <p:cNvPr id="228" name="Gerader Verbinder 227">
+              <a:extLst>
+                <a:ext uri="{FF2B5EF4-FFF2-40B4-BE49-F238E27FC236}">
+                  <a16:creationId xmlns:a16="http://schemas.microsoft.com/office/drawing/2014/main" id="{96F15FE9-5908-A3A4-947B-45CA0EE56AE8}"/>
+                </a:ext>
+              </a:extLst>
+            </p:cNvPr>
+            <p:cNvCxnSpPr>
+              <a:cxnSpLocks/>
+            </p:cNvCxnSpPr>
+            <p:nvPr/>
+          </p:nvCxnSpPr>
+          <p:spPr>
+            <a:xfrm>
+              <a:off x="1167384" y="1541272"/>
+              <a:ext cx="777240" cy="0"/>
+            </a:xfrm>
+            <a:prstGeom prst="line">
+              <a:avLst/>
+            </a:prstGeom>
+            <a:grpFill/>
+            <a:ln>
+              <a:solidFill>
+                <a:schemeClr val="bg1"/>
+              </a:solidFill>
+            </a:ln>
+          </p:spPr>
+          <p:style>
+            <a:lnRef idx="2">
+              <a:schemeClr val="accent1"/>
+            </a:lnRef>
+            <a:fillRef idx="0">
+              <a:schemeClr val="accent1"/>
+            </a:fillRef>
+            <a:effectRef idx="1">
+              <a:schemeClr val="accent1"/>
+            </a:effectRef>
+            <a:fontRef idx="minor">
+              <a:schemeClr val="tx1"/>
+            </a:fontRef>
+          </p:style>
+        </p:cxnSp>
+        <p:cxnSp>
+          <p:nvCxnSpPr>
+            <p:cNvPr id="276" name="Gerader Verbinder 275">
+              <a:extLst>
+                <a:ext uri="{FF2B5EF4-FFF2-40B4-BE49-F238E27FC236}">
+                  <a16:creationId xmlns:a16="http://schemas.microsoft.com/office/drawing/2014/main" id="{FA853A74-6B2B-1F53-99A8-51D0E905F392}"/>
+                </a:ext>
+              </a:extLst>
+            </p:cNvPr>
+            <p:cNvCxnSpPr>
+              <a:cxnSpLocks/>
+            </p:cNvCxnSpPr>
+            <p:nvPr/>
+          </p:nvCxnSpPr>
+          <p:spPr>
+            <a:xfrm>
+              <a:off x="1167384" y="2376402"/>
+              <a:ext cx="777240" cy="0"/>
+            </a:xfrm>
+            <a:prstGeom prst="line">
+              <a:avLst/>
+            </a:prstGeom>
+            <a:grpFill/>
+            <a:ln>
+              <a:solidFill>
+                <a:schemeClr val="bg1"/>
+              </a:solidFill>
+            </a:ln>
+          </p:spPr>
+          <p:style>
+            <a:lnRef idx="2">
+              <a:schemeClr val="accent1"/>
+            </a:lnRef>
+            <a:fillRef idx="0">
+              <a:schemeClr val="accent1"/>
+            </a:fillRef>
+            <a:effectRef idx="1">
+              <a:schemeClr val="accent1"/>
+            </a:effectRef>
+            <a:fontRef idx="minor">
+              <a:schemeClr val="tx1"/>
+            </a:fontRef>
+          </p:style>
+        </p:cxnSp>
+      </p:grpSp>
+      <p:sp>
+        <p:nvSpPr>
+          <p:cNvPr id="278" name="Ellipse 277">
+            <a:extLst>
+              <a:ext uri="{FF2B5EF4-FFF2-40B4-BE49-F238E27FC236}">
+                <a16:creationId xmlns:a16="http://schemas.microsoft.com/office/drawing/2014/main" id="{FE1455E6-8D8F-1C0A-DBE3-57AAB88BF03D}"/>
+              </a:ext>
+            </a:extLst>
+          </p:cNvPr>
+          <p:cNvSpPr/>
+          <p:nvPr/>
+        </p:nvSpPr>
+        <p:spPr>
+          <a:xfrm>
+            <a:off x="8976463" y="5002498"/>
+            <a:ext cx="252549" cy="252549"/>
+          </a:xfrm>
+          <a:prstGeom prst="ellipse">
+            <a:avLst/>
+          </a:prstGeom>
+          <a:solidFill>
+            <a:srgbClr val="FFCC66"/>
+          </a:solidFill>
+          <a:ln>
+            <a:solidFill>
+              <a:schemeClr val="accent2">
+                <a:lumMod val="60000"/>
+                <a:lumOff val="40000"/>
+              </a:schemeClr>
+            </a:solidFill>
+          </a:ln>
+        </p:spPr>
+        <p:style>
+          <a:lnRef idx="2">
+            <a:schemeClr val="accent1">
+              <a:shade val="15000"/>
+            </a:schemeClr>
+          </a:lnRef>
+          <a:fillRef idx="1">
+            <a:schemeClr val="accent1"/>
+          </a:fillRef>
+          <a:effectRef idx="0">
+            <a:schemeClr val="accent1"/>
+          </a:effectRef>
+          <a:fontRef idx="minor">
+            <a:schemeClr val="lt1"/>
+          </a:fontRef>
+        </p:style>
+        <p:txBody>
+          <a:bodyPr rtlCol="0" anchor="ctr"/>
+          <a:lstStyle/>
+          <a:p>
+            <a:pPr algn="ctr"/>
+            <a:r>
+              <a:rPr lang="de-DE" sz="1000" b="1" dirty="0">
+                <a:solidFill>
+                  <a:schemeClr val="bg1"/>
+                </a:solidFill>
+                <a:latin typeface="SBB Light" pitchFamily="2" charset="0"/>
+              </a:rPr>
+              <a:t>2</a:t>
+            </a:r>
+            <a:endParaRPr lang="de-CH" sz="1000" b="1" dirty="0">
+              <a:solidFill>
+                <a:schemeClr val="bg1"/>
+              </a:solidFill>
+              <a:latin typeface="SBB Light" pitchFamily="2" charset="0"/>
+            </a:endParaRPr>
+          </a:p>
+        </p:txBody>
+      </p:sp>
+      <p:sp>
+        <p:nvSpPr>
+          <p:cNvPr id="280" name="Rechteck: abgerundete Ecken 279">
+            <a:extLst>
+              <a:ext uri="{FF2B5EF4-FFF2-40B4-BE49-F238E27FC236}">
+                <a16:creationId xmlns:a16="http://schemas.microsoft.com/office/drawing/2014/main" id="{64C6E768-9956-BE7D-3F9A-7C7BCA7063EA}"/>
+              </a:ext>
+            </a:extLst>
+          </p:cNvPr>
+          <p:cNvSpPr/>
+          <p:nvPr/>
+        </p:nvSpPr>
+        <p:spPr>
+          <a:xfrm>
+            <a:off x="9283596" y="5001954"/>
+            <a:ext cx="498599" cy="235995"/>
+          </a:xfrm>
+          <a:prstGeom prst="roundRect">
+            <a:avLst/>
+          </a:prstGeom>
+          <a:solidFill>
+            <a:schemeClr val="bg1"/>
+          </a:solidFill>
+          <a:ln w="9525"/>
+        </p:spPr>
+        <p:style>
+          <a:lnRef idx="2">
+            <a:schemeClr val="accent1">
+              <a:shade val="15000"/>
+            </a:schemeClr>
+          </a:lnRef>
+          <a:fillRef idx="1">
+            <a:schemeClr val="accent1"/>
+          </a:fillRef>
+          <a:effectRef idx="0">
+            <a:schemeClr val="accent1"/>
+          </a:effectRef>
+          <a:fontRef idx="minor">
+            <a:schemeClr val="lt1"/>
+          </a:fontRef>
+        </p:style>
+        <p:txBody>
+          <a:bodyPr rtlCol="0" anchor="ctr"/>
+          <a:lstStyle/>
+          <a:p>
+            <a:pPr algn="ctr"/>
+            <a:r>
+              <a:rPr lang="de-DE" sz="1000" dirty="0">
+                <a:solidFill>
+                  <a:schemeClr val="tx1"/>
+                </a:solidFill>
+                <a:latin typeface="SBB Light" pitchFamily="2" charset="0"/>
+              </a:rPr>
+              <a:t>#F5</a:t>
             </a:r>
             <a:endParaRPr lang="de-CH" sz="1000" dirty="0">
               <a:solidFill>

</xml_diff>

<commit_message>
feature(refactor-overview): removed misleading lab-Nrs on overview
</commit_message>
<xml_diff>
--- a/content/en/docs/overview/INF_Basisausbildung_Teil_1_Modulplan.pptx
+++ b/content/en/docs/overview/INF_Basisausbildung_Teil_1_Modulplan.pptx
@@ -3066,7 +3066,7 @@
           <a:p>
             <a:fld id="{37C84E4B-B338-4193-A47A-275E09D9F7E4}" type="datetimeFigureOut">
               <a:rPr lang="de-CH" smtClean="0"/>
-              <a:t>30.10.2024</a:t>
+              <a:t>01.11.2024</a:t>
             </a:fld>
             <a:endParaRPr lang="de-CH" dirty="0"/>
           </a:p>
@@ -3567,7 +3567,7 @@
           <a:p>
             <a:fld id="{19D283FB-C38C-4A98-BBD1-312954666360}" type="datetimeFigureOut">
               <a:rPr lang="de-CH" smtClean="0"/>
-              <a:t>30.10.2024</a:t>
+              <a:t>01.11.2024</a:t>
             </a:fld>
             <a:endParaRPr lang="de-CH" dirty="0"/>
           </a:p>
@@ -3767,7 +3767,7 @@
           <a:p>
             <a:fld id="{19D283FB-C38C-4A98-BBD1-312954666360}" type="datetimeFigureOut">
               <a:rPr lang="de-CH" smtClean="0"/>
-              <a:t>30.10.2024</a:t>
+              <a:t>01.11.2024</a:t>
             </a:fld>
             <a:endParaRPr lang="de-CH" dirty="0"/>
           </a:p>
@@ -3977,7 +3977,7 @@
           <a:p>
             <a:fld id="{19D283FB-C38C-4A98-BBD1-312954666360}" type="datetimeFigureOut">
               <a:rPr lang="de-CH" smtClean="0"/>
-              <a:t>30.10.2024</a:t>
+              <a:t>01.11.2024</a:t>
             </a:fld>
             <a:endParaRPr lang="de-CH" dirty="0"/>
           </a:p>
@@ -4177,7 +4177,7 @@
           <a:p>
             <a:fld id="{19D283FB-C38C-4A98-BBD1-312954666360}" type="datetimeFigureOut">
               <a:rPr lang="de-CH" smtClean="0"/>
-              <a:t>30.10.2024</a:t>
+              <a:t>01.11.2024</a:t>
             </a:fld>
             <a:endParaRPr lang="de-CH" dirty="0"/>
           </a:p>
@@ -4453,7 +4453,7 @@
           <a:p>
             <a:fld id="{19D283FB-C38C-4A98-BBD1-312954666360}" type="datetimeFigureOut">
               <a:rPr lang="de-CH" smtClean="0"/>
-              <a:t>30.10.2024</a:t>
+              <a:t>01.11.2024</a:t>
             </a:fld>
             <a:endParaRPr lang="de-CH" dirty="0"/>
           </a:p>
@@ -4721,7 +4721,7 @@
           <a:p>
             <a:fld id="{19D283FB-C38C-4A98-BBD1-312954666360}" type="datetimeFigureOut">
               <a:rPr lang="de-CH" smtClean="0"/>
-              <a:t>30.10.2024</a:t>
+              <a:t>01.11.2024</a:t>
             </a:fld>
             <a:endParaRPr lang="de-CH" dirty="0"/>
           </a:p>
@@ -5136,7 +5136,7 @@
           <a:p>
             <a:fld id="{19D283FB-C38C-4A98-BBD1-312954666360}" type="datetimeFigureOut">
               <a:rPr lang="de-CH" smtClean="0"/>
-              <a:t>30.10.2024</a:t>
+              <a:t>01.11.2024</a:t>
             </a:fld>
             <a:endParaRPr lang="de-CH" dirty="0"/>
           </a:p>
@@ -5278,7 +5278,7 @@
           <a:p>
             <a:fld id="{19D283FB-C38C-4A98-BBD1-312954666360}" type="datetimeFigureOut">
               <a:rPr lang="de-CH" smtClean="0"/>
-              <a:t>30.10.2024</a:t>
+              <a:t>01.11.2024</a:t>
             </a:fld>
             <a:endParaRPr lang="de-CH" dirty="0"/>
           </a:p>
@@ -5391,7 +5391,7 @@
           <a:p>
             <a:fld id="{19D283FB-C38C-4A98-BBD1-312954666360}" type="datetimeFigureOut">
               <a:rPr lang="de-CH" smtClean="0"/>
-              <a:t>30.10.2024</a:t>
+              <a:t>01.11.2024</a:t>
             </a:fld>
             <a:endParaRPr lang="de-CH" dirty="0"/>
           </a:p>
@@ -5704,7 +5704,7 @@
           <a:p>
             <a:fld id="{19D283FB-C38C-4A98-BBD1-312954666360}" type="datetimeFigureOut">
               <a:rPr lang="de-CH" smtClean="0"/>
-              <a:t>30.10.2024</a:t>
+              <a:t>01.11.2024</a:t>
             </a:fld>
             <a:endParaRPr lang="de-CH" dirty="0"/>
           </a:p>
@@ -5993,7 +5993,7 @@
           <a:p>
             <a:fld id="{19D283FB-C38C-4A98-BBD1-312954666360}" type="datetimeFigureOut">
               <a:rPr lang="de-CH" smtClean="0"/>
-              <a:t>30.10.2024</a:t>
+              <a:t>01.11.2024</a:t>
             </a:fld>
             <a:endParaRPr lang="de-CH" dirty="0"/>
           </a:p>
@@ -6236,7 +6236,7 @@
           <a:p>
             <a:fld id="{19D283FB-C38C-4A98-BBD1-312954666360}" type="datetimeFigureOut">
               <a:rPr lang="de-CH" smtClean="0"/>
-              <a:t>30.10.2024</a:t>
+              <a:t>01.11.2024</a:t>
             </a:fld>
             <a:endParaRPr lang="de-CH" dirty="0"/>
           </a:p>
@@ -19678,134 +19678,6 @@
           </p:style>
         </p:cxnSp>
       </p:grpSp>
-      <p:sp>
-        <p:nvSpPr>
-          <p:cNvPr id="27" name="Rechteck: abgerundete Ecken 26">
-            <a:extLst>
-              <a:ext uri="{FF2B5EF4-FFF2-40B4-BE49-F238E27FC236}">
-                <a16:creationId xmlns:a16="http://schemas.microsoft.com/office/drawing/2014/main" id="{E6CBC57F-3819-65EB-BCD8-D01270BBC726}"/>
-              </a:ext>
-            </a:extLst>
-          </p:cNvPr>
-          <p:cNvSpPr/>
-          <p:nvPr/>
-        </p:nvSpPr>
-        <p:spPr>
-          <a:xfrm>
-            <a:off x="5596335" y="1805753"/>
-            <a:ext cx="498599" cy="235995"/>
-          </a:xfrm>
-          <a:prstGeom prst="roundRect">
-            <a:avLst/>
-          </a:prstGeom>
-          <a:solidFill>
-            <a:schemeClr val="bg1"/>
-          </a:solidFill>
-          <a:ln w="9525"/>
-        </p:spPr>
-        <p:style>
-          <a:lnRef idx="2">
-            <a:schemeClr val="accent1">
-              <a:shade val="15000"/>
-            </a:schemeClr>
-          </a:lnRef>
-          <a:fillRef idx="1">
-            <a:schemeClr val="accent1"/>
-          </a:fillRef>
-          <a:effectRef idx="0">
-            <a:schemeClr val="accent1"/>
-          </a:effectRef>
-          <a:fontRef idx="minor">
-            <a:schemeClr val="lt1"/>
-          </a:fontRef>
-        </p:style>
-        <p:txBody>
-          <a:bodyPr rtlCol="0" anchor="ctr"/>
-          <a:lstStyle/>
-          <a:p>
-            <a:pPr algn="ctr"/>
-            <a:r>
-              <a:rPr lang="de-DE" sz="1000" dirty="0">
-                <a:solidFill>
-                  <a:schemeClr val="tx1"/>
-                </a:solidFill>
-                <a:latin typeface="SBB Light" pitchFamily="2" charset="0"/>
-              </a:rPr>
-              <a:t>#J3</a:t>
-            </a:r>
-            <a:endParaRPr lang="de-CH" sz="1000" dirty="0">
-              <a:solidFill>
-                <a:schemeClr val="tx1"/>
-              </a:solidFill>
-              <a:latin typeface="SBB Light" pitchFamily="2" charset="0"/>
-            </a:endParaRPr>
-          </a:p>
-        </p:txBody>
-      </p:sp>
-      <p:sp>
-        <p:nvSpPr>
-          <p:cNvPr id="28" name="Rechteck: abgerundete Ecken 27">
-            <a:extLst>
-              <a:ext uri="{FF2B5EF4-FFF2-40B4-BE49-F238E27FC236}">
-                <a16:creationId xmlns:a16="http://schemas.microsoft.com/office/drawing/2014/main" id="{BCA0B289-C902-C71A-6DEF-A5931A2104D6}"/>
-              </a:ext>
-            </a:extLst>
-          </p:cNvPr>
-          <p:cNvSpPr/>
-          <p:nvPr/>
-        </p:nvSpPr>
-        <p:spPr>
-          <a:xfrm>
-            <a:off x="3711492" y="4992539"/>
-            <a:ext cx="498599" cy="235995"/>
-          </a:xfrm>
-          <a:prstGeom prst="roundRect">
-            <a:avLst/>
-          </a:prstGeom>
-          <a:solidFill>
-            <a:schemeClr val="bg1"/>
-          </a:solidFill>
-          <a:ln w="9525"/>
-        </p:spPr>
-        <p:style>
-          <a:lnRef idx="2">
-            <a:schemeClr val="accent1">
-              <a:shade val="15000"/>
-            </a:schemeClr>
-          </a:lnRef>
-          <a:fillRef idx="1">
-            <a:schemeClr val="accent1"/>
-          </a:fillRef>
-          <a:effectRef idx="0">
-            <a:schemeClr val="accent1"/>
-          </a:effectRef>
-          <a:fontRef idx="minor">
-            <a:schemeClr val="lt1"/>
-          </a:fontRef>
-        </p:style>
-        <p:txBody>
-          <a:bodyPr rtlCol="0" anchor="ctr"/>
-          <a:lstStyle/>
-          <a:p>
-            <a:pPr algn="ctr"/>
-            <a:r>
-              <a:rPr lang="de-DE" sz="1000" dirty="0">
-                <a:solidFill>
-                  <a:schemeClr val="tx1"/>
-                </a:solidFill>
-                <a:latin typeface="SBB Light" pitchFamily="2" charset="0"/>
-              </a:rPr>
-              <a:t>#J8</a:t>
-            </a:r>
-            <a:endParaRPr lang="de-CH" sz="1000" dirty="0">
-              <a:solidFill>
-                <a:schemeClr val="tx1"/>
-              </a:solidFill>
-              <a:latin typeface="SBB Light" pitchFamily="2" charset="0"/>
-            </a:endParaRPr>
-          </a:p>
-        </p:txBody>
-      </p:sp>
       <p:grpSp>
         <p:nvGrpSpPr>
           <p:cNvPr id="29" name="Gruppieren 28">

</xml_diff>

<commit_message>
fix(springboottestinglabs): corrected labs description (based on solutions), updated overview
</commit_message>
<xml_diff>
--- a/content/en/docs/overview/INF_Basisausbildung_Teil_1_Modulplan.pptx
+++ b/content/en/docs/overview/INF_Basisausbildung_Teil_1_Modulplan.pptx
@@ -3066,7 +3066,7 @@
           <a:p>
             <a:fld id="{37C84E4B-B338-4193-A47A-275E09D9F7E4}" type="datetimeFigureOut">
               <a:rPr lang="de-CH" smtClean="0"/>
-              <a:t>01.11.2024</a:t>
+              <a:t>21.11.2024</a:t>
             </a:fld>
             <a:endParaRPr lang="de-CH" dirty="0"/>
           </a:p>
@@ -3567,7 +3567,7 @@
           <a:p>
             <a:fld id="{19D283FB-C38C-4A98-BBD1-312954666360}" type="datetimeFigureOut">
               <a:rPr lang="de-CH" smtClean="0"/>
-              <a:t>01.11.2024</a:t>
+              <a:t>21.11.2024</a:t>
             </a:fld>
             <a:endParaRPr lang="de-CH" dirty="0"/>
           </a:p>
@@ -3767,7 +3767,7 @@
           <a:p>
             <a:fld id="{19D283FB-C38C-4A98-BBD1-312954666360}" type="datetimeFigureOut">
               <a:rPr lang="de-CH" smtClean="0"/>
-              <a:t>01.11.2024</a:t>
+              <a:t>21.11.2024</a:t>
             </a:fld>
             <a:endParaRPr lang="de-CH" dirty="0"/>
           </a:p>
@@ -3977,7 +3977,7 @@
           <a:p>
             <a:fld id="{19D283FB-C38C-4A98-BBD1-312954666360}" type="datetimeFigureOut">
               <a:rPr lang="de-CH" smtClean="0"/>
-              <a:t>01.11.2024</a:t>
+              <a:t>21.11.2024</a:t>
             </a:fld>
             <a:endParaRPr lang="de-CH" dirty="0"/>
           </a:p>
@@ -4177,7 +4177,7 @@
           <a:p>
             <a:fld id="{19D283FB-C38C-4A98-BBD1-312954666360}" type="datetimeFigureOut">
               <a:rPr lang="de-CH" smtClean="0"/>
-              <a:t>01.11.2024</a:t>
+              <a:t>21.11.2024</a:t>
             </a:fld>
             <a:endParaRPr lang="de-CH" dirty="0"/>
           </a:p>
@@ -4453,7 +4453,7 @@
           <a:p>
             <a:fld id="{19D283FB-C38C-4A98-BBD1-312954666360}" type="datetimeFigureOut">
               <a:rPr lang="de-CH" smtClean="0"/>
-              <a:t>01.11.2024</a:t>
+              <a:t>21.11.2024</a:t>
             </a:fld>
             <a:endParaRPr lang="de-CH" dirty="0"/>
           </a:p>
@@ -4721,7 +4721,7 @@
           <a:p>
             <a:fld id="{19D283FB-C38C-4A98-BBD1-312954666360}" type="datetimeFigureOut">
               <a:rPr lang="de-CH" smtClean="0"/>
-              <a:t>01.11.2024</a:t>
+              <a:t>21.11.2024</a:t>
             </a:fld>
             <a:endParaRPr lang="de-CH" dirty="0"/>
           </a:p>
@@ -5136,7 +5136,7 @@
           <a:p>
             <a:fld id="{19D283FB-C38C-4A98-BBD1-312954666360}" type="datetimeFigureOut">
               <a:rPr lang="de-CH" smtClean="0"/>
-              <a:t>01.11.2024</a:t>
+              <a:t>21.11.2024</a:t>
             </a:fld>
             <a:endParaRPr lang="de-CH" dirty="0"/>
           </a:p>
@@ -5278,7 +5278,7 @@
           <a:p>
             <a:fld id="{19D283FB-C38C-4A98-BBD1-312954666360}" type="datetimeFigureOut">
               <a:rPr lang="de-CH" smtClean="0"/>
-              <a:t>01.11.2024</a:t>
+              <a:t>21.11.2024</a:t>
             </a:fld>
             <a:endParaRPr lang="de-CH" dirty="0"/>
           </a:p>
@@ -5391,7 +5391,7 @@
           <a:p>
             <a:fld id="{19D283FB-C38C-4A98-BBD1-312954666360}" type="datetimeFigureOut">
               <a:rPr lang="de-CH" smtClean="0"/>
-              <a:t>01.11.2024</a:t>
+              <a:t>21.11.2024</a:t>
             </a:fld>
             <a:endParaRPr lang="de-CH" dirty="0"/>
           </a:p>
@@ -5704,7 +5704,7 @@
           <a:p>
             <a:fld id="{19D283FB-C38C-4A98-BBD1-312954666360}" type="datetimeFigureOut">
               <a:rPr lang="de-CH" smtClean="0"/>
-              <a:t>01.11.2024</a:t>
+              <a:t>21.11.2024</a:t>
             </a:fld>
             <a:endParaRPr lang="de-CH" dirty="0"/>
           </a:p>
@@ -5993,7 +5993,7 @@
           <a:p>
             <a:fld id="{19D283FB-C38C-4A98-BBD1-312954666360}" type="datetimeFigureOut">
               <a:rPr lang="de-CH" smtClean="0"/>
-              <a:t>01.11.2024</a:t>
+              <a:t>21.11.2024</a:t>
             </a:fld>
             <a:endParaRPr lang="de-CH" dirty="0"/>
           </a:p>
@@ -6236,7 +6236,7 @@
           <a:p>
             <a:fld id="{19D283FB-C38C-4A98-BBD1-312954666360}" type="datetimeFigureOut">
               <a:rPr lang="de-CH" smtClean="0"/>
-              <a:t>01.11.2024</a:t>
+              <a:t>21.11.2024</a:t>
             </a:fld>
             <a:endParaRPr lang="de-CH" dirty="0"/>
           </a:p>
@@ -17948,7 +17948,7 @@
         </p:nvSpPr>
         <p:spPr>
           <a:xfrm rot="20938405">
-            <a:off x="8863941" y="5409136"/>
+            <a:off x="9388197" y="5409136"/>
             <a:ext cx="631963" cy="315639"/>
           </a:xfrm>
           <a:prstGeom prst="roundRect">
@@ -18510,68 +18510,6 @@
                 <a:latin typeface="SBB Light" pitchFamily="2" charset="0"/>
               </a:rPr>
               <a:t>Softskills 1</a:t>
-            </a:r>
-          </a:p>
-        </p:txBody>
-      </p:sp>
-      <p:sp>
-        <p:nvSpPr>
-          <p:cNvPr id="270" name="Rechteck: abgerundete Ecken 269">
-            <a:extLst>
-              <a:ext uri="{FF2B5EF4-FFF2-40B4-BE49-F238E27FC236}">
-                <a16:creationId xmlns:a16="http://schemas.microsoft.com/office/drawing/2014/main" id="{75AEEB2F-36E9-C484-359B-AA19B5FFC02B}"/>
-              </a:ext>
-            </a:extLst>
-          </p:cNvPr>
-          <p:cNvSpPr/>
-          <p:nvPr/>
-        </p:nvSpPr>
-        <p:spPr>
-          <a:xfrm>
-            <a:off x="2552228" y="5793609"/>
-            <a:ext cx="1399545" cy="205424"/>
-          </a:xfrm>
-          <a:prstGeom prst="roundRect">
-            <a:avLst/>
-          </a:prstGeom>
-          <a:solidFill>
-            <a:schemeClr val="accent2">
-              <a:lumMod val="75000"/>
-            </a:schemeClr>
-          </a:solidFill>
-          <a:ln>
-            <a:noFill/>
-          </a:ln>
-        </p:spPr>
-        <p:style>
-          <a:lnRef idx="2">
-            <a:schemeClr val="accent1">
-              <a:shade val="15000"/>
-            </a:schemeClr>
-          </a:lnRef>
-          <a:fillRef idx="1">
-            <a:schemeClr val="accent1"/>
-          </a:fillRef>
-          <a:effectRef idx="0">
-            <a:schemeClr val="accent1"/>
-          </a:effectRef>
-          <a:fontRef idx="minor">
-            <a:schemeClr val="lt1"/>
-          </a:fontRef>
-        </p:style>
-        <p:txBody>
-          <a:bodyPr lIns="36000" tIns="36000" rIns="36000" bIns="36000" rtlCol="0" anchor="ctr"/>
-          <a:lstStyle/>
-          <a:p>
-            <a:pPr algn="ctr"/>
-            <a:r>
-              <a:rPr lang="de-DE" sz="900" dirty="0">
-                <a:solidFill>
-                  <a:schemeClr val="bg1"/>
-                </a:solidFill>
-                <a:latin typeface="SBB Light" pitchFamily="2" charset="0"/>
-              </a:rPr>
-              <a:t>Softskills 3</a:t>
             </a:r>
           </a:p>
         </p:txBody>

</xml_diff>